<commit_message>
add exercise in lab03.pptx
</commit_message>
<xml_diff>
--- a/week03/Lab03.pptx
+++ b/week03/Lab03.pptx
@@ -3,41 +3,43 @@
 <p:presentation xmlns:a="http://schemas.openxmlformats.org/drawingml/2006/main" xmlns:r="http://schemas.openxmlformats.org/officeDocument/2006/relationships" xmlns:p="http://schemas.openxmlformats.org/presentationml/2006/main">
   <p:sldMasterIdLst>
     <p:sldMasterId id="2147483648" r:id="rId1"/>
-    <p:sldMasterId id="2147483660" r:id="rId3"/>
+    <p:sldMasterId id="2147483660" r:id="rId2"/>
   </p:sldMasterIdLst>
   <p:notesMasterIdLst>
-    <p:notesMasterId r:id="rId20"/>
+    <p:notesMasterId r:id="rId34"/>
   </p:notesMasterIdLst>
   <p:sldIdLst>
-    <p:sldId id="256" r:id="rId4"/>
-    <p:sldId id="477" r:id="rId5"/>
-    <p:sldId id="577" r:id="rId6"/>
-    <p:sldId id="578" r:id="rId7"/>
-    <p:sldId id="594" r:id="rId8"/>
-    <p:sldId id="595" r:id="rId9"/>
-    <p:sldId id="611" r:id="rId10"/>
-    <p:sldId id="627" r:id="rId11"/>
-    <p:sldId id="628" r:id="rId12"/>
-    <p:sldId id="629" r:id="rId13"/>
-    <p:sldId id="630" r:id="rId14"/>
-    <p:sldId id="631" r:id="rId15"/>
-    <p:sldId id="633" r:id="rId16"/>
-    <p:sldId id="636" r:id="rId17"/>
-    <p:sldId id="478" r:id="rId18"/>
-    <p:sldId id="435" r:id="rId19"/>
-    <p:sldId id="436" r:id="rId21"/>
-    <p:sldId id="437" r:id="rId22"/>
-    <p:sldId id="438" r:id="rId23"/>
-    <p:sldId id="491" r:id="rId24"/>
-    <p:sldId id="568" r:id="rId25"/>
-    <p:sldId id="569" r:id="rId26"/>
-    <p:sldId id="442" r:id="rId27"/>
-    <p:sldId id="443" r:id="rId28"/>
-    <p:sldId id="570" r:id="rId29"/>
-    <p:sldId id="486" r:id="rId30"/>
-    <p:sldId id="571" r:id="rId31"/>
-    <p:sldId id="446" r:id="rId32"/>
-    <p:sldId id="572" r:id="rId33"/>
+    <p:sldId id="256" r:id="rId3"/>
+    <p:sldId id="477" r:id="rId4"/>
+    <p:sldId id="577" r:id="rId5"/>
+    <p:sldId id="578" r:id="rId6"/>
+    <p:sldId id="594" r:id="rId7"/>
+    <p:sldId id="595" r:id="rId8"/>
+    <p:sldId id="611" r:id="rId9"/>
+    <p:sldId id="627" r:id="rId10"/>
+    <p:sldId id="628" r:id="rId11"/>
+    <p:sldId id="629" r:id="rId12"/>
+    <p:sldId id="630" r:id="rId13"/>
+    <p:sldId id="631" r:id="rId14"/>
+    <p:sldId id="633" r:id="rId15"/>
+    <p:sldId id="636" r:id="rId16"/>
+    <p:sldId id="478" r:id="rId17"/>
+    <p:sldId id="435" r:id="rId18"/>
+    <p:sldId id="436" r:id="rId19"/>
+    <p:sldId id="437" r:id="rId20"/>
+    <p:sldId id="438" r:id="rId21"/>
+    <p:sldId id="491" r:id="rId22"/>
+    <p:sldId id="568" r:id="rId23"/>
+    <p:sldId id="569" r:id="rId24"/>
+    <p:sldId id="442" r:id="rId25"/>
+    <p:sldId id="443" r:id="rId26"/>
+    <p:sldId id="570" r:id="rId27"/>
+    <p:sldId id="486" r:id="rId28"/>
+    <p:sldId id="571" r:id="rId29"/>
+    <p:sldId id="446" r:id="rId30"/>
+    <p:sldId id="572" r:id="rId31"/>
+    <p:sldId id="637" r:id="rId32"/>
+    <p:sldId id="638" r:id="rId33"/>
   </p:sldIdLst>
   <p:sldSz cx="12192000" cy="6858000"/>
   <p:notesSz cx="6858000" cy="9144000"/>
@@ -136,6 +138,11 @@
       </a:defRPr>
     </a:lvl9pPr>
   </p:defaultTextStyle>
+  <p:extLst>
+    <p:ext uri="{EFAFB233-063F-42B5-8137-9DF3F51BA10A}">
+      <p15:sldGuideLst xmlns:p15="http://schemas.microsoft.com/office/powerpoint/2012/main"/>
+    </p:ext>
+  </p:extLst>
 </p:presentation>
 </file>
 
@@ -221,6 +228,7 @@
           <a:p>
             <a:fld id="{D1237EF7-A117-46B7-88A8-1B7FB98FF0F2}" type="datetimeFigureOut">
               <a:rPr lang="zh-CN" altLang="en-US" smtClean="0"/>
+              <a:t>2021/9/17</a:t>
             </a:fld>
             <a:endParaRPr lang="zh-CN" altLang="en-US"/>
           </a:p>
@@ -287,7 +295,6 @@
               <a:rPr lang="zh-CN" altLang="en-US"/>
               <a:t>单击此处编辑母版文本样式</a:t>
             </a:r>
-            <a:endParaRPr lang="zh-CN" altLang="en-US"/>
           </a:p>
           <a:p>
             <a:pPr lvl="1"/>
@@ -295,7 +302,6 @@
               <a:rPr lang="zh-CN" altLang="en-US"/>
               <a:t>二级</a:t>
             </a:r>
-            <a:endParaRPr lang="zh-CN" altLang="en-US"/>
           </a:p>
           <a:p>
             <a:pPr lvl="2"/>
@@ -303,7 +309,6 @@
               <a:rPr lang="zh-CN" altLang="en-US"/>
               <a:t>三级</a:t>
             </a:r>
-            <a:endParaRPr lang="zh-CN" altLang="en-US"/>
           </a:p>
           <a:p>
             <a:pPr lvl="3"/>
@@ -311,7 +316,6 @@
               <a:rPr lang="zh-CN" altLang="en-US"/>
               <a:t>四级</a:t>
             </a:r>
-            <a:endParaRPr lang="zh-CN" altLang="en-US"/>
           </a:p>
           <a:p>
             <a:pPr lvl="4"/>
@@ -319,7 +323,6 @@
               <a:rPr lang="zh-CN" altLang="en-US"/>
               <a:t>五级</a:t>
             </a:r>
-            <a:endParaRPr lang="zh-CN" altLang="en-US"/>
           </a:p>
         </p:txBody>
       </p:sp>
@@ -383,6 +386,7 @@
           <a:p>
             <a:fld id="{7B705520-EB74-4E10-9207-DDFEA7EA0F0E}" type="slidenum">
               <a:rPr lang="zh-CN" altLang="en-US" smtClean="0"/>
+              <a:t>‹#›</a:t>
             </a:fld>
             <a:endParaRPr lang="zh-CN" altLang="en-US"/>
           </a:p>
@@ -617,6 +621,7 @@
                 <a:ea typeface="宋体" panose="02010600030101010101" pitchFamily="2" charset="-122"/>
                 <a:cs typeface="+mn-cs"/>
               </a:rPr>
+              <a:t>16</a:t>
             </a:fld>
             <a:endParaRPr kumimoji="0" lang="en-US" altLang="zh-CN" sz="1200" b="0" i="0" u="none" strike="noStrike" kern="1200" cap="none" spc="0" normalizeH="0" baseline="0" noProof="0">
               <a:ln>
@@ -774,6 +779,7 @@
                 <a:ea typeface="宋体" panose="02010600030101010101" pitchFamily="2" charset="-122"/>
                 <a:cs typeface="+mn-cs"/>
               </a:rPr>
+              <a:t>21</a:t>
             </a:fld>
             <a:endParaRPr kumimoji="0" lang="en-US" altLang="zh-CN" sz="1200" b="0" i="0" u="none" strike="noStrike" kern="1200" cap="none" spc="0" normalizeH="0" baseline="0" noProof="0">
               <a:ln>
@@ -931,6 +937,7 @@
                 <a:ea typeface="宋体" panose="02010600030101010101" pitchFamily="2" charset="-122"/>
                 <a:cs typeface="+mn-cs"/>
               </a:rPr>
+              <a:t>22</a:t>
             </a:fld>
             <a:endParaRPr kumimoji="0" lang="en-US" altLang="zh-CN" sz="1200" b="0" i="0" u="none" strike="noStrike" kern="1200" cap="none" spc="0" normalizeH="0" baseline="0" noProof="0">
               <a:ln>
@@ -1088,6 +1095,7 @@
                 <a:ea typeface="宋体" panose="02010600030101010101" pitchFamily="2" charset="-122"/>
                 <a:cs typeface="+mn-cs"/>
               </a:rPr>
+              <a:t>23</a:t>
             </a:fld>
             <a:endParaRPr kumimoji="0" lang="en-US" altLang="zh-CN" sz="1200" b="0" i="0" u="none" strike="noStrike" kern="1200" cap="none" spc="0" normalizeH="0" baseline="0" noProof="0">
               <a:ln>
@@ -1245,6 +1253,7 @@
                 <a:ea typeface="宋体" panose="02010600030101010101" pitchFamily="2" charset="-122"/>
                 <a:cs typeface="+mn-cs"/>
               </a:rPr>
+              <a:t>24</a:t>
             </a:fld>
             <a:endParaRPr kumimoji="0" lang="en-US" altLang="zh-CN" sz="1200" b="0" i="0" u="none" strike="noStrike" kern="1200" cap="none" spc="0" normalizeH="0" baseline="0" noProof="0">
               <a:ln>
@@ -1402,6 +1411,7 @@
                 <a:ea typeface="宋体" panose="02010600030101010101" pitchFamily="2" charset="-122"/>
                 <a:cs typeface="+mn-cs"/>
               </a:rPr>
+              <a:t>25</a:t>
             </a:fld>
             <a:endParaRPr kumimoji="0" lang="en-US" altLang="zh-CN" sz="1200" b="0" i="0" u="none" strike="noStrike" kern="1200" cap="none" spc="0" normalizeH="0" baseline="0" noProof="0">
               <a:ln>
@@ -1473,7 +1483,6 @@
               <a:rPr lang="zh-CN" altLang="en-US"/>
               <a:t>单击此处编辑母版标题样式</a:t>
             </a:r>
-            <a:endParaRPr lang="zh-CN" altLang="en-US"/>
           </a:p>
         </p:txBody>
       </p:sp>
@@ -1538,7 +1547,6 @@
               <a:rPr lang="zh-CN" altLang="en-US" dirty="0"/>
               <a:t>单击此处编辑母版副标题样式</a:t>
             </a:r>
-            <a:endParaRPr lang="zh-CN" altLang="en-US" dirty="0"/>
           </a:p>
         </p:txBody>
       </p:sp>
@@ -1559,6 +1567,7 @@
           <a:p>
             <a:fld id="{FC19A4FA-3D9A-4114-B0D5-759CBD56F1AB}" type="datetimeFigureOut">
               <a:rPr lang="zh-CN" altLang="en-US" smtClean="0"/>
+              <a:t>2021/9/17</a:t>
             </a:fld>
             <a:endParaRPr lang="zh-CN" altLang="en-US"/>
           </a:p>
@@ -1600,6 +1609,7 @@
           <a:p>
             <a:fld id="{506F4176-339E-4C4B-80E4-BBE9C4467EFE}" type="slidenum">
               <a:rPr lang="zh-CN" altLang="en-US" smtClean="0"/>
+              <a:t>‹#›</a:t>
             </a:fld>
             <a:endParaRPr lang="zh-CN" altLang="en-US"/>
           </a:p>
@@ -1680,7 +1690,6 @@
               <a:rPr lang="zh-CN" altLang="en-US"/>
               <a:t>单击此处编辑母版标题样式</a:t>
             </a:r>
-            <a:endParaRPr lang="zh-CN" altLang="en-US"/>
           </a:p>
         </p:txBody>
       </p:sp>
@@ -1704,7 +1713,6 @@
               <a:rPr lang="zh-CN" altLang="en-US"/>
               <a:t>单击此处编辑母版文本样式</a:t>
             </a:r>
-            <a:endParaRPr lang="zh-CN" altLang="en-US"/>
           </a:p>
           <a:p>
             <a:pPr lvl="1"/>
@@ -1712,7 +1720,6 @@
               <a:rPr lang="zh-CN" altLang="en-US"/>
               <a:t>第二级</a:t>
             </a:r>
-            <a:endParaRPr lang="zh-CN" altLang="en-US"/>
           </a:p>
           <a:p>
             <a:pPr lvl="2"/>
@@ -1720,7 +1727,6 @@
               <a:rPr lang="zh-CN" altLang="en-US"/>
               <a:t>第三级</a:t>
             </a:r>
-            <a:endParaRPr lang="zh-CN" altLang="en-US"/>
           </a:p>
           <a:p>
             <a:pPr lvl="3"/>
@@ -1728,7 +1734,6 @@
               <a:rPr lang="zh-CN" altLang="en-US"/>
               <a:t>第四级</a:t>
             </a:r>
-            <a:endParaRPr lang="zh-CN" altLang="en-US"/>
           </a:p>
           <a:p>
             <a:pPr lvl="4"/>
@@ -1736,7 +1741,6 @@
               <a:rPr lang="zh-CN" altLang="en-US"/>
               <a:t>第五级</a:t>
             </a:r>
-            <a:endParaRPr lang="zh-CN" altLang="en-US"/>
           </a:p>
         </p:txBody>
       </p:sp>
@@ -1757,6 +1761,7 @@
           <a:p>
             <a:fld id="{FC19A4FA-3D9A-4114-B0D5-759CBD56F1AB}" type="datetimeFigureOut">
               <a:rPr lang="zh-CN" altLang="en-US" smtClean="0"/>
+              <a:t>2021/9/17</a:t>
             </a:fld>
             <a:endParaRPr lang="zh-CN" altLang="en-US"/>
           </a:p>
@@ -1798,6 +1803,7 @@
           <a:p>
             <a:fld id="{506F4176-339E-4C4B-80E4-BBE9C4467EFE}" type="slidenum">
               <a:rPr lang="zh-CN" altLang="en-US" smtClean="0"/>
+              <a:t>‹#›</a:t>
             </a:fld>
             <a:endParaRPr lang="zh-CN" altLang="en-US"/>
           </a:p>
@@ -1852,7 +1858,6 @@
               <a:rPr lang="zh-CN" altLang="en-US"/>
               <a:t>单击此处编辑母版标题样式</a:t>
             </a:r>
-            <a:endParaRPr lang="zh-CN" altLang="en-US"/>
           </a:p>
         </p:txBody>
       </p:sp>
@@ -1881,7 +1886,6 @@
               <a:rPr lang="zh-CN" altLang="en-US"/>
               <a:t>单击此处编辑母版文本样式</a:t>
             </a:r>
-            <a:endParaRPr lang="zh-CN" altLang="en-US"/>
           </a:p>
           <a:p>
             <a:pPr lvl="1"/>
@@ -1889,7 +1893,6 @@
               <a:rPr lang="zh-CN" altLang="en-US"/>
               <a:t>第二级</a:t>
             </a:r>
-            <a:endParaRPr lang="zh-CN" altLang="en-US"/>
           </a:p>
           <a:p>
             <a:pPr lvl="2"/>
@@ -1897,7 +1900,6 @@
               <a:rPr lang="zh-CN" altLang="en-US"/>
               <a:t>第三级</a:t>
             </a:r>
-            <a:endParaRPr lang="zh-CN" altLang="en-US"/>
           </a:p>
           <a:p>
             <a:pPr lvl="3"/>
@@ -1905,7 +1907,6 @@
               <a:rPr lang="zh-CN" altLang="en-US"/>
               <a:t>第四级</a:t>
             </a:r>
-            <a:endParaRPr lang="zh-CN" altLang="en-US"/>
           </a:p>
           <a:p>
             <a:pPr lvl="4"/>
@@ -1913,7 +1914,6 @@
               <a:rPr lang="zh-CN" altLang="en-US"/>
               <a:t>第五级</a:t>
             </a:r>
-            <a:endParaRPr lang="zh-CN" altLang="en-US"/>
           </a:p>
         </p:txBody>
       </p:sp>
@@ -1934,6 +1934,7 @@
           <a:p>
             <a:fld id="{FC19A4FA-3D9A-4114-B0D5-759CBD56F1AB}" type="datetimeFigureOut">
               <a:rPr lang="zh-CN" altLang="en-US" smtClean="0"/>
+              <a:t>2021/9/17</a:t>
             </a:fld>
             <a:endParaRPr lang="zh-CN" altLang="en-US"/>
           </a:p>
@@ -1975,6 +1976,7 @@
           <a:p>
             <a:fld id="{506F4176-339E-4C4B-80E4-BBE9C4467EFE}" type="slidenum">
               <a:rPr lang="zh-CN" altLang="en-US" smtClean="0"/>
+              <a:t>‹#›</a:t>
             </a:fld>
             <a:endParaRPr lang="zh-CN" altLang="en-US"/>
           </a:p>
@@ -2033,7 +2035,6 @@
               <a:rPr lang="zh-CN" altLang="en-US"/>
               <a:t>单击此处编辑母版标题样式</a:t>
             </a:r>
-            <a:endParaRPr lang="zh-CN" altLang="en-US"/>
           </a:p>
         </p:txBody>
       </p:sp>
@@ -2098,7 +2099,6 @@
               <a:rPr lang="zh-CN" altLang="en-US" dirty="0"/>
               <a:t>单击此处编辑母版副标题样式</a:t>
             </a:r>
-            <a:endParaRPr lang="zh-CN" altLang="en-US" dirty="0"/>
           </a:p>
         </p:txBody>
       </p:sp>
@@ -2119,6 +2119,7 @@
           <a:p>
             <a:fld id="{FC19A4FA-3D9A-4114-B0D5-759CBD56F1AB}" type="datetimeFigureOut">
               <a:rPr lang="zh-CN" altLang="en-US" smtClean="0"/>
+              <a:t>2021/9/17</a:t>
             </a:fld>
             <a:endParaRPr lang="zh-CN" altLang="en-US"/>
           </a:p>
@@ -2160,6 +2161,7 @@
           <a:p>
             <a:fld id="{506F4176-339E-4C4B-80E4-BBE9C4467EFE}" type="slidenum">
               <a:rPr lang="zh-CN" altLang="en-US" smtClean="0"/>
+              <a:t>‹#›</a:t>
             </a:fld>
             <a:endParaRPr lang="zh-CN" altLang="en-US"/>
           </a:p>
@@ -2245,7 +2247,6 @@
               <a:rPr lang="zh-CN" altLang="en-US" dirty="0"/>
               <a:t>单击此处编辑母版标题样式</a:t>
             </a:r>
-            <a:endParaRPr lang="zh-CN" altLang="en-US" dirty="0"/>
           </a:p>
         </p:txBody>
       </p:sp>
@@ -2285,7 +2286,6 @@
               <a:rPr lang="zh-CN" altLang="en-US" dirty="0"/>
               <a:t>单击此处编辑母版文本样式</a:t>
             </a:r>
-            <a:endParaRPr lang="zh-CN" altLang="en-US" dirty="0"/>
           </a:p>
           <a:p>
             <a:pPr lvl="1"/>
@@ -2293,7 +2293,6 @@
               <a:rPr lang="zh-CN" altLang="en-US" dirty="0"/>
               <a:t>第二级</a:t>
             </a:r>
-            <a:endParaRPr lang="zh-CN" altLang="en-US" dirty="0"/>
           </a:p>
           <a:p>
             <a:pPr lvl="2"/>
@@ -2301,7 +2300,6 @@
               <a:rPr lang="zh-CN" altLang="en-US" dirty="0"/>
               <a:t>第三级</a:t>
             </a:r>
-            <a:endParaRPr lang="zh-CN" altLang="en-US" dirty="0"/>
           </a:p>
           <a:p>
             <a:pPr lvl="3"/>
@@ -2309,7 +2307,6 @@
               <a:rPr lang="zh-CN" altLang="en-US" dirty="0"/>
               <a:t>第四级</a:t>
             </a:r>
-            <a:endParaRPr lang="zh-CN" altLang="en-US" dirty="0"/>
           </a:p>
           <a:p>
             <a:pPr lvl="4"/>
@@ -2317,7 +2314,6 @@
               <a:rPr lang="zh-CN" altLang="en-US" dirty="0"/>
               <a:t>第五级</a:t>
             </a:r>
-            <a:endParaRPr lang="zh-CN" altLang="en-US" dirty="0"/>
           </a:p>
         </p:txBody>
       </p:sp>
@@ -2338,6 +2334,7 @@
           <a:p>
             <a:fld id="{FC19A4FA-3D9A-4114-B0D5-759CBD56F1AB}" type="datetimeFigureOut">
               <a:rPr lang="zh-CN" altLang="en-US" smtClean="0"/>
+              <a:t>2021/9/17</a:t>
             </a:fld>
             <a:endParaRPr lang="zh-CN" altLang="en-US"/>
           </a:p>
@@ -2379,6 +2376,7 @@
           <a:p>
             <a:fld id="{506F4176-339E-4C4B-80E4-BBE9C4467EFE}" type="slidenum">
               <a:rPr lang="zh-CN" altLang="en-US" smtClean="0"/>
+              <a:t>‹#›</a:t>
             </a:fld>
             <a:endParaRPr lang="zh-CN" altLang="en-US"/>
           </a:p>
@@ -2461,7 +2459,6 @@
               <a:rPr lang="zh-CN" altLang="en-US"/>
               <a:t>单击此处编辑母版标题样式</a:t>
             </a:r>
-            <a:endParaRPr lang="zh-CN" altLang="en-US"/>
           </a:p>
         </p:txBody>
       </p:sp>
@@ -2490,7 +2487,6 @@
               <a:rPr lang="zh-CN" altLang="en-US"/>
               <a:t>单击此处编辑母版文本样式</a:t>
             </a:r>
-            <a:endParaRPr lang="zh-CN" altLang="en-US"/>
           </a:p>
           <a:p>
             <a:pPr lvl="1"/>
@@ -2498,7 +2494,6 @@
               <a:rPr lang="zh-CN" altLang="en-US"/>
               <a:t>第二级</a:t>
             </a:r>
-            <a:endParaRPr lang="zh-CN" altLang="en-US"/>
           </a:p>
           <a:p>
             <a:pPr lvl="2"/>
@@ -2506,7 +2501,6 @@
               <a:rPr lang="zh-CN" altLang="en-US"/>
               <a:t>第三级</a:t>
             </a:r>
-            <a:endParaRPr lang="zh-CN" altLang="en-US"/>
           </a:p>
           <a:p>
             <a:pPr lvl="3"/>
@@ -2514,7 +2508,6 @@
               <a:rPr lang="zh-CN" altLang="en-US"/>
               <a:t>第四级</a:t>
             </a:r>
-            <a:endParaRPr lang="zh-CN" altLang="en-US"/>
           </a:p>
           <a:p>
             <a:pPr lvl="4"/>
@@ -2522,7 +2515,6 @@
               <a:rPr lang="zh-CN" altLang="en-US"/>
               <a:t>第五级</a:t>
             </a:r>
-            <a:endParaRPr lang="zh-CN" altLang="en-US"/>
           </a:p>
         </p:txBody>
       </p:sp>
@@ -2551,7 +2543,6 @@
               <a:rPr lang="zh-CN" altLang="en-US"/>
               <a:t>单击此处编辑母版文本样式</a:t>
             </a:r>
-            <a:endParaRPr lang="zh-CN" altLang="en-US"/>
           </a:p>
           <a:p>
             <a:pPr lvl="1"/>
@@ -2559,7 +2550,6 @@
               <a:rPr lang="zh-CN" altLang="en-US"/>
               <a:t>第二级</a:t>
             </a:r>
-            <a:endParaRPr lang="zh-CN" altLang="en-US"/>
           </a:p>
           <a:p>
             <a:pPr lvl="2"/>
@@ -2567,7 +2557,6 @@
               <a:rPr lang="zh-CN" altLang="en-US"/>
               <a:t>第三级</a:t>
             </a:r>
-            <a:endParaRPr lang="zh-CN" altLang="en-US"/>
           </a:p>
           <a:p>
             <a:pPr lvl="3"/>
@@ -2575,7 +2564,6 @@
               <a:rPr lang="zh-CN" altLang="en-US"/>
               <a:t>第四级</a:t>
             </a:r>
-            <a:endParaRPr lang="zh-CN" altLang="en-US"/>
           </a:p>
           <a:p>
             <a:pPr lvl="4"/>
@@ -2583,7 +2571,6 @@
               <a:rPr lang="zh-CN" altLang="en-US"/>
               <a:t>第五级</a:t>
             </a:r>
-            <a:endParaRPr lang="zh-CN" altLang="en-US"/>
           </a:p>
         </p:txBody>
       </p:sp>
@@ -2604,6 +2591,7 @@
           <a:p>
             <a:fld id="{FC19A4FA-3D9A-4114-B0D5-759CBD56F1AB}" type="datetimeFigureOut">
               <a:rPr lang="zh-CN" altLang="en-US" smtClean="0"/>
+              <a:t>2021/9/17</a:t>
             </a:fld>
             <a:endParaRPr lang="zh-CN" altLang="en-US"/>
           </a:p>
@@ -2645,6 +2633,7 @@
           <a:p>
             <a:fld id="{506F4176-339E-4C4B-80E4-BBE9C4467EFE}" type="slidenum">
               <a:rPr lang="zh-CN" altLang="en-US" smtClean="0"/>
+              <a:t>‹#›</a:t>
             </a:fld>
             <a:endParaRPr lang="zh-CN" altLang="en-US"/>
           </a:p>
@@ -2727,7 +2716,6 @@
               <a:rPr lang="zh-CN" altLang="en-US"/>
               <a:t>单击此处编辑母版标题样式</a:t>
             </a:r>
-            <a:endParaRPr lang="zh-CN" altLang="en-US"/>
           </a:p>
         </p:txBody>
       </p:sp>
@@ -2793,7 +2781,6 @@
               <a:rPr lang="zh-CN" altLang="en-US"/>
               <a:t>单击此处编辑母版文本样式</a:t>
             </a:r>
-            <a:endParaRPr lang="zh-CN" altLang="en-US"/>
           </a:p>
         </p:txBody>
       </p:sp>
@@ -2822,7 +2809,6 @@
               <a:rPr lang="zh-CN" altLang="en-US"/>
               <a:t>单击此处编辑母版文本样式</a:t>
             </a:r>
-            <a:endParaRPr lang="zh-CN" altLang="en-US"/>
           </a:p>
           <a:p>
             <a:pPr lvl="1"/>
@@ -2830,7 +2816,6 @@
               <a:rPr lang="zh-CN" altLang="en-US"/>
               <a:t>第二级</a:t>
             </a:r>
-            <a:endParaRPr lang="zh-CN" altLang="en-US"/>
           </a:p>
           <a:p>
             <a:pPr lvl="2"/>
@@ -2838,7 +2823,6 @@
               <a:rPr lang="zh-CN" altLang="en-US"/>
               <a:t>第三级</a:t>
             </a:r>
-            <a:endParaRPr lang="zh-CN" altLang="en-US"/>
           </a:p>
           <a:p>
             <a:pPr lvl="3"/>
@@ -2846,7 +2830,6 @@
               <a:rPr lang="zh-CN" altLang="en-US"/>
               <a:t>第四级</a:t>
             </a:r>
-            <a:endParaRPr lang="zh-CN" altLang="en-US"/>
           </a:p>
           <a:p>
             <a:pPr lvl="4"/>
@@ -2854,7 +2837,6 @@
               <a:rPr lang="zh-CN" altLang="en-US"/>
               <a:t>第五级</a:t>
             </a:r>
-            <a:endParaRPr lang="zh-CN" altLang="en-US"/>
           </a:p>
         </p:txBody>
       </p:sp>
@@ -2920,7 +2902,6 @@
               <a:rPr lang="zh-CN" altLang="en-US"/>
               <a:t>单击此处编辑母版文本样式</a:t>
             </a:r>
-            <a:endParaRPr lang="zh-CN" altLang="en-US"/>
           </a:p>
         </p:txBody>
       </p:sp>
@@ -2949,7 +2930,6 @@
               <a:rPr lang="zh-CN" altLang="en-US"/>
               <a:t>单击此处编辑母版文本样式</a:t>
             </a:r>
-            <a:endParaRPr lang="zh-CN" altLang="en-US"/>
           </a:p>
           <a:p>
             <a:pPr lvl="1"/>
@@ -2957,7 +2937,6 @@
               <a:rPr lang="zh-CN" altLang="en-US"/>
               <a:t>第二级</a:t>
             </a:r>
-            <a:endParaRPr lang="zh-CN" altLang="en-US"/>
           </a:p>
           <a:p>
             <a:pPr lvl="2"/>
@@ -2965,7 +2944,6 @@
               <a:rPr lang="zh-CN" altLang="en-US"/>
               <a:t>第三级</a:t>
             </a:r>
-            <a:endParaRPr lang="zh-CN" altLang="en-US"/>
           </a:p>
           <a:p>
             <a:pPr lvl="3"/>
@@ -2973,7 +2951,6 @@
               <a:rPr lang="zh-CN" altLang="en-US"/>
               <a:t>第四级</a:t>
             </a:r>
-            <a:endParaRPr lang="zh-CN" altLang="en-US"/>
           </a:p>
           <a:p>
             <a:pPr lvl="4"/>
@@ -2981,7 +2958,6 @@
               <a:rPr lang="zh-CN" altLang="en-US"/>
               <a:t>第五级</a:t>
             </a:r>
-            <a:endParaRPr lang="zh-CN" altLang="en-US"/>
           </a:p>
         </p:txBody>
       </p:sp>
@@ -3002,6 +2978,7 @@
           <a:p>
             <a:fld id="{FC19A4FA-3D9A-4114-B0D5-759CBD56F1AB}" type="datetimeFigureOut">
               <a:rPr lang="zh-CN" altLang="en-US" smtClean="0"/>
+              <a:t>2021/9/17</a:t>
             </a:fld>
             <a:endParaRPr lang="zh-CN" altLang="en-US"/>
           </a:p>
@@ -3043,6 +3020,7 @@
           <a:p>
             <a:fld id="{506F4176-339E-4C4B-80E4-BBE9C4467EFE}" type="slidenum">
               <a:rPr lang="zh-CN" altLang="en-US" smtClean="0"/>
+              <a:t>‹#›</a:t>
             </a:fld>
             <a:endParaRPr lang="zh-CN" altLang="en-US"/>
           </a:p>
@@ -3129,7 +3107,6 @@
               <a:rPr lang="zh-CN" altLang="en-US"/>
               <a:t>单击此处编辑母版标题样式</a:t>
             </a:r>
-            <a:endParaRPr lang="zh-CN" altLang="en-US"/>
           </a:p>
         </p:txBody>
       </p:sp>
@@ -3249,7 +3226,6 @@
               <a:rPr lang="zh-CN" altLang="en-US"/>
               <a:t>单击此处编辑母版文本样式</a:t>
             </a:r>
-            <a:endParaRPr lang="zh-CN" altLang="en-US"/>
           </a:p>
         </p:txBody>
       </p:sp>
@@ -3270,6 +3246,7 @@
           <a:p>
             <a:fld id="{FC19A4FA-3D9A-4114-B0D5-759CBD56F1AB}" type="datetimeFigureOut">
               <a:rPr lang="zh-CN" altLang="en-US" smtClean="0"/>
+              <a:t>2021/9/17</a:t>
             </a:fld>
             <a:endParaRPr lang="zh-CN" altLang="en-US"/>
           </a:p>
@@ -3311,6 +3288,7 @@
           <a:p>
             <a:fld id="{506F4176-339E-4C4B-80E4-BBE9C4467EFE}" type="slidenum">
               <a:rPr lang="zh-CN" altLang="en-US" smtClean="0"/>
+              <a:t>‹#›</a:t>
             </a:fld>
             <a:endParaRPr lang="zh-CN" altLang="en-US"/>
           </a:p>
@@ -3388,7 +3366,6 @@
               <a:rPr lang="zh-CN" altLang="en-US"/>
               <a:t>单击此处编辑母版标题样式</a:t>
             </a:r>
-            <a:endParaRPr lang="zh-CN" altLang="en-US"/>
           </a:p>
         </p:txBody>
       </p:sp>
@@ -3409,6 +3386,7 @@
           <a:p>
             <a:fld id="{FC19A4FA-3D9A-4114-B0D5-759CBD56F1AB}" type="datetimeFigureOut">
               <a:rPr lang="zh-CN" altLang="en-US" smtClean="0"/>
+              <a:t>2021/9/17</a:t>
             </a:fld>
             <a:endParaRPr lang="zh-CN" altLang="en-US"/>
           </a:p>
@@ -3450,6 +3428,7 @@
           <a:p>
             <a:fld id="{506F4176-339E-4C4B-80E4-BBE9C4467EFE}" type="slidenum">
               <a:rPr lang="zh-CN" altLang="en-US" smtClean="0"/>
+              <a:t>‹#›</a:t>
             </a:fld>
             <a:endParaRPr lang="zh-CN" altLang="en-US"/>
           </a:p>
@@ -3497,6 +3476,7 @@
           <a:p>
             <a:fld id="{FC19A4FA-3D9A-4114-B0D5-759CBD56F1AB}" type="datetimeFigureOut">
               <a:rPr lang="zh-CN" altLang="en-US" smtClean="0"/>
+              <a:t>2021/9/17</a:t>
             </a:fld>
             <a:endParaRPr lang="zh-CN" altLang="en-US"/>
           </a:p>
@@ -3538,6 +3518,7 @@
           <a:p>
             <a:fld id="{506F4176-339E-4C4B-80E4-BBE9C4467EFE}" type="slidenum">
               <a:rPr lang="zh-CN" altLang="en-US" smtClean="0"/>
+              <a:t>‹#›</a:t>
             </a:fld>
             <a:endParaRPr lang="zh-CN" altLang="en-US"/>
           </a:p>
@@ -3596,7 +3577,6 @@
               <a:rPr lang="zh-CN" altLang="en-US"/>
               <a:t>单击此处编辑母版标题样式</a:t>
             </a:r>
-            <a:endParaRPr lang="zh-CN" altLang="en-US"/>
           </a:p>
         </p:txBody>
       </p:sp>
@@ -3653,7 +3633,6 @@
               <a:rPr lang="zh-CN" altLang="en-US"/>
               <a:t>单击此处编辑母版文本样式</a:t>
             </a:r>
-            <a:endParaRPr lang="zh-CN" altLang="en-US"/>
           </a:p>
           <a:p>
             <a:pPr lvl="1"/>
@@ -3661,7 +3640,6 @@
               <a:rPr lang="zh-CN" altLang="en-US"/>
               <a:t>第二级</a:t>
             </a:r>
-            <a:endParaRPr lang="zh-CN" altLang="en-US"/>
           </a:p>
           <a:p>
             <a:pPr lvl="2"/>
@@ -3669,7 +3647,6 @@
               <a:rPr lang="zh-CN" altLang="en-US"/>
               <a:t>第三级</a:t>
             </a:r>
-            <a:endParaRPr lang="zh-CN" altLang="en-US"/>
           </a:p>
           <a:p>
             <a:pPr lvl="3"/>
@@ -3677,7 +3654,6 @@
               <a:rPr lang="zh-CN" altLang="en-US"/>
               <a:t>第四级</a:t>
             </a:r>
-            <a:endParaRPr lang="zh-CN" altLang="en-US"/>
           </a:p>
           <a:p>
             <a:pPr lvl="4"/>
@@ -3685,7 +3661,6 @@
               <a:rPr lang="zh-CN" altLang="en-US"/>
               <a:t>第五级</a:t>
             </a:r>
-            <a:endParaRPr lang="zh-CN" altLang="en-US"/>
           </a:p>
         </p:txBody>
       </p:sp>
@@ -3751,7 +3726,6 @@
               <a:rPr lang="zh-CN" altLang="en-US"/>
               <a:t>单击此处编辑母版文本样式</a:t>
             </a:r>
-            <a:endParaRPr lang="zh-CN" altLang="en-US"/>
           </a:p>
         </p:txBody>
       </p:sp>
@@ -3772,6 +3746,7 @@
           <a:p>
             <a:fld id="{FC19A4FA-3D9A-4114-B0D5-759CBD56F1AB}" type="datetimeFigureOut">
               <a:rPr lang="zh-CN" altLang="en-US" smtClean="0"/>
+              <a:t>2021/9/17</a:t>
             </a:fld>
             <a:endParaRPr lang="zh-CN" altLang="en-US"/>
           </a:p>
@@ -3813,6 +3788,7 @@
           <a:p>
             <a:fld id="{506F4176-339E-4C4B-80E4-BBE9C4467EFE}" type="slidenum">
               <a:rPr lang="zh-CN" altLang="en-US" smtClean="0"/>
+              <a:t>‹#›</a:t>
             </a:fld>
             <a:endParaRPr lang="zh-CN" altLang="en-US"/>
           </a:p>
@@ -3867,7 +3843,6 @@
               <a:rPr lang="zh-CN" altLang="en-US" dirty="0"/>
               <a:t>单击此处编辑母版标题样式</a:t>
             </a:r>
-            <a:endParaRPr lang="zh-CN" altLang="en-US" dirty="0"/>
           </a:p>
         </p:txBody>
       </p:sp>
@@ -3907,7 +3882,6 @@
               <a:rPr lang="zh-CN" altLang="en-US" dirty="0"/>
               <a:t>单击此处编辑母版文本样式</a:t>
             </a:r>
-            <a:endParaRPr lang="zh-CN" altLang="en-US" dirty="0"/>
           </a:p>
           <a:p>
             <a:pPr lvl="1"/>
@@ -3915,7 +3889,6 @@
               <a:rPr lang="zh-CN" altLang="en-US" dirty="0"/>
               <a:t>第二级</a:t>
             </a:r>
-            <a:endParaRPr lang="zh-CN" altLang="en-US" dirty="0"/>
           </a:p>
           <a:p>
             <a:pPr lvl="2"/>
@@ -3923,7 +3896,6 @@
               <a:rPr lang="zh-CN" altLang="en-US" dirty="0"/>
               <a:t>第三级</a:t>
             </a:r>
-            <a:endParaRPr lang="zh-CN" altLang="en-US" dirty="0"/>
           </a:p>
           <a:p>
             <a:pPr lvl="3"/>
@@ -3931,7 +3903,6 @@
               <a:rPr lang="zh-CN" altLang="en-US" dirty="0"/>
               <a:t>第四级</a:t>
             </a:r>
-            <a:endParaRPr lang="zh-CN" altLang="en-US" dirty="0"/>
           </a:p>
           <a:p>
             <a:pPr lvl="4"/>
@@ -3939,7 +3910,6 @@
               <a:rPr lang="zh-CN" altLang="en-US" dirty="0"/>
               <a:t>第五级</a:t>
             </a:r>
-            <a:endParaRPr lang="zh-CN" altLang="en-US" dirty="0"/>
           </a:p>
         </p:txBody>
       </p:sp>
@@ -3960,6 +3930,7 @@
           <a:p>
             <a:fld id="{FC19A4FA-3D9A-4114-B0D5-759CBD56F1AB}" type="datetimeFigureOut">
               <a:rPr lang="zh-CN" altLang="en-US" smtClean="0"/>
+              <a:t>2021/9/17</a:t>
             </a:fld>
             <a:endParaRPr lang="zh-CN" altLang="en-US"/>
           </a:p>
@@ -4001,6 +3972,7 @@
           <a:p>
             <a:fld id="{506F4176-339E-4C4B-80E4-BBE9C4467EFE}" type="slidenum">
               <a:rPr lang="zh-CN" altLang="en-US" smtClean="0"/>
+              <a:t>‹#›</a:t>
             </a:fld>
             <a:endParaRPr lang="zh-CN" altLang="en-US"/>
           </a:p>
@@ -4087,7 +4059,6 @@
               <a:rPr lang="zh-CN" altLang="en-US"/>
               <a:t>单击此处编辑母版标题样式</a:t>
             </a:r>
-            <a:endParaRPr lang="zh-CN" altLang="en-US"/>
           </a:p>
         </p:txBody>
       </p:sp>
@@ -4214,7 +4185,6 @@
               <a:rPr lang="zh-CN" altLang="en-US"/>
               <a:t>单击此处编辑母版文本样式</a:t>
             </a:r>
-            <a:endParaRPr lang="zh-CN" altLang="en-US"/>
           </a:p>
         </p:txBody>
       </p:sp>
@@ -4235,6 +4205,7 @@
           <a:p>
             <a:fld id="{FC19A4FA-3D9A-4114-B0D5-759CBD56F1AB}" type="datetimeFigureOut">
               <a:rPr lang="zh-CN" altLang="en-US" smtClean="0"/>
+              <a:t>2021/9/17</a:t>
             </a:fld>
             <a:endParaRPr lang="zh-CN" altLang="en-US"/>
           </a:p>
@@ -4276,6 +4247,7 @@
           <a:p>
             <a:fld id="{506F4176-339E-4C4B-80E4-BBE9C4467EFE}" type="slidenum">
               <a:rPr lang="zh-CN" altLang="en-US" smtClean="0"/>
+              <a:t>‹#›</a:t>
             </a:fld>
             <a:endParaRPr lang="zh-CN" altLang="en-US"/>
           </a:p>
@@ -4325,7 +4297,6 @@
               <a:rPr lang="zh-CN" altLang="en-US"/>
               <a:t>单击此处编辑母版标题样式</a:t>
             </a:r>
-            <a:endParaRPr lang="zh-CN" altLang="en-US"/>
           </a:p>
         </p:txBody>
       </p:sp>
@@ -4349,7 +4320,6 @@
               <a:rPr lang="zh-CN" altLang="en-US"/>
               <a:t>单击此处编辑母版文本样式</a:t>
             </a:r>
-            <a:endParaRPr lang="zh-CN" altLang="en-US"/>
           </a:p>
           <a:p>
             <a:pPr lvl="1"/>
@@ -4357,7 +4327,6 @@
               <a:rPr lang="zh-CN" altLang="en-US"/>
               <a:t>第二级</a:t>
             </a:r>
-            <a:endParaRPr lang="zh-CN" altLang="en-US"/>
           </a:p>
           <a:p>
             <a:pPr lvl="2"/>
@@ -4365,7 +4334,6 @@
               <a:rPr lang="zh-CN" altLang="en-US"/>
               <a:t>第三级</a:t>
             </a:r>
-            <a:endParaRPr lang="zh-CN" altLang="en-US"/>
           </a:p>
           <a:p>
             <a:pPr lvl="3"/>
@@ -4373,7 +4341,6 @@
               <a:rPr lang="zh-CN" altLang="en-US"/>
               <a:t>第四级</a:t>
             </a:r>
-            <a:endParaRPr lang="zh-CN" altLang="en-US"/>
           </a:p>
           <a:p>
             <a:pPr lvl="4"/>
@@ -4381,7 +4348,6 @@
               <a:rPr lang="zh-CN" altLang="en-US"/>
               <a:t>第五级</a:t>
             </a:r>
-            <a:endParaRPr lang="zh-CN" altLang="en-US"/>
           </a:p>
         </p:txBody>
       </p:sp>
@@ -4402,6 +4368,7 @@
           <a:p>
             <a:fld id="{FC19A4FA-3D9A-4114-B0D5-759CBD56F1AB}" type="datetimeFigureOut">
               <a:rPr lang="zh-CN" altLang="en-US" smtClean="0"/>
+              <a:t>2021/9/17</a:t>
             </a:fld>
             <a:endParaRPr lang="zh-CN" altLang="en-US"/>
           </a:p>
@@ -4443,6 +4410,7 @@
           <a:p>
             <a:fld id="{506F4176-339E-4C4B-80E4-BBE9C4467EFE}" type="slidenum">
               <a:rPr lang="zh-CN" altLang="en-US" smtClean="0"/>
+              <a:t>‹#›</a:t>
             </a:fld>
             <a:endParaRPr lang="zh-CN" altLang="en-US"/>
           </a:p>
@@ -4497,7 +4465,6 @@
               <a:rPr lang="zh-CN" altLang="en-US"/>
               <a:t>单击此处编辑母版标题样式</a:t>
             </a:r>
-            <a:endParaRPr lang="zh-CN" altLang="en-US"/>
           </a:p>
         </p:txBody>
       </p:sp>
@@ -4526,7 +4493,6 @@
               <a:rPr lang="zh-CN" altLang="en-US"/>
               <a:t>单击此处编辑母版文本样式</a:t>
             </a:r>
-            <a:endParaRPr lang="zh-CN" altLang="en-US"/>
           </a:p>
           <a:p>
             <a:pPr lvl="1"/>
@@ -4534,7 +4500,6 @@
               <a:rPr lang="zh-CN" altLang="en-US"/>
               <a:t>第二级</a:t>
             </a:r>
-            <a:endParaRPr lang="zh-CN" altLang="en-US"/>
           </a:p>
           <a:p>
             <a:pPr lvl="2"/>
@@ -4542,7 +4507,6 @@
               <a:rPr lang="zh-CN" altLang="en-US"/>
               <a:t>第三级</a:t>
             </a:r>
-            <a:endParaRPr lang="zh-CN" altLang="en-US"/>
           </a:p>
           <a:p>
             <a:pPr lvl="3"/>
@@ -4550,7 +4514,6 @@
               <a:rPr lang="zh-CN" altLang="en-US"/>
               <a:t>第四级</a:t>
             </a:r>
-            <a:endParaRPr lang="zh-CN" altLang="en-US"/>
           </a:p>
           <a:p>
             <a:pPr lvl="4"/>
@@ -4558,7 +4521,6 @@
               <a:rPr lang="zh-CN" altLang="en-US"/>
               <a:t>第五级</a:t>
             </a:r>
-            <a:endParaRPr lang="zh-CN" altLang="en-US"/>
           </a:p>
         </p:txBody>
       </p:sp>
@@ -4579,6 +4541,7 @@
           <a:p>
             <a:fld id="{FC19A4FA-3D9A-4114-B0D5-759CBD56F1AB}" type="datetimeFigureOut">
               <a:rPr lang="zh-CN" altLang="en-US" smtClean="0"/>
+              <a:t>2021/9/17</a:t>
             </a:fld>
             <a:endParaRPr lang="zh-CN" altLang="en-US"/>
           </a:p>
@@ -4620,6 +4583,7 @@
           <a:p>
             <a:fld id="{506F4176-339E-4C4B-80E4-BBE9C4467EFE}" type="slidenum">
               <a:rPr lang="zh-CN" altLang="en-US" smtClean="0"/>
+              <a:t>‹#›</a:t>
             </a:fld>
             <a:endParaRPr lang="zh-CN" altLang="en-US"/>
           </a:p>
@@ -4674,7 +4638,6 @@
               <a:rPr lang="zh-CN" altLang="en-US"/>
               <a:t>单击此处编辑母版标题样式</a:t>
             </a:r>
-            <a:endParaRPr lang="zh-CN" altLang="en-US"/>
           </a:p>
         </p:txBody>
       </p:sp>
@@ -4703,7 +4666,6 @@
               <a:rPr lang="zh-CN" altLang="en-US"/>
               <a:t>单击此处编辑母版文本样式</a:t>
             </a:r>
-            <a:endParaRPr lang="zh-CN" altLang="en-US"/>
           </a:p>
           <a:p>
             <a:pPr lvl="1"/>
@@ -4711,7 +4673,6 @@
               <a:rPr lang="zh-CN" altLang="en-US"/>
               <a:t>第二级</a:t>
             </a:r>
-            <a:endParaRPr lang="zh-CN" altLang="en-US"/>
           </a:p>
           <a:p>
             <a:pPr lvl="2"/>
@@ -4719,7 +4680,6 @@
               <a:rPr lang="zh-CN" altLang="en-US"/>
               <a:t>第三级</a:t>
             </a:r>
-            <a:endParaRPr lang="zh-CN" altLang="en-US"/>
           </a:p>
           <a:p>
             <a:pPr lvl="3"/>
@@ -4727,7 +4687,6 @@
               <a:rPr lang="zh-CN" altLang="en-US"/>
               <a:t>第四级</a:t>
             </a:r>
-            <a:endParaRPr lang="zh-CN" altLang="en-US"/>
           </a:p>
           <a:p>
             <a:pPr lvl="4"/>
@@ -4735,7 +4694,6 @@
               <a:rPr lang="zh-CN" altLang="en-US"/>
               <a:t>第五级</a:t>
             </a:r>
-            <a:endParaRPr lang="zh-CN" altLang="en-US"/>
           </a:p>
         </p:txBody>
       </p:sp>
@@ -4764,7 +4722,6 @@
               <a:rPr lang="zh-CN" altLang="en-US"/>
               <a:t>单击此处编辑母版文本样式</a:t>
             </a:r>
-            <a:endParaRPr lang="zh-CN" altLang="en-US"/>
           </a:p>
           <a:p>
             <a:pPr lvl="1"/>
@@ -4772,7 +4729,6 @@
               <a:rPr lang="zh-CN" altLang="en-US"/>
               <a:t>第二级</a:t>
             </a:r>
-            <a:endParaRPr lang="zh-CN" altLang="en-US"/>
           </a:p>
           <a:p>
             <a:pPr lvl="2"/>
@@ -4780,7 +4736,6 @@
               <a:rPr lang="zh-CN" altLang="en-US"/>
               <a:t>第三级</a:t>
             </a:r>
-            <a:endParaRPr lang="zh-CN" altLang="en-US"/>
           </a:p>
           <a:p>
             <a:pPr lvl="3"/>
@@ -4788,7 +4743,6 @@
               <a:rPr lang="zh-CN" altLang="en-US"/>
               <a:t>第四级</a:t>
             </a:r>
-            <a:endParaRPr lang="zh-CN" altLang="en-US"/>
           </a:p>
           <a:p>
             <a:pPr lvl="4"/>
@@ -4796,7 +4750,6 @@
               <a:rPr lang="zh-CN" altLang="en-US"/>
               <a:t>第五级</a:t>
             </a:r>
-            <a:endParaRPr lang="zh-CN" altLang="en-US"/>
           </a:p>
         </p:txBody>
       </p:sp>
@@ -4817,6 +4770,7 @@
           <a:p>
             <a:fld id="{FC19A4FA-3D9A-4114-B0D5-759CBD56F1AB}" type="datetimeFigureOut">
               <a:rPr lang="zh-CN" altLang="en-US" smtClean="0"/>
+              <a:t>2021/9/17</a:t>
             </a:fld>
             <a:endParaRPr lang="zh-CN" altLang="en-US"/>
           </a:p>
@@ -4858,6 +4812,7 @@
           <a:p>
             <a:fld id="{506F4176-339E-4C4B-80E4-BBE9C4467EFE}" type="slidenum">
               <a:rPr lang="zh-CN" altLang="en-US" smtClean="0"/>
+              <a:t>‹#›</a:t>
             </a:fld>
             <a:endParaRPr lang="zh-CN" altLang="en-US"/>
           </a:p>
@@ -4940,7 +4895,6 @@
               <a:rPr lang="zh-CN" altLang="en-US"/>
               <a:t>单击此处编辑母版标题样式</a:t>
             </a:r>
-            <a:endParaRPr lang="zh-CN" altLang="en-US"/>
           </a:p>
         </p:txBody>
       </p:sp>
@@ -5006,7 +4960,6 @@
               <a:rPr lang="zh-CN" altLang="en-US"/>
               <a:t>单击此处编辑母版文本样式</a:t>
             </a:r>
-            <a:endParaRPr lang="zh-CN" altLang="en-US"/>
           </a:p>
         </p:txBody>
       </p:sp>
@@ -5035,7 +4988,6 @@
               <a:rPr lang="zh-CN" altLang="en-US"/>
               <a:t>单击此处编辑母版文本样式</a:t>
             </a:r>
-            <a:endParaRPr lang="zh-CN" altLang="en-US"/>
           </a:p>
           <a:p>
             <a:pPr lvl="1"/>
@@ -5043,7 +4995,6 @@
               <a:rPr lang="zh-CN" altLang="en-US"/>
               <a:t>第二级</a:t>
             </a:r>
-            <a:endParaRPr lang="zh-CN" altLang="en-US"/>
           </a:p>
           <a:p>
             <a:pPr lvl="2"/>
@@ -5051,7 +5002,6 @@
               <a:rPr lang="zh-CN" altLang="en-US"/>
               <a:t>第三级</a:t>
             </a:r>
-            <a:endParaRPr lang="zh-CN" altLang="en-US"/>
           </a:p>
           <a:p>
             <a:pPr lvl="3"/>
@@ -5059,7 +5009,6 @@
               <a:rPr lang="zh-CN" altLang="en-US"/>
               <a:t>第四级</a:t>
             </a:r>
-            <a:endParaRPr lang="zh-CN" altLang="en-US"/>
           </a:p>
           <a:p>
             <a:pPr lvl="4"/>
@@ -5067,7 +5016,6 @@
               <a:rPr lang="zh-CN" altLang="en-US"/>
               <a:t>第五级</a:t>
             </a:r>
-            <a:endParaRPr lang="zh-CN" altLang="en-US"/>
           </a:p>
         </p:txBody>
       </p:sp>
@@ -5133,7 +5081,6 @@
               <a:rPr lang="zh-CN" altLang="en-US"/>
               <a:t>单击此处编辑母版文本样式</a:t>
             </a:r>
-            <a:endParaRPr lang="zh-CN" altLang="en-US"/>
           </a:p>
         </p:txBody>
       </p:sp>
@@ -5162,7 +5109,6 @@
               <a:rPr lang="zh-CN" altLang="en-US"/>
               <a:t>单击此处编辑母版文本样式</a:t>
             </a:r>
-            <a:endParaRPr lang="zh-CN" altLang="en-US"/>
           </a:p>
           <a:p>
             <a:pPr lvl="1"/>
@@ -5170,7 +5116,6 @@
               <a:rPr lang="zh-CN" altLang="en-US"/>
               <a:t>第二级</a:t>
             </a:r>
-            <a:endParaRPr lang="zh-CN" altLang="en-US"/>
           </a:p>
           <a:p>
             <a:pPr lvl="2"/>
@@ -5178,7 +5123,6 @@
               <a:rPr lang="zh-CN" altLang="en-US"/>
               <a:t>第三级</a:t>
             </a:r>
-            <a:endParaRPr lang="zh-CN" altLang="en-US"/>
           </a:p>
           <a:p>
             <a:pPr lvl="3"/>
@@ -5186,7 +5130,6 @@
               <a:rPr lang="zh-CN" altLang="en-US"/>
               <a:t>第四级</a:t>
             </a:r>
-            <a:endParaRPr lang="zh-CN" altLang="en-US"/>
           </a:p>
           <a:p>
             <a:pPr lvl="4"/>
@@ -5194,7 +5137,6 @@
               <a:rPr lang="zh-CN" altLang="en-US"/>
               <a:t>第五级</a:t>
             </a:r>
-            <a:endParaRPr lang="zh-CN" altLang="en-US"/>
           </a:p>
         </p:txBody>
       </p:sp>
@@ -5215,6 +5157,7 @@
           <a:p>
             <a:fld id="{FC19A4FA-3D9A-4114-B0D5-759CBD56F1AB}" type="datetimeFigureOut">
               <a:rPr lang="zh-CN" altLang="en-US" smtClean="0"/>
+              <a:t>2021/9/17</a:t>
             </a:fld>
             <a:endParaRPr lang="zh-CN" altLang="en-US"/>
           </a:p>
@@ -5256,6 +5199,7 @@
           <a:p>
             <a:fld id="{506F4176-339E-4C4B-80E4-BBE9C4467EFE}" type="slidenum">
               <a:rPr lang="zh-CN" altLang="en-US" smtClean="0"/>
+              <a:t>‹#›</a:t>
             </a:fld>
             <a:endParaRPr lang="zh-CN" altLang="en-US"/>
           </a:p>
@@ -5342,7 +5286,6 @@
               <a:rPr lang="zh-CN" altLang="en-US"/>
               <a:t>单击此处编辑母版标题样式</a:t>
             </a:r>
-            <a:endParaRPr lang="zh-CN" altLang="en-US"/>
           </a:p>
         </p:txBody>
       </p:sp>
@@ -5462,7 +5405,6 @@
               <a:rPr lang="zh-CN" altLang="en-US"/>
               <a:t>单击此处编辑母版文本样式</a:t>
             </a:r>
-            <a:endParaRPr lang="zh-CN" altLang="en-US"/>
           </a:p>
         </p:txBody>
       </p:sp>
@@ -5483,6 +5425,7 @@
           <a:p>
             <a:fld id="{FC19A4FA-3D9A-4114-B0D5-759CBD56F1AB}" type="datetimeFigureOut">
               <a:rPr lang="zh-CN" altLang="en-US" smtClean="0"/>
+              <a:t>2021/9/17</a:t>
             </a:fld>
             <a:endParaRPr lang="zh-CN" altLang="en-US"/>
           </a:p>
@@ -5524,6 +5467,7 @@
           <a:p>
             <a:fld id="{506F4176-339E-4C4B-80E4-BBE9C4467EFE}" type="slidenum">
               <a:rPr lang="zh-CN" altLang="en-US" smtClean="0"/>
+              <a:t>‹#›</a:t>
             </a:fld>
             <a:endParaRPr lang="zh-CN" altLang="en-US"/>
           </a:p>
@@ -5601,7 +5545,6 @@
               <a:rPr lang="zh-CN" altLang="en-US"/>
               <a:t>单击此处编辑母版标题样式</a:t>
             </a:r>
-            <a:endParaRPr lang="zh-CN" altLang="en-US"/>
           </a:p>
         </p:txBody>
       </p:sp>
@@ -5622,6 +5565,7 @@
           <a:p>
             <a:fld id="{FC19A4FA-3D9A-4114-B0D5-759CBD56F1AB}" type="datetimeFigureOut">
               <a:rPr lang="zh-CN" altLang="en-US" smtClean="0"/>
+              <a:t>2021/9/17</a:t>
             </a:fld>
             <a:endParaRPr lang="zh-CN" altLang="en-US"/>
           </a:p>
@@ -5663,6 +5607,7 @@
           <a:p>
             <a:fld id="{506F4176-339E-4C4B-80E4-BBE9C4467EFE}" type="slidenum">
               <a:rPr lang="zh-CN" altLang="en-US" smtClean="0"/>
+              <a:t>‹#›</a:t>
             </a:fld>
             <a:endParaRPr lang="zh-CN" altLang="en-US"/>
           </a:p>
@@ -5710,6 +5655,7 @@
           <a:p>
             <a:fld id="{FC19A4FA-3D9A-4114-B0D5-759CBD56F1AB}" type="datetimeFigureOut">
               <a:rPr lang="zh-CN" altLang="en-US" smtClean="0"/>
+              <a:t>2021/9/17</a:t>
             </a:fld>
             <a:endParaRPr lang="zh-CN" altLang="en-US"/>
           </a:p>
@@ -5751,6 +5697,7 @@
           <a:p>
             <a:fld id="{506F4176-339E-4C4B-80E4-BBE9C4467EFE}" type="slidenum">
               <a:rPr lang="zh-CN" altLang="en-US" smtClean="0"/>
+              <a:t>‹#›</a:t>
             </a:fld>
             <a:endParaRPr lang="zh-CN" altLang="en-US"/>
           </a:p>
@@ -5809,7 +5756,6 @@
               <a:rPr lang="zh-CN" altLang="en-US"/>
               <a:t>单击此处编辑母版标题样式</a:t>
             </a:r>
-            <a:endParaRPr lang="zh-CN" altLang="en-US"/>
           </a:p>
         </p:txBody>
       </p:sp>
@@ -5866,7 +5812,6 @@
               <a:rPr lang="zh-CN" altLang="en-US"/>
               <a:t>单击此处编辑母版文本样式</a:t>
             </a:r>
-            <a:endParaRPr lang="zh-CN" altLang="en-US"/>
           </a:p>
           <a:p>
             <a:pPr lvl="1"/>
@@ -5874,7 +5819,6 @@
               <a:rPr lang="zh-CN" altLang="en-US"/>
               <a:t>第二级</a:t>
             </a:r>
-            <a:endParaRPr lang="zh-CN" altLang="en-US"/>
           </a:p>
           <a:p>
             <a:pPr lvl="2"/>
@@ -5882,7 +5826,6 @@
               <a:rPr lang="zh-CN" altLang="en-US"/>
               <a:t>第三级</a:t>
             </a:r>
-            <a:endParaRPr lang="zh-CN" altLang="en-US"/>
           </a:p>
           <a:p>
             <a:pPr lvl="3"/>
@@ -5890,7 +5833,6 @@
               <a:rPr lang="zh-CN" altLang="en-US"/>
               <a:t>第四级</a:t>
             </a:r>
-            <a:endParaRPr lang="zh-CN" altLang="en-US"/>
           </a:p>
           <a:p>
             <a:pPr lvl="4"/>
@@ -5898,7 +5840,6 @@
               <a:rPr lang="zh-CN" altLang="en-US"/>
               <a:t>第五级</a:t>
             </a:r>
-            <a:endParaRPr lang="zh-CN" altLang="en-US"/>
           </a:p>
         </p:txBody>
       </p:sp>
@@ -5964,7 +5905,6 @@
               <a:rPr lang="zh-CN" altLang="en-US"/>
               <a:t>单击此处编辑母版文本样式</a:t>
             </a:r>
-            <a:endParaRPr lang="zh-CN" altLang="en-US"/>
           </a:p>
         </p:txBody>
       </p:sp>
@@ -5985,6 +5925,7 @@
           <a:p>
             <a:fld id="{FC19A4FA-3D9A-4114-B0D5-759CBD56F1AB}" type="datetimeFigureOut">
               <a:rPr lang="zh-CN" altLang="en-US" smtClean="0"/>
+              <a:t>2021/9/17</a:t>
             </a:fld>
             <a:endParaRPr lang="zh-CN" altLang="en-US"/>
           </a:p>
@@ -6026,6 +5967,7 @@
           <a:p>
             <a:fld id="{506F4176-339E-4C4B-80E4-BBE9C4467EFE}" type="slidenum">
               <a:rPr lang="zh-CN" altLang="en-US" smtClean="0"/>
+              <a:t>‹#›</a:t>
             </a:fld>
             <a:endParaRPr lang="zh-CN" altLang="en-US"/>
           </a:p>
@@ -6084,7 +6026,6 @@
               <a:rPr lang="zh-CN" altLang="en-US"/>
               <a:t>单击此处编辑母版标题样式</a:t>
             </a:r>
-            <a:endParaRPr lang="zh-CN" altLang="en-US"/>
           </a:p>
         </p:txBody>
       </p:sp>
@@ -6211,7 +6152,6 @@
               <a:rPr lang="zh-CN" altLang="en-US"/>
               <a:t>单击此处编辑母版文本样式</a:t>
             </a:r>
-            <a:endParaRPr lang="zh-CN" altLang="en-US"/>
           </a:p>
         </p:txBody>
       </p:sp>
@@ -6232,6 +6172,7 @@
           <a:p>
             <a:fld id="{FC19A4FA-3D9A-4114-B0D5-759CBD56F1AB}" type="datetimeFigureOut">
               <a:rPr lang="zh-CN" altLang="en-US" smtClean="0"/>
+              <a:t>2021/9/17</a:t>
             </a:fld>
             <a:endParaRPr lang="zh-CN" altLang="en-US"/>
           </a:p>
@@ -6273,6 +6214,7 @@
           <a:p>
             <a:fld id="{506F4176-339E-4C4B-80E4-BBE9C4467EFE}" type="slidenum">
               <a:rPr lang="zh-CN" altLang="en-US" smtClean="0"/>
+              <a:t>‹#›</a:t>
             </a:fld>
             <a:endParaRPr lang="zh-CN" altLang="en-US"/>
           </a:p>
@@ -6337,7 +6279,6 @@
               <a:rPr lang="zh-CN" altLang="en-US" dirty="0"/>
               <a:t>单击此处编辑母版标题样式</a:t>
             </a:r>
-            <a:endParaRPr lang="zh-CN" altLang="en-US" dirty="0"/>
           </a:p>
         </p:txBody>
       </p:sp>
@@ -6371,7 +6312,6 @@
               <a:rPr lang="zh-CN" altLang="en-US" dirty="0"/>
               <a:t>单击此处编辑母版文本样式</a:t>
             </a:r>
-            <a:endParaRPr lang="zh-CN" altLang="en-US" dirty="0"/>
           </a:p>
           <a:p>
             <a:pPr lvl="1"/>
@@ -6379,7 +6319,6 @@
               <a:rPr lang="zh-CN" altLang="en-US" dirty="0"/>
               <a:t>第二级</a:t>
             </a:r>
-            <a:endParaRPr lang="zh-CN" altLang="en-US" dirty="0"/>
           </a:p>
           <a:p>
             <a:pPr lvl="2"/>
@@ -6387,7 +6326,6 @@
               <a:rPr lang="zh-CN" altLang="en-US" dirty="0"/>
               <a:t>第三级</a:t>
             </a:r>
-            <a:endParaRPr lang="zh-CN" altLang="en-US" dirty="0"/>
           </a:p>
           <a:p>
             <a:pPr lvl="3"/>
@@ -6395,7 +6333,6 @@
               <a:rPr lang="zh-CN" altLang="en-US" dirty="0"/>
               <a:t>第四级</a:t>
             </a:r>
-            <a:endParaRPr lang="zh-CN" altLang="en-US" dirty="0"/>
           </a:p>
           <a:p>
             <a:pPr lvl="4"/>
@@ -6403,7 +6340,6 @@
               <a:rPr lang="zh-CN" altLang="en-US" dirty="0"/>
               <a:t>第五级</a:t>
             </a:r>
-            <a:endParaRPr lang="zh-CN" altLang="en-US" dirty="0"/>
           </a:p>
         </p:txBody>
       </p:sp>
@@ -6442,6 +6378,7 @@
           <a:p>
             <a:fld id="{FC19A4FA-3D9A-4114-B0D5-759CBD56F1AB}" type="datetimeFigureOut">
               <a:rPr lang="zh-CN" altLang="en-US" smtClean="0"/>
+              <a:t>2021/9/17</a:t>
             </a:fld>
             <a:endParaRPr lang="zh-CN" altLang="en-US"/>
           </a:p>
@@ -6519,6 +6456,7 @@
           <a:p>
             <a:fld id="{506F4176-339E-4C4B-80E4-BBE9C4467EFE}" type="slidenum">
               <a:rPr lang="zh-CN" altLang="en-US" smtClean="0"/>
+              <a:t>‹#›</a:t>
             </a:fld>
             <a:endParaRPr lang="zh-CN" altLang="en-US"/>
           </a:p>
@@ -6533,7 +6471,7 @@
           <p:nvPr userDrawn="1"/>
         </p:nvPicPr>
         <p:blipFill>
-          <a:blip r:embed="rId12" cstate="print">
+          <a:blip r:embed="rId13" cstate="print">
             <a:extLst>
               <a:ext uri="{28A0092B-C50C-407E-A947-70E740481C1C}">
                 <a14:useLocalDpi xmlns:a14="http://schemas.microsoft.com/office/drawing/2010/main" val="0"/>
@@ -6915,7 +6853,6 @@
               <a:rPr lang="zh-CN" altLang="en-US" dirty="0"/>
               <a:t>单击此处编辑母版标题样式</a:t>
             </a:r>
-            <a:endParaRPr lang="zh-CN" altLang="en-US" dirty="0"/>
           </a:p>
         </p:txBody>
       </p:sp>
@@ -6949,7 +6886,6 @@
               <a:rPr lang="zh-CN" altLang="en-US" dirty="0"/>
               <a:t>单击此处编辑母版文本样式</a:t>
             </a:r>
-            <a:endParaRPr lang="zh-CN" altLang="en-US" dirty="0"/>
           </a:p>
           <a:p>
             <a:pPr lvl="1"/>
@@ -6957,7 +6893,6 @@
               <a:rPr lang="zh-CN" altLang="en-US" dirty="0"/>
               <a:t>第二级</a:t>
             </a:r>
-            <a:endParaRPr lang="zh-CN" altLang="en-US" dirty="0"/>
           </a:p>
           <a:p>
             <a:pPr lvl="2"/>
@@ -6965,7 +6900,6 @@
               <a:rPr lang="zh-CN" altLang="en-US" dirty="0"/>
               <a:t>第三级</a:t>
             </a:r>
-            <a:endParaRPr lang="zh-CN" altLang="en-US" dirty="0"/>
           </a:p>
           <a:p>
             <a:pPr lvl="3"/>
@@ -6973,7 +6907,6 @@
               <a:rPr lang="zh-CN" altLang="en-US" dirty="0"/>
               <a:t>第四级</a:t>
             </a:r>
-            <a:endParaRPr lang="zh-CN" altLang="en-US" dirty="0"/>
           </a:p>
           <a:p>
             <a:pPr lvl="4"/>
@@ -6981,7 +6914,6 @@
               <a:rPr lang="zh-CN" altLang="en-US" dirty="0"/>
               <a:t>第五级</a:t>
             </a:r>
-            <a:endParaRPr lang="zh-CN" altLang="en-US" dirty="0"/>
           </a:p>
         </p:txBody>
       </p:sp>
@@ -7020,6 +6952,7 @@
           <a:p>
             <a:fld id="{FC19A4FA-3D9A-4114-B0D5-759CBD56F1AB}" type="datetimeFigureOut">
               <a:rPr lang="zh-CN" altLang="en-US" smtClean="0"/>
+              <a:t>2021/9/17</a:t>
             </a:fld>
             <a:endParaRPr lang="zh-CN" altLang="en-US"/>
           </a:p>
@@ -7097,6 +7030,7 @@
           <a:p>
             <a:fld id="{506F4176-339E-4C4B-80E4-BBE9C4467EFE}" type="slidenum">
               <a:rPr lang="zh-CN" altLang="en-US" smtClean="0"/>
+              <a:t>‹#›</a:t>
             </a:fld>
             <a:endParaRPr lang="zh-CN" altLang="en-US"/>
           </a:p>
@@ -7111,7 +7045,7 @@
           <p:nvPr userDrawn="1"/>
         </p:nvPicPr>
         <p:blipFill>
-          <a:blip r:embed="rId12" cstate="print">
+          <a:blip r:embed="rId13" cstate="print">
             <a:extLst>
               <a:ext uri="{28A0092B-C50C-407E-A947-70E740481C1C}">
                 <a14:useLocalDpi xmlns:a14="http://schemas.microsoft.com/office/drawing/2010/main" val="0"/>
@@ -7540,9 +7474,6 @@
               </a:rPr>
               <a:t>Loops and Branching Statements</a:t>
             </a:r>
-            <a:endParaRPr lang="en-US" altLang="zh-CN" sz="3600" dirty="0">
-              <a:latin typeface="Franklin Gothic Medium" panose="020B0603020102020204" pitchFamily="34" charset="0"/>
-            </a:endParaRPr>
           </a:p>
           <a:p>
             <a:endParaRPr lang="en-US" altLang="zh-CN" sz="3600" dirty="0">
@@ -7560,14 +7491,7 @@
                 <a:latin typeface="Franklin Gothic Medium" panose="020B0603020102020204" pitchFamily="34" charset="0"/>
                 <a:sym typeface="+mn-ea"/>
               </a:rPr>
-              <a:t>廖琪梅，</a:t>
-            </a:r>
-            <a:r>
-              <a:rPr lang="zh-CN" altLang="en-US" dirty="0">
-                <a:latin typeface="Franklin Gothic Medium" panose="020B0603020102020204" pitchFamily="34" charset="0"/>
-                <a:sym typeface="+mn-ea"/>
-              </a:rPr>
-              <a:t>王大兴</a:t>
+              <a:t>王大兴，廖琪梅</a:t>
             </a:r>
             <a:endParaRPr lang="en-US" altLang="zh-CN" dirty="0">
               <a:latin typeface="Franklin Gothic Medium" panose="020B0603020102020204" pitchFamily="34" charset="0"/>
@@ -7597,7 +7521,14 @@
         <p:cNvGrpSpPr/>
         <p:nvPr/>
       </p:nvGrpSpPr>
-      <p:grpSpPr/>
+      <p:grpSpPr>
+        <a:xfrm>
+          <a:off x="0" y="0"/>
+          <a:ext cx="0" cy="0"/>
+          <a:chOff x="0" y="0"/>
+          <a:chExt cx="0" cy="0"/>
+        </a:xfrm>
+      </p:grpSpPr>
       <p:sp>
         <p:nvSpPr>
           <p:cNvPr id="2" name="标题 1"/>
@@ -7611,18 +7542,13 @@
         <p:spPr/>
         <p:txBody>
           <a:bodyPr/>
+          <a:lstStyle/>
           <a:p>
             <a:r>
               <a:rPr lang="en-US" altLang="zh-CN">
                 <a:sym typeface="+mn-ea"/>
               </a:rPr>
-              <a:t>Making a calculator: </a:t>
-            </a:r>
-            <a:r>
-              <a:rPr lang="en-US" altLang="zh-CN">
-                <a:sym typeface="+mn-ea"/>
-              </a:rPr>
-              <a:t>Performance issue</a:t>
+              <a:t>Making a calculator: Performance issue</a:t>
             </a:r>
             <a:endParaRPr lang="zh-CN" altLang="en-US"/>
           </a:p>
@@ -7641,12 +7567,12 @@
         <p:spPr/>
         <p:txBody>
           <a:bodyPr/>
+          <a:lstStyle/>
           <a:p>
             <a:r>
               <a:rPr lang="en-US" altLang="zh-CN"/>
               <a:t>How to do multiplycations with reversely arranged array?</a:t>
             </a:r>
-            <a:endParaRPr lang="en-US" altLang="zh-CN"/>
           </a:p>
           <a:p>
             <a:r>
@@ -7661,7 +7587,6 @@
               <a:rPr lang="en-US" altLang="zh-CN"/>
               <a:t>)</a:t>
             </a:r>
-            <a:endParaRPr lang="en-US" altLang="zh-CN"/>
           </a:p>
         </p:txBody>
       </p:sp>
@@ -7704,6 +7629,7 @@
         </p:style>
         <p:txBody>
           <a:bodyPr rtlCol="0" anchor="ctr"/>
+          <a:lstStyle/>
           <a:p>
             <a:pPr algn="ctr"/>
             <a:endParaRPr lang="zh-CN" altLang="en-US"/>
@@ -7730,68 +7656,60 @@
           <a:bodyPr wrap="square" rtlCol="0">
             <a:spAutoFit/>
           </a:bodyPr>
+          <a:lstStyle/>
           <a:p>
             <a:r>
               <a:rPr lang="en-US" altLang="zh-CN" sz="2800"/>
               <a:t>for ( int i = 0; i &lt; a_size; ++ i ) {</a:t>
             </a:r>
-            <a:endParaRPr lang="en-US" altLang="zh-CN" sz="2800"/>
           </a:p>
           <a:p>
             <a:r>
               <a:rPr lang="en-US" altLang="zh-CN" sz="2800"/>
               <a:t>        for( int j = 0; j &lt; b_size; ++ j ) {</a:t>
             </a:r>
-            <a:endParaRPr lang="en-US" altLang="zh-CN" sz="2800"/>
           </a:p>
           <a:p>
             <a:r>
               <a:rPr lang="en-US" altLang="zh-CN" sz="2800"/>
               <a:t>                c[i+j] += a[i]*b[j];</a:t>
             </a:r>
-            <a:endParaRPr lang="en-US" altLang="zh-CN" sz="2800"/>
           </a:p>
           <a:p>
             <a:r>
               <a:rPr lang="en-US" altLang="zh-CN" sz="2800"/>
               <a:t>                if( c[i+j] &gt;= 10 ) {</a:t>
             </a:r>
-            <a:endParaRPr lang="en-US" altLang="zh-CN" sz="2800"/>
           </a:p>
           <a:p>
             <a:r>
               <a:rPr lang="en-US" altLang="zh-CN" sz="2800"/>
               <a:t>                        c[i+j+1] += c[i+j]/10;</a:t>
             </a:r>
-            <a:endParaRPr lang="en-US" altLang="zh-CN" sz="2800"/>
           </a:p>
           <a:p>
             <a:r>
               <a:rPr lang="en-US" altLang="zh-CN" sz="2800"/>
               <a:t>                        c[i+j] = c[i+j] % 10;</a:t>
             </a:r>
-            <a:endParaRPr lang="en-US" altLang="zh-CN" sz="2800"/>
           </a:p>
           <a:p>
             <a:r>
               <a:rPr lang="en-US" altLang="zh-CN" sz="2800"/>
               <a:t>                }</a:t>
             </a:r>
-            <a:endParaRPr lang="en-US" altLang="zh-CN" sz="2800"/>
           </a:p>
           <a:p>
             <a:r>
               <a:rPr lang="en-US" altLang="zh-CN" sz="2800"/>
               <a:t>        }</a:t>
             </a:r>
-            <a:endParaRPr lang="en-US" altLang="zh-CN" sz="2800"/>
           </a:p>
           <a:p>
             <a:r>
               <a:rPr lang="en-US" altLang="zh-CN" sz="2800"/>
               <a:t>}</a:t>
             </a:r>
-            <a:endParaRPr lang="en-US" altLang="zh-CN" sz="2800"/>
           </a:p>
         </p:txBody>
       </p:sp>
@@ -7812,7 +7730,14 @@
         <p:cNvGrpSpPr/>
         <p:nvPr/>
       </p:nvGrpSpPr>
-      <p:grpSpPr/>
+      <p:grpSpPr>
+        <a:xfrm>
+          <a:off x="0" y="0"/>
+          <a:ext cx="0" cy="0"/>
+          <a:chOff x="0" y="0"/>
+          <a:chExt cx="0" cy="0"/>
+        </a:xfrm>
+      </p:grpSpPr>
       <p:sp>
         <p:nvSpPr>
           <p:cNvPr id="2" name="标题 1"/>
@@ -7826,6 +7751,7 @@
         <p:spPr/>
         <p:txBody>
           <a:bodyPr/>
+          <a:lstStyle/>
           <a:p>
             <a:r>
               <a:rPr lang="en-US" altLang="zh-CN">
@@ -7850,6 +7776,7 @@
         <p:spPr/>
         <p:txBody>
           <a:bodyPr/>
+          <a:lstStyle/>
           <a:p>
             <a:r>
               <a:rPr lang="en-US" altLang="zh-CN">
@@ -7857,9 +7784,6 @@
               </a:rPr>
               <a:t>How to do multiplycations with reversely arranged array?</a:t>
             </a:r>
-            <a:endParaRPr lang="en-US" altLang="zh-CN">
-              <a:sym typeface="+mn-ea"/>
-            </a:endParaRPr>
           </a:p>
           <a:p>
             <a:r>
@@ -7874,18 +7798,14 @@
               <a:rPr lang="en-US" altLang="zh-CN"/>
               <a:t>) for large array.</a:t>
             </a:r>
-            <a:endParaRPr lang="en-US" altLang="zh-CN"/>
           </a:p>
           <a:p>
             <a:r>
               <a:rPr lang="en-US" altLang="zh-CN">
-                <a:hlinkClick r:id="rId1" action="ppaction://hlinkfile"/>
+                <a:hlinkClick r:id="rId2" action="ppaction://hlinkfile"/>
               </a:rPr>
               <a:t>https://brilliant.org/wiki/karatsuba-algorithm/</a:t>
             </a:r>
-            <a:endParaRPr lang="en-US" altLang="zh-CN">
-              <a:hlinkClick r:id="rId1" action="ppaction://hlinkfile"/>
-            </a:endParaRPr>
           </a:p>
           <a:p>
             <a:endParaRPr lang="en-US" altLang="zh-CN"/>
@@ -7895,7 +7815,6 @@
               <a:rPr lang="en-US" altLang="zh-CN"/>
               <a:t>For larger array, you may choose Toom Cook algorithm.</a:t>
             </a:r>
-            <a:endParaRPr lang="en-US" altLang="zh-CN"/>
           </a:p>
         </p:txBody>
       </p:sp>
@@ -7916,7 +7835,14 @@
         <p:cNvGrpSpPr/>
         <p:nvPr/>
       </p:nvGrpSpPr>
-      <p:grpSpPr/>
+      <p:grpSpPr>
+        <a:xfrm>
+          <a:off x="0" y="0"/>
+          <a:ext cx="0" cy="0"/>
+          <a:chOff x="0" y="0"/>
+          <a:chExt cx="0" cy="0"/>
+        </a:xfrm>
+      </p:grpSpPr>
       <p:sp>
         <p:nvSpPr>
           <p:cNvPr id="2" name="标题 1"/>
@@ -7930,18 +7856,13 @@
         <p:spPr/>
         <p:txBody>
           <a:bodyPr/>
+          <a:lstStyle/>
           <a:p>
             <a:r>
               <a:rPr lang="en-US" altLang="zh-CN">
                 <a:sym typeface="+mn-ea"/>
               </a:rPr>
-              <a:t>Making a calculator: </a:t>
-            </a:r>
-            <a:r>
-              <a:rPr lang="en-US" altLang="zh-CN">
-                <a:sym typeface="+mn-ea"/>
-              </a:rPr>
-              <a:t>User interface</a:t>
+              <a:t>Making a calculator: User interface</a:t>
             </a:r>
             <a:endParaRPr lang="zh-CN" altLang="en-US"/>
           </a:p>
@@ -7960,16 +7881,12 @@
         <p:spPr/>
         <p:txBody>
           <a:bodyPr/>
+          <a:lstStyle/>
           <a:p>
             <a:r>
               <a:rPr lang="en-US" altLang="zh-CN"/>
-              <a:t>You may want to use some </a:t>
-            </a:r>
-            <a:r>
-              <a:rPr lang="en-US" altLang="zh-CN"/>
-              <a:t>GUI framework for better look.</a:t>
-            </a:r>
-            <a:endParaRPr lang="en-US" altLang="zh-CN"/>
+              <a:t>You may want to use some GUI framework for better look.</a:t>
+            </a:r>
           </a:p>
           <a:p>
             <a:r>
@@ -7978,13 +7895,10 @@
             </a:r>
             <a:r>
               <a:rPr lang="en-US" altLang="zh-CN">
-                <a:hlinkClick r:id="rId1" action="ppaction://hlinkfile"/>
+                <a:hlinkClick r:id="rId2" action="ppaction://hlinkfile"/>
               </a:rPr>
               <a:t>https://www.qt.io/home</a:t>
             </a:r>
-            <a:endParaRPr lang="en-US" altLang="zh-CN">
-              <a:hlinkClick r:id="rId1" action="ppaction://hlinkfile"/>
-            </a:endParaRPr>
           </a:p>
           <a:p>
             <a:endParaRPr lang="en-US" altLang="zh-CN">
@@ -8017,7 +7931,7 @@
           <p:nvPr/>
         </p:nvPicPr>
         <p:blipFill>
-          <a:blip r:embed="rId2"/>
+          <a:blip r:embed="rId3"/>
           <a:stretch>
             <a:fillRect/>
           </a:stretch>
@@ -8071,6 +7985,7 @@
         </p:style>
         <p:txBody>
           <a:bodyPr rtlCol="0" anchor="ctr"/>
+          <a:lstStyle/>
           <a:p>
             <a:pPr algn="ctr"/>
             <a:endParaRPr lang="zh-CN" altLang="en-US"/>
@@ -8097,54 +8012,48 @@
           <a:bodyPr wrap="square" rtlCol="0">
             <a:spAutoFit/>
           </a:bodyPr>
+          <a:lstStyle/>
           <a:p>
             <a:r>
               <a:rPr lang="zh-CN" altLang="en-US"/>
               <a:t>int main() {</a:t>
             </a:r>
-            <a:endParaRPr lang="zh-CN" altLang="en-US"/>
           </a:p>
           <a:p>
             <a:r>
               <a:rPr lang="zh-CN" altLang="en-US"/>
               <a:t>    char a[20];</a:t>
             </a:r>
-            <a:endParaRPr lang="zh-CN" altLang="en-US"/>
           </a:p>
           <a:p>
             <a:r>
               <a:rPr lang="zh-CN" altLang="en-US"/>
               <a:t>    char b[20];</a:t>
             </a:r>
-            <a:endParaRPr lang="zh-CN" altLang="en-US"/>
           </a:p>
           <a:p>
             <a:r>
               <a:rPr lang="zh-CN" altLang="en-US"/>
               <a:t>    cout&lt;&lt;"Input the first number:"&lt;&lt;endl;</a:t>
             </a:r>
-            <a:endParaRPr lang="zh-CN" altLang="en-US"/>
           </a:p>
           <a:p>
             <a:r>
               <a:rPr lang="zh-CN" altLang="en-US"/>
               <a:t>    cin&gt;&gt;a;</a:t>
             </a:r>
-            <a:endParaRPr lang="zh-CN" altLang="en-US"/>
           </a:p>
           <a:p>
             <a:r>
               <a:rPr lang="zh-CN" altLang="en-US"/>
               <a:t>    cout&lt;&lt;"Input the second number:"&lt;&lt;endl;</a:t>
             </a:r>
-            <a:endParaRPr lang="zh-CN" altLang="en-US"/>
           </a:p>
           <a:p>
             <a:r>
               <a:rPr lang="zh-CN" altLang="en-US"/>
               <a:t>    cin&gt;&gt;b;</a:t>
             </a:r>
-            <a:endParaRPr lang="zh-CN" altLang="en-US"/>
           </a:p>
           <a:p>
             <a:endParaRPr lang="zh-CN" altLang="en-US"/>
@@ -8154,14 +8063,12 @@
               <a:rPr lang="zh-CN" altLang="en-US"/>
               <a:t>return 0;</a:t>
             </a:r>
-            <a:endParaRPr lang="zh-CN" altLang="en-US"/>
           </a:p>
           <a:p>
             <a:r>
               <a:rPr lang="zh-CN" altLang="en-US"/>
               <a:t>}</a:t>
             </a:r>
-            <a:endParaRPr lang="zh-CN" altLang="en-US"/>
           </a:p>
         </p:txBody>
       </p:sp>
@@ -8182,7 +8089,14 @@
         <p:cNvGrpSpPr/>
         <p:nvPr/>
       </p:nvGrpSpPr>
-      <p:grpSpPr/>
+      <p:grpSpPr>
+        <a:xfrm>
+          <a:off x="0" y="0"/>
+          <a:ext cx="0" cy="0"/>
+          <a:chOff x="0" y="0"/>
+          <a:chExt cx="0" cy="0"/>
+        </a:xfrm>
+      </p:grpSpPr>
       <p:sp>
         <p:nvSpPr>
           <p:cNvPr id="2" name="标题 1"/>
@@ -8196,18 +8110,13 @@
         <p:spPr/>
         <p:txBody>
           <a:bodyPr/>
+          <a:lstStyle/>
           <a:p>
             <a:r>
               <a:rPr lang="en-US" altLang="zh-CN">
                 <a:sym typeface="+mn-ea"/>
               </a:rPr>
-              <a:t>Making a calculator: </a:t>
-            </a:r>
-            <a:r>
-              <a:rPr lang="en-US" altLang="zh-CN">
-                <a:sym typeface="+mn-ea"/>
-              </a:rPr>
-              <a:t>User interface</a:t>
+              <a:t>Making a calculator: User interface</a:t>
             </a:r>
             <a:endParaRPr lang="zh-CN" altLang="en-US"/>
           </a:p>
@@ -8226,6 +8135,7 @@
         <p:spPr/>
         <p:txBody>
           <a:bodyPr/>
+          <a:lstStyle/>
           <a:p>
             <a:r>
               <a:rPr lang="en-US" altLang="zh-CN">
@@ -8233,9 +8143,6 @@
               </a:rPr>
               <a:t>Or if you use command line:</a:t>
             </a:r>
-            <a:endParaRPr lang="en-US" altLang="zh-CN">
-              <a:sym typeface="+mn-ea"/>
-            </a:endParaRPr>
           </a:p>
           <a:p>
             <a:endParaRPr lang="en-US" altLang="zh-CN"/>
@@ -8245,7 +8152,6 @@
               <a:rPr lang="en-US" altLang="zh-CN"/>
               <a:t>How to deal with unexpected input?</a:t>
             </a:r>
-            <a:endParaRPr lang="en-US" altLang="zh-CN"/>
           </a:p>
           <a:p>
             <a:pPr marL="0" indent="0">
@@ -8294,6 +8200,7 @@
         </p:style>
         <p:txBody>
           <a:bodyPr rtlCol="0" anchor="ctr"/>
+          <a:lstStyle/>
           <a:p>
             <a:pPr algn="ctr"/>
             <a:endParaRPr lang="zh-CN" altLang="en-US"/>
@@ -8320,54 +8227,48 @@
           <a:bodyPr wrap="square" rtlCol="0">
             <a:spAutoFit/>
           </a:bodyPr>
+          <a:lstStyle/>
           <a:p>
             <a:r>
               <a:rPr lang="zh-CN" altLang="en-US"/>
               <a:t>int main() {</a:t>
             </a:r>
-            <a:endParaRPr lang="zh-CN" altLang="en-US"/>
           </a:p>
           <a:p>
             <a:r>
               <a:rPr lang="zh-CN" altLang="en-US"/>
               <a:t>    char a[20];</a:t>
             </a:r>
-            <a:endParaRPr lang="zh-CN" altLang="en-US"/>
           </a:p>
           <a:p>
             <a:r>
               <a:rPr lang="zh-CN" altLang="en-US"/>
               <a:t>    char b[20];</a:t>
             </a:r>
-            <a:endParaRPr lang="zh-CN" altLang="en-US"/>
           </a:p>
           <a:p>
             <a:r>
               <a:rPr lang="zh-CN" altLang="en-US"/>
               <a:t>    cout&lt;&lt;"Input the first number:"&lt;&lt;endl;</a:t>
             </a:r>
-            <a:endParaRPr lang="zh-CN" altLang="en-US"/>
           </a:p>
           <a:p>
             <a:r>
               <a:rPr lang="zh-CN" altLang="en-US"/>
               <a:t>    cin&gt;&gt;a;</a:t>
             </a:r>
-            <a:endParaRPr lang="zh-CN" altLang="en-US"/>
           </a:p>
           <a:p>
             <a:r>
               <a:rPr lang="zh-CN" altLang="en-US"/>
               <a:t>    cout&lt;&lt;"Input the second number:"&lt;&lt;endl;</a:t>
             </a:r>
-            <a:endParaRPr lang="zh-CN" altLang="en-US"/>
           </a:p>
           <a:p>
             <a:r>
               <a:rPr lang="zh-CN" altLang="en-US"/>
               <a:t>    cin&gt;&gt;b;</a:t>
             </a:r>
-            <a:endParaRPr lang="zh-CN" altLang="en-US"/>
           </a:p>
           <a:p>
             <a:endParaRPr lang="zh-CN" altLang="en-US"/>
@@ -8377,14 +8278,12 @@
               <a:rPr lang="zh-CN" altLang="en-US"/>
               <a:t>return 0;</a:t>
             </a:r>
-            <a:endParaRPr lang="zh-CN" altLang="en-US"/>
           </a:p>
           <a:p>
             <a:r>
               <a:rPr lang="zh-CN" altLang="en-US"/>
               <a:t>}</a:t>
             </a:r>
-            <a:endParaRPr lang="zh-CN" altLang="en-US"/>
           </a:p>
         </p:txBody>
       </p:sp>
@@ -8397,7 +8296,7 @@
           <p:nvPr/>
         </p:nvPicPr>
         <p:blipFill>
-          <a:blip r:embed="rId1"/>
+          <a:blip r:embed="rId2"/>
           <a:stretch>
             <a:fillRect/>
           </a:stretch>
@@ -8429,7 +8328,14 @@
         <p:cNvGrpSpPr/>
         <p:nvPr/>
       </p:nvGrpSpPr>
-      <p:grpSpPr/>
+      <p:grpSpPr>
+        <a:xfrm>
+          <a:off x="0" y="0"/>
+          <a:ext cx="0" cy="0"/>
+          <a:chOff x="0" y="0"/>
+          <a:chExt cx="0" cy="0"/>
+        </a:xfrm>
+      </p:grpSpPr>
       <p:sp>
         <p:nvSpPr>
           <p:cNvPr id="2" name="标题 1"/>
@@ -8443,18 +8349,13 @@
         <p:spPr/>
         <p:txBody>
           <a:bodyPr/>
+          <a:lstStyle/>
           <a:p>
             <a:r>
               <a:rPr lang="en-US" altLang="zh-CN">
                 <a:sym typeface="+mn-ea"/>
               </a:rPr>
-              <a:t>Making a calculator: </a:t>
-            </a:r>
-            <a:r>
-              <a:rPr lang="en-US" altLang="zh-CN">
-                <a:sym typeface="+mn-ea"/>
-              </a:rPr>
-              <a:t>User interface</a:t>
+              <a:t>Making a calculator: User interface</a:t>
             </a:r>
             <a:endParaRPr lang="zh-CN" altLang="en-US"/>
           </a:p>
@@ -8473,12 +8374,12 @@
         <p:spPr/>
         <p:txBody>
           <a:bodyPr/>
+          <a:lstStyle/>
           <a:p>
             <a:r>
               <a:rPr lang="en-US" altLang="zh-CN"/>
               <a:t>How to deal with unexpected input?</a:t>
             </a:r>
-            <a:endParaRPr lang="en-US" altLang="zh-CN"/>
           </a:p>
           <a:p>
             <a:pPr marL="0" indent="0">
@@ -8527,6 +8428,7 @@
         </p:style>
         <p:txBody>
           <a:bodyPr rtlCol="0" anchor="ctr"/>
+          <a:lstStyle/>
           <a:p>
             <a:pPr algn="ctr"/>
             <a:endParaRPr lang="zh-CN" altLang="en-US"/>
@@ -8553,26 +8455,24 @@
           <a:bodyPr wrap="square" rtlCol="0">
             <a:spAutoFit/>
           </a:bodyPr>
+          <a:lstStyle/>
           <a:p>
             <a:r>
               <a:rPr lang="zh-CN" altLang="en-US"/>
               <a:t>#include &lt;iostream&gt;</a:t>
             </a:r>
-            <a:endParaRPr lang="zh-CN" altLang="en-US"/>
           </a:p>
           <a:p>
             <a:r>
               <a:rPr lang="zh-CN" altLang="en-US"/>
               <a:t>#include &lt;iomanip&gt;</a:t>
             </a:r>
-            <a:endParaRPr lang="zh-CN" altLang="en-US"/>
           </a:p>
           <a:p>
             <a:r>
               <a:rPr lang="zh-CN" altLang="en-US"/>
               <a:t>using namespace std;</a:t>
             </a:r>
-            <a:endParaRPr lang="zh-CN" altLang="en-US"/>
           </a:p>
           <a:p>
             <a:endParaRPr lang="zh-CN" altLang="en-US"/>
@@ -8582,42 +8482,36 @@
               <a:rPr lang="zh-CN" altLang="en-US"/>
               <a:t>int main() {</a:t>
             </a:r>
-            <a:endParaRPr lang="zh-CN" altLang="en-US"/>
           </a:p>
           <a:p>
             <a:r>
               <a:rPr lang="zh-CN" altLang="en-US"/>
               <a:t>    char a[20];</a:t>
             </a:r>
-            <a:endParaRPr lang="zh-CN" altLang="en-US"/>
           </a:p>
           <a:p>
             <a:r>
               <a:rPr lang="zh-CN" altLang="en-US"/>
               <a:t>    cout&lt;&lt;"Input the first number:"&lt;&lt;endl;</a:t>
             </a:r>
-            <a:endParaRPr lang="zh-CN" altLang="en-US"/>
           </a:p>
           <a:p>
             <a:r>
               <a:rPr lang="zh-CN" altLang="en-US"/>
               <a:t>    cin &gt;&gt; setw(20) &gt;&gt; a;</a:t>
             </a:r>
-            <a:endParaRPr lang="zh-CN" altLang="en-US"/>
           </a:p>
           <a:p>
             <a:r>
               <a:rPr lang="zh-CN" altLang="en-US"/>
               <a:t>return 0;</a:t>
             </a:r>
-            <a:endParaRPr lang="zh-CN" altLang="en-US"/>
           </a:p>
           <a:p>
             <a:r>
               <a:rPr lang="zh-CN" altLang="en-US"/>
               <a:t>}</a:t>
             </a:r>
-            <a:endParaRPr lang="zh-CN" altLang="en-US"/>
           </a:p>
         </p:txBody>
       </p:sp>
@@ -8630,7 +8524,7 @@
           <p:nvPr/>
         </p:nvPicPr>
         <p:blipFill>
-          <a:blip r:embed="rId1"/>
+          <a:blip r:embed="rId2"/>
           <a:stretch>
             <a:fillRect/>
           </a:stretch>
@@ -8823,13 +8717,6 @@
               </a:rPr>
               <a:t> is a</a:t>
             </a:r>
-            <a:endParaRPr lang="en-US" altLang="zh-CN" sz="2400" b="1" dirty="0">
-              <a:solidFill>
-                <a:srgbClr val="00B0F0"/>
-              </a:solidFill>
-              <a:latin typeface="Calibri" panose="020F0502020204030204"/>
-              <a:ea typeface="宋体" panose="02010600030101010101" pitchFamily="2" charset="-122"/>
-            </a:endParaRPr>
           </a:p>
           <a:p>
             <a:pPr defTabSz="1186180"/>
@@ -8853,13 +8740,6 @@
               </a:rPr>
               <a:t> You can compile your</a:t>
             </a:r>
-            <a:endParaRPr lang="en-US" altLang="zh-CN" sz="2400" dirty="0">
-              <a:solidFill>
-                <a:prstClr val="black"/>
-              </a:solidFill>
-              <a:latin typeface="Calibri" panose="020F0502020204030204"/>
-              <a:ea typeface="宋体" panose="02010600030101010101" pitchFamily="2" charset="-122"/>
-            </a:endParaRPr>
           </a:p>
           <a:p>
             <a:pPr defTabSz="1186180"/>
@@ -8873,13 +8753,6 @@
               </a:rPr>
               <a:t>project(program) or only compile the update files in the  project by using </a:t>
             </a:r>
-            <a:endParaRPr lang="en-US" altLang="zh-CN" sz="2400" dirty="0">
-              <a:solidFill>
-                <a:prstClr val="black"/>
-              </a:solidFill>
-              <a:latin typeface="Calibri" panose="020F0502020204030204"/>
-              <a:ea typeface="宋体" panose="02010600030101010101" pitchFamily="2" charset="-122"/>
-            </a:endParaRPr>
           </a:p>
           <a:p>
             <a:pPr defTabSz="1186180"/>
@@ -9068,7 +8941,7 @@
           <p:nvPr/>
         </p:nvPicPr>
         <p:blipFill>
-          <a:blip r:embed="rId1">
+          <a:blip r:embed="rId3">
             <a:extLst>
               <a:ext uri="{28A0092B-C50C-407E-A947-70E740481C1C}">
                 <a14:useLocalDpi xmlns:a14="http://schemas.microsoft.com/office/drawing/2010/main" val="0"/>
@@ -9127,7 +9000,7 @@
           <p:nvPr/>
         </p:nvPicPr>
         <p:blipFill>
-          <a:blip r:embed="rId2">
+          <a:blip r:embed="rId4">
             <a:extLst>
               <a:ext uri="{28A0092B-C50C-407E-A947-70E740481C1C}">
                 <a14:useLocalDpi xmlns:a14="http://schemas.microsoft.com/office/drawing/2010/main" val="0"/>
@@ -9186,7 +9059,7 @@
           <p:nvPr/>
         </p:nvPicPr>
         <p:blipFill>
-          <a:blip r:embed="rId3">
+          <a:blip r:embed="rId5">
             <a:extLst>
               <a:ext uri="{28A0092B-C50C-407E-A947-70E740481C1C}">
                 <a14:useLocalDpi xmlns:a14="http://schemas.microsoft.com/office/drawing/2010/main" val="0"/>
@@ -9269,13 +9142,6 @@
               </a:rPr>
               <a:t>Normally, you can compile these files  by the following</a:t>
             </a:r>
-            <a:endParaRPr lang="en-US" altLang="zh-CN" sz="2175" dirty="0">
-              <a:solidFill>
-                <a:prstClr val="black"/>
-              </a:solidFill>
-              <a:latin typeface="Calibri" panose="020F0502020204030204"/>
-              <a:ea typeface="宋体" panose="02010600030101010101" pitchFamily="2" charset="-122"/>
-            </a:endParaRPr>
           </a:p>
           <a:p>
             <a:pPr defTabSz="1076960"/>
@@ -9308,7 +9174,7 @@
           <p:nvPr/>
         </p:nvPicPr>
         <p:blipFill>
-          <a:blip r:embed="rId4">
+          <a:blip r:embed="rId6">
             <a:extLst>
               <a:ext uri="{28A0092B-C50C-407E-A947-70E740481C1C}">
                 <a14:useLocalDpi xmlns:a14="http://schemas.microsoft.com/office/drawing/2010/main" val="0"/>
@@ -9372,7 +9238,7 @@
           <p:nvPr/>
         </p:nvPicPr>
         <p:blipFill>
-          <a:blip r:embed="rId5">
+          <a:blip r:embed="rId7">
             <a:extLst>
               <a:ext uri="{28A0092B-C50C-407E-A947-70E740481C1C}">
                 <a14:useLocalDpi xmlns:a14="http://schemas.microsoft.com/office/drawing/2010/main" val="0"/>
@@ -9603,13 +9469,6 @@
               </a:rPr>
               <a:t>How about if there are hundreds of files need to compile? Do you think it is</a:t>
             </a:r>
-            <a:endParaRPr lang="en-US" altLang="zh-CN" sz="2400" dirty="0">
-              <a:solidFill>
-                <a:prstClr val="black"/>
-              </a:solidFill>
-              <a:latin typeface="Calibri" panose="020F0502020204030204"/>
-              <a:ea typeface="宋体" panose="02010600030101010101" pitchFamily="2" charset="-122"/>
-            </a:endParaRPr>
           </a:p>
           <a:p>
             <a:pPr defTabSz="1076960"/>
@@ -9643,13 +9502,6 @@
               </a:rPr>
               <a:t> compilation command by mentioning  all</a:t>
             </a:r>
-            <a:endParaRPr lang="en-US" altLang="zh-CN" sz="2400" dirty="0">
-              <a:solidFill>
-                <a:prstClr val="black"/>
-              </a:solidFill>
-              <a:latin typeface="Calibri" panose="020F0502020204030204"/>
-              <a:ea typeface="宋体" panose="02010600030101010101" pitchFamily="2" charset="-122"/>
-            </a:endParaRPr>
           </a:p>
           <a:p>
             <a:pPr defTabSz="1076960"/>
@@ -9786,13 +9638,6 @@
               </a:rPr>
               <a:t>  without extension.</a:t>
             </a:r>
-            <a:endParaRPr lang="en-US" altLang="zh-CN" sz="2400" dirty="0">
-              <a:solidFill>
-                <a:prstClr val="black"/>
-              </a:solidFill>
-              <a:latin typeface="Calibri" panose="020F0502020204030204"/>
-              <a:ea typeface="宋体" panose="02010600030101010101" pitchFamily="2" charset="-122"/>
-            </a:endParaRPr>
           </a:p>
           <a:p>
             <a:pPr defTabSz="1076960"/>
@@ -9846,13 +9691,6 @@
               </a:rPr>
               <a:t> including three</a:t>
             </a:r>
-            <a:endParaRPr lang="en-US" altLang="zh-CN" sz="2400" dirty="0">
-              <a:solidFill>
-                <a:prstClr val="black"/>
-              </a:solidFill>
-              <a:latin typeface="Calibri" panose="020F0502020204030204"/>
-              <a:ea typeface="宋体" panose="02010600030101010101" pitchFamily="2" charset="-122"/>
-            </a:endParaRPr>
           </a:p>
           <a:p>
             <a:pPr defTabSz="1076960"/>
@@ -9926,13 +9764,6 @@
               </a:rPr>
               <a:t>. There are many rules in the </a:t>
             </a:r>
-            <a:endParaRPr lang="en-US" altLang="zh-CN" sz="2400" dirty="0">
-              <a:solidFill>
-                <a:prstClr val="black"/>
-              </a:solidFill>
-              <a:latin typeface="Calibri" panose="020F0502020204030204"/>
-              <a:ea typeface="宋体" panose="02010600030101010101" pitchFamily="2" charset="-122"/>
-            </a:endParaRPr>
           </a:p>
           <a:p>
             <a:pPr defTabSz="1076960"/>
@@ -10142,13 +9973,6 @@
               </a:rPr>
               <a:t>, </a:t>
             </a:r>
-            <a:endParaRPr lang="en-US" altLang="zh-CN" sz="2400" dirty="0">
-              <a:solidFill>
-                <a:prstClr val="black"/>
-              </a:solidFill>
-              <a:latin typeface="Calibri" panose="020F0502020204030204"/>
-              <a:ea typeface="宋体" panose="02010600030101010101" pitchFamily="2" charset="-122"/>
-            </a:endParaRPr>
           </a:p>
           <a:p>
             <a:pPr defTabSz="1076960"/>
@@ -10254,13 +10078,6 @@
               </a:rPr>
               <a:t> :  prerequisites</a:t>
             </a:r>
-            <a:endParaRPr lang="en-US" altLang="zh-CN" sz="2815" b="1" dirty="0">
-              <a:solidFill>
-                <a:prstClr val="black"/>
-              </a:solidFill>
-              <a:latin typeface="Calibri" panose="020F0502020204030204"/>
-              <a:ea typeface="宋体" panose="02010600030101010101" pitchFamily="2" charset="-122"/>
-            </a:endParaRPr>
           </a:p>
           <a:p>
             <a:pPr defTabSz="1076960">
@@ -10344,13 +10161,6 @@
               </a:rPr>
               <a:t> is an object file, which is generated by a program. </a:t>
             </a:r>
-            <a:endParaRPr lang="en-US" altLang="zh-CN" sz="2400" dirty="0">
-              <a:solidFill>
-                <a:prstClr val="black"/>
-              </a:solidFill>
-              <a:latin typeface="Calibri" panose="020F0502020204030204"/>
-              <a:ea typeface="宋体" panose="02010600030101010101" pitchFamily="2" charset="-122"/>
-            </a:endParaRPr>
           </a:p>
           <a:p>
             <a:pPr defTabSz="1076960"/>
@@ -10364,13 +10174,6 @@
               </a:rPr>
               <a:t>Typically, there is only one per rule.</a:t>
             </a:r>
-            <a:endParaRPr lang="en-US" altLang="zh-CN" sz="2400" dirty="0">
-              <a:solidFill>
-                <a:prstClr val="black"/>
-              </a:solidFill>
-              <a:latin typeface="Calibri" panose="020F0502020204030204"/>
-              <a:ea typeface="宋体" panose="02010600030101010101" pitchFamily="2" charset="-122"/>
-            </a:endParaRPr>
           </a:p>
           <a:p>
             <a:pPr marL="414655" indent="-414655" defTabSz="1076960">
@@ -10407,13 +10210,6 @@
               </a:rPr>
               <a:t>  are file names, separated by spaces, as input to create the target.</a:t>
             </a:r>
-            <a:endParaRPr lang="en-US" altLang="zh-CN" sz="2400" dirty="0">
-              <a:solidFill>
-                <a:prstClr val="black"/>
-              </a:solidFill>
-              <a:latin typeface="Calibri" panose="020F0502020204030204"/>
-              <a:ea typeface="宋体" panose="02010600030101010101" pitchFamily="2" charset="-122"/>
-            </a:endParaRPr>
           </a:p>
           <a:p>
             <a:pPr marL="414655" indent="-414655" defTabSz="1076960">
@@ -10450,13 +10246,6 @@
               </a:rPr>
               <a:t>  are a series of steps that make carries out.</a:t>
             </a:r>
-            <a:endParaRPr lang="en-US" altLang="zh-CN" sz="2400" dirty="0">
-              <a:solidFill>
-                <a:prstClr val="black"/>
-              </a:solidFill>
-              <a:latin typeface="Calibri" panose="020F0502020204030204"/>
-              <a:ea typeface="宋体" panose="02010600030101010101" pitchFamily="2" charset="-122"/>
-            </a:endParaRPr>
           </a:p>
           <a:p>
             <a:pPr defTabSz="1076960"/>
@@ -10828,12 +10617,12 @@
           <a:graphicData uri="http://schemas.openxmlformats.org/presentationml/2006/ole">
             <mc:AlternateContent xmlns:mc="http://schemas.openxmlformats.org/markup-compatibility/2006">
               <mc:Choice xmlns:v="urn:schemas-microsoft-com:vml" Requires="v">
-                <p:oleObj spid="_x0000_s3" name="Image" r:id="rId1" imgW="10258425" imgH="2857500" progId="Photoshop.Image.13">
+                <p:oleObj name="Image" r:id="rId2" imgW="10258425" imgH="2857500" progId="Photoshop.Image.13">
                   <p:embed/>
                 </p:oleObj>
               </mc:Choice>
               <mc:Fallback>
-                <p:oleObj name="Image" r:id="rId1" imgW="10258425" imgH="2857500" progId="Photoshop.Image.13">
+                <p:oleObj name="Image" r:id="rId2" imgW="10258425" imgH="2857500" progId="Photoshop.Image.13">
                   <p:embed/>
                   <p:pic>
                     <p:nvPicPr>
@@ -10842,7 +10631,7 @@
                       <p:nvPr/>
                     </p:nvPicPr>
                     <p:blipFill>
-                      <a:blip r:embed="rId2"/>
+                      <a:blip r:embed="rId3"/>
                       <a:stretch>
                         <a:fillRect/>
                       </a:stretch>
@@ -11348,13 +11137,6 @@
                 </a:rPr>
                 <a:t>commands</a:t>
               </a:r>
-              <a:endParaRPr lang="en-US" altLang="zh-CN" sz="2400" dirty="0">
-                <a:solidFill>
-                  <a:prstClr val="black"/>
-                </a:solidFill>
-                <a:latin typeface="Calibri" panose="020F0502020204030204"/>
-                <a:ea typeface="宋体" panose="02010600030101010101" pitchFamily="2" charset="-122"/>
-              </a:endParaRPr>
             </a:p>
             <a:p>
               <a:pPr defTabSz="1076960"/>
@@ -11564,13 +11346,6 @@
                 </a:rPr>
                 <a:t>Put the </a:t>
               </a:r>
-              <a:endParaRPr lang="en-US" altLang="zh-CN" sz="2400" dirty="0">
-                <a:solidFill>
-                  <a:prstClr val="black"/>
-                </a:solidFill>
-                <a:latin typeface="Calibri" panose="020F0502020204030204"/>
-                <a:ea typeface="宋体" panose="02010600030101010101" pitchFamily="2" charset="-122"/>
-              </a:endParaRPr>
             </a:p>
             <a:p>
               <a:pPr defTabSz="1076960"/>
@@ -11594,13 +11369,6 @@
                 </a:rPr>
                 <a:t> </a:t>
               </a:r>
-              <a:endParaRPr lang="en-US" altLang="zh-CN" sz="2400" dirty="0">
-                <a:solidFill>
-                  <a:prstClr val="black"/>
-                </a:solidFill>
-                <a:latin typeface="Calibri" panose="020F0502020204030204"/>
-                <a:ea typeface="宋体" panose="02010600030101010101" pitchFamily="2" charset="-122"/>
-              </a:endParaRPr>
             </a:p>
             <a:p>
               <a:pPr defTabSz="1076960"/>
@@ -11614,13 +11382,6 @@
                 </a:rPr>
                 <a:t>together</a:t>
               </a:r>
-              <a:endParaRPr lang="en-US" altLang="zh-CN" sz="2400" dirty="0">
-                <a:solidFill>
-                  <a:prstClr val="black"/>
-                </a:solidFill>
-                <a:latin typeface="Calibri" panose="020F0502020204030204"/>
-                <a:ea typeface="宋体" panose="02010600030101010101" pitchFamily="2" charset="-122"/>
-              </a:endParaRPr>
             </a:p>
             <a:p>
               <a:pPr defTabSz="1076960"/>
@@ -11634,13 +11395,6 @@
                 </a:rPr>
                 <a:t>with your</a:t>
               </a:r>
-              <a:endParaRPr lang="en-US" altLang="zh-CN" sz="2400" dirty="0">
-                <a:solidFill>
-                  <a:prstClr val="black"/>
-                </a:solidFill>
-                <a:latin typeface="Calibri" panose="020F0502020204030204"/>
-                <a:ea typeface="宋体" panose="02010600030101010101" pitchFamily="2" charset="-122"/>
-              </a:endParaRPr>
             </a:p>
             <a:p>
               <a:pPr defTabSz="1076960"/>
@@ -11654,13 +11408,6 @@
                 </a:rPr>
                 <a:t>programs.</a:t>
               </a:r>
-              <a:endParaRPr lang="en-US" altLang="zh-CN" sz="2400" dirty="0">
-                <a:solidFill>
-                  <a:prstClr val="black"/>
-                </a:solidFill>
-                <a:latin typeface="Calibri" panose="020F0502020204030204"/>
-                <a:ea typeface="宋体" panose="02010600030101010101" pitchFamily="2" charset="-122"/>
-              </a:endParaRPr>
             </a:p>
           </p:txBody>
         </p:sp>
@@ -12061,13 +11808,6 @@
               </a:rPr>
               <a:t>Loops and Branching Statements</a:t>
             </a:r>
-            <a:endParaRPr lang="en-US" altLang="zh-CN" b="1" i="0" dirty="0">
-              <a:solidFill>
-                <a:srgbClr val="24292F"/>
-              </a:solidFill>
-              <a:effectLst/>
-              <a:latin typeface="-apple-system"/>
-            </a:endParaRPr>
           </a:p>
         </p:txBody>
       </p:sp>
@@ -12096,9 +11836,6 @@
               </a:rPr>
               <a:t>Making a calculator</a:t>
             </a:r>
-            <a:endParaRPr lang="en-US" altLang="zh-CN" dirty="0">
-              <a:sym typeface="+mn-ea"/>
-            </a:endParaRPr>
           </a:p>
           <a:p>
             <a:pPr marL="285750" indent="-285750">
@@ -12162,12 +11899,12 @@
           <a:graphicData uri="http://schemas.openxmlformats.org/presentationml/2006/ole">
             <mc:AlternateContent xmlns:mc="http://schemas.openxmlformats.org/markup-compatibility/2006">
               <mc:Choice xmlns:v="urn:schemas-microsoft-com:vml" Requires="v">
-                <p:oleObj spid="_x0000_s2" name="Image" r:id="rId1" imgW="5010150" imgH="1285875" progId="Photoshop.Image.13">
+                <p:oleObj name="Image" r:id="rId2" imgW="5010150" imgH="1285875" progId="Photoshop.Image.13">
                   <p:embed/>
                 </p:oleObj>
               </mc:Choice>
               <mc:Fallback>
-                <p:oleObj name="Image" r:id="rId1" imgW="5010150" imgH="1285875" progId="Photoshop.Image.13">
+                <p:oleObj name="Image" r:id="rId2" imgW="5010150" imgH="1285875" progId="Photoshop.Image.13">
                   <p:embed/>
                   <p:pic>
                     <p:nvPicPr>
@@ -12176,7 +11913,7 @@
                       <p:nvPr/>
                     </p:nvPicPr>
                     <p:blipFill>
-                      <a:blip r:embed="rId2"/>
+                      <a:blip r:embed="rId3"/>
                       <a:stretch>
                         <a:fillRect/>
                       </a:stretch>
@@ -12512,12 +12249,12 @@
           <a:graphicData uri="http://schemas.openxmlformats.org/presentationml/2006/ole">
             <mc:AlternateContent xmlns:mc="http://schemas.openxmlformats.org/markup-compatibility/2006">
               <mc:Choice xmlns:v="urn:schemas-microsoft-com:vml" Requires="v">
-                <p:oleObj spid="_x0000_s11" name="Image" r:id="rId3" imgW="3933825" imgH="361950" progId="Photoshop.Image.13">
+                <p:oleObj name="Image" r:id="rId4" imgW="3933825" imgH="361950" progId="Photoshop.Image.13">
                   <p:embed/>
                 </p:oleObj>
               </mc:Choice>
               <mc:Fallback>
-                <p:oleObj name="Image" r:id="rId3" imgW="3933825" imgH="361950" progId="Photoshop.Image.13">
+                <p:oleObj name="Image" r:id="rId4" imgW="3933825" imgH="361950" progId="Photoshop.Image.13">
                   <p:embed/>
                   <p:pic>
                     <p:nvPicPr>
@@ -12526,7 +12263,7 @@
                       <p:nvPr/>
                     </p:nvPicPr>
                     <p:blipFill>
-                      <a:blip r:embed="rId4"/>
+                      <a:blip r:embed="rId5"/>
                       <a:stretch>
                         <a:fillRect/>
                       </a:stretch>
@@ -12787,12 +12524,12 @@
           <a:graphicData uri="http://schemas.openxmlformats.org/presentationml/2006/ole">
             <mc:AlternateContent xmlns:mc="http://schemas.openxmlformats.org/markup-compatibility/2006">
               <mc:Choice xmlns:v="urn:schemas-microsoft-com:vml" Requires="v">
-                <p:oleObj spid="_x0000_s18" name="Image" r:id="rId5" imgW="4086225" imgH="676275" progId="Photoshop.Image.13">
+                <p:oleObj name="Image" r:id="rId6" imgW="4086225" imgH="676275" progId="Photoshop.Image.13">
                   <p:embed/>
                 </p:oleObj>
               </mc:Choice>
               <mc:Fallback>
-                <p:oleObj name="Image" r:id="rId5" imgW="4086225" imgH="676275" progId="Photoshop.Image.13">
+                <p:oleObj name="Image" r:id="rId6" imgW="4086225" imgH="676275" progId="Photoshop.Image.13">
                   <p:embed/>
                   <p:pic>
                     <p:nvPicPr>
@@ -12801,7 +12538,7 @@
                       <p:nvPr/>
                     </p:nvPicPr>
                     <p:blipFill>
-                      <a:blip r:embed="rId6"/>
+                      <a:blip r:embed="rId7"/>
                       <a:stretch>
                         <a:fillRect/>
                       </a:stretch>
@@ -13418,12 +13155,12 @@
           <a:graphicData uri="http://schemas.openxmlformats.org/presentationml/2006/ole">
             <mc:AlternateContent xmlns:mc="http://schemas.openxmlformats.org/markup-compatibility/2006">
               <mc:Choice xmlns:v="urn:schemas-microsoft-com:vml" Requires="v">
-                <p:oleObj spid="_x0000_s2" name="Image" r:id="rId1" imgW="3371850" imgH="1428750" progId="Photoshop.Image.13">
+                <p:oleObj name="Image" r:id="rId3" imgW="3371850" imgH="1428750" progId="Photoshop.Image.13">
                   <p:embed/>
                 </p:oleObj>
               </mc:Choice>
               <mc:Fallback>
-                <p:oleObj name="Image" r:id="rId1" imgW="3371850" imgH="1428750" progId="Photoshop.Image.13">
+                <p:oleObj name="Image" r:id="rId3" imgW="3371850" imgH="1428750" progId="Photoshop.Image.13">
                   <p:embed/>
                   <p:pic>
                     <p:nvPicPr>
@@ -13432,7 +13169,7 @@
                       <p:nvPr/>
                     </p:nvPicPr>
                     <p:blipFill>
-                      <a:blip r:embed="rId2"/>
+                      <a:blip r:embed="rId4"/>
                       <a:stretch>
                         <a:fillRect/>
                       </a:stretch>
@@ -14274,12 +14011,12 @@
           <a:graphicData uri="http://schemas.openxmlformats.org/presentationml/2006/ole">
             <mc:AlternateContent xmlns:mc="http://schemas.openxmlformats.org/markup-compatibility/2006">
               <mc:Choice xmlns:v="urn:schemas-microsoft-com:vml" Requires="v">
-                <p:oleObj spid="_x0000_s2" name="Image" r:id="rId1" imgW="3905250" imgH="542925" progId="Photoshop.Image.13">
+                <p:oleObj name="Image" r:id="rId3" imgW="3905250" imgH="542925" progId="Photoshop.Image.13">
                   <p:embed/>
                 </p:oleObj>
               </mc:Choice>
               <mc:Fallback>
-                <p:oleObj name="Image" r:id="rId1" imgW="3905250" imgH="542925" progId="Photoshop.Image.13">
+                <p:oleObj name="Image" r:id="rId3" imgW="3905250" imgH="542925" progId="Photoshop.Image.13">
                   <p:embed/>
                   <p:pic>
                     <p:nvPicPr>
@@ -14288,7 +14025,7 @@
                       <p:nvPr/>
                     </p:nvPicPr>
                     <p:blipFill>
-                      <a:blip r:embed="rId2"/>
+                      <a:blip r:embed="rId4"/>
                       <a:stretch>
                         <a:fillRect/>
                       </a:stretch>
@@ -14325,12 +14062,12 @@
           <a:graphicData uri="http://schemas.openxmlformats.org/presentationml/2006/ole">
             <mc:AlternateContent xmlns:mc="http://schemas.openxmlformats.org/markup-compatibility/2006">
               <mc:Choice xmlns:v="urn:schemas-microsoft-com:vml" Requires="v">
-                <p:oleObj spid="_x0000_s3" name="Image" r:id="rId3" imgW="3657600" imgH="3505200" progId="Photoshop.Image.13">
+                <p:oleObj name="Image" r:id="rId5" imgW="3657600" imgH="3505200" progId="Photoshop.Image.13">
                   <p:embed/>
                 </p:oleObj>
               </mc:Choice>
               <mc:Fallback>
-                <p:oleObj name="Image" r:id="rId3" imgW="3657600" imgH="3505200" progId="Photoshop.Image.13">
+                <p:oleObj name="Image" r:id="rId5" imgW="3657600" imgH="3505200" progId="Photoshop.Image.13">
                   <p:embed/>
                   <p:pic>
                     <p:nvPicPr>
@@ -14339,7 +14076,7 @@
                       <p:nvPr/>
                     </p:nvPicPr>
                     <p:blipFill>
-                      <a:blip r:embed="rId4"/>
+                      <a:blip r:embed="rId6"/>
                       <a:stretch>
                         <a:fillRect/>
                       </a:stretch>
@@ -14393,13 +14130,6 @@
               </a:rPr>
               <a:t>If only one source file is modified, we need not compile all the files. So, let’s</a:t>
             </a:r>
-            <a:endParaRPr lang="en-US" altLang="zh-CN" sz="2400" dirty="0">
-              <a:solidFill>
-                <a:prstClr val="black"/>
-              </a:solidFill>
-              <a:latin typeface="Calibri" panose="020F0502020204030204"/>
-              <a:ea typeface="宋体" panose="02010600030101010101" pitchFamily="2" charset="-122"/>
-            </a:endParaRPr>
           </a:p>
           <a:p>
             <a:pPr defTabSz="1076960"/>
@@ -15090,13 +14820,6 @@
               </a:rPr>
               <a:t>If main.cpp is modified, it is compiled</a:t>
             </a:r>
-            <a:endParaRPr lang="en-US" altLang="zh-CN" sz="2400" dirty="0">
-              <a:solidFill>
-                <a:prstClr val="black"/>
-              </a:solidFill>
-              <a:latin typeface="Calibri" panose="020F0502020204030204"/>
-              <a:ea typeface="宋体" panose="02010600030101010101" pitchFamily="2" charset="-122"/>
-            </a:endParaRPr>
           </a:p>
           <a:p>
             <a:pPr defTabSz="1076960"/>
@@ -15202,12 +14925,12 @@
             <a:graphicData uri="http://schemas.openxmlformats.org/presentationml/2006/ole">
               <mc:AlternateContent xmlns:mc="http://schemas.openxmlformats.org/markup-compatibility/2006">
                 <mc:Choice xmlns:v="urn:schemas-microsoft-com:vml" Requires="v">
-                  <p:oleObj spid="_x0000_s6" name="Image" r:id="rId5" imgW="3886200" imgH="504825" progId="Photoshop.Image.13">
+                  <p:oleObj name="Image" r:id="rId7" imgW="3886200" imgH="504825" progId="Photoshop.Image.13">
                     <p:embed/>
                   </p:oleObj>
                 </mc:Choice>
                 <mc:Fallback>
-                  <p:oleObj name="Image" r:id="rId5" imgW="3886200" imgH="504825" progId="Photoshop.Image.13">
+                  <p:oleObj name="Image" r:id="rId7" imgW="3886200" imgH="504825" progId="Photoshop.Image.13">
                     <p:embed/>
                     <p:pic>
                       <p:nvPicPr>
@@ -15216,7 +14939,7 @@
                         <p:nvPr/>
                       </p:nvPicPr>
                       <p:blipFill>
-                        <a:blip r:embed="rId6"/>
+                        <a:blip r:embed="rId8"/>
                         <a:stretch>
                           <a:fillRect/>
                         </a:stretch>
@@ -15253,12 +14976,12 @@
             <a:graphicData uri="http://schemas.openxmlformats.org/presentationml/2006/ole">
               <mc:AlternateContent xmlns:mc="http://schemas.openxmlformats.org/markup-compatibility/2006">
                 <mc:Choice xmlns:v="urn:schemas-microsoft-com:vml" Requires="v">
-                  <p:oleObj spid="_x0000_s22" name="Image" r:id="rId7" imgW="3867150" imgH="342900" progId="Photoshop.Image.13">
+                  <p:oleObj name="Image" r:id="rId9" imgW="3867150" imgH="342900" progId="Photoshop.Image.13">
                     <p:embed/>
                   </p:oleObj>
                 </mc:Choice>
                 <mc:Fallback>
-                  <p:oleObj name="Image" r:id="rId7" imgW="3867150" imgH="342900" progId="Photoshop.Image.13">
+                  <p:oleObj name="Image" r:id="rId9" imgW="3867150" imgH="342900" progId="Photoshop.Image.13">
                     <p:embed/>
                     <p:pic>
                       <p:nvPicPr>
@@ -15267,7 +14990,7 @@
                         <p:nvPr/>
                       </p:nvPicPr>
                       <p:blipFill>
-                        <a:blip r:embed="rId8"/>
+                        <a:blip r:embed="rId10"/>
                         <a:stretch>
                           <a:fillRect/>
                         </a:stretch>
@@ -15679,12 +15402,12 @@
           <a:graphicData uri="http://schemas.openxmlformats.org/presentationml/2006/ole">
             <mc:AlternateContent xmlns:mc="http://schemas.openxmlformats.org/markup-compatibility/2006">
               <mc:Choice xmlns:v="urn:schemas-microsoft-com:vml" Requires="v">
-                <p:oleObj spid="_x0000_s2" name="Image" r:id="rId1" imgW="4457700" imgH="4333875" progId="Photoshop.Image.13">
+                <p:oleObj name="Image" r:id="rId3" imgW="4457700" imgH="4333875" progId="Photoshop.Image.13">
                   <p:embed/>
                 </p:oleObj>
               </mc:Choice>
               <mc:Fallback>
-                <p:oleObj name="Image" r:id="rId1" imgW="4457700" imgH="4333875" progId="Photoshop.Image.13">
+                <p:oleObj name="Image" r:id="rId3" imgW="4457700" imgH="4333875" progId="Photoshop.Image.13">
                   <p:embed/>
                   <p:pic>
                     <p:nvPicPr>
@@ -15693,7 +15416,7 @@
                       <p:nvPr/>
                     </p:nvPicPr>
                     <p:blipFill>
-                      <a:blip r:embed="rId2"/>
+                      <a:blip r:embed="rId4"/>
                       <a:stretch>
                         <a:fillRect/>
                       </a:stretch>
@@ -16113,12 +15836,6 @@
               </a:rPr>
               <a:t>: Object Files</a:t>
             </a:r>
-            <a:endParaRPr lang="en-US" sz="2540" dirty="0">
-              <a:solidFill>
-                <a:prstClr val="black"/>
-              </a:solidFill>
-              <a:latin typeface="Calibri" panose="020F0502020204030204"/>
-            </a:endParaRPr>
           </a:p>
           <a:p>
             <a:pPr marL="128905" lvl="1" indent="0" defTabSz="1076960">
@@ -16149,12 +15866,6 @@
               </a:rPr>
               <a:t>: all the prerequisites files</a:t>
             </a:r>
-            <a:endParaRPr lang="en-US" sz="2540" dirty="0">
-              <a:solidFill>
-                <a:prstClr val="black"/>
-              </a:solidFill>
-              <a:latin typeface="Calibri" panose="020F0502020204030204"/>
-            </a:endParaRPr>
           </a:p>
           <a:p>
             <a:pPr marL="128905" lvl="1" indent="0" defTabSz="1076960">
@@ -16233,12 +15944,6 @@
               </a:rPr>
               <a:t>  </a:t>
             </a:r>
-            <a:endParaRPr lang="en-US" sz="2540" dirty="0">
-              <a:solidFill>
-                <a:prstClr val="black"/>
-              </a:solidFill>
-              <a:latin typeface="Calibri" panose="020F0502020204030204"/>
-            </a:endParaRPr>
           </a:p>
         </p:txBody>
       </p:sp>
@@ -16545,12 +16250,6 @@
                 </a:rPr>
                 <a:t> files</a:t>
               </a:r>
-              <a:endParaRPr lang="en-US" sz="2200" dirty="0">
-                <a:solidFill>
-                  <a:prstClr val="black"/>
-                </a:solidFill>
-                <a:latin typeface="Calibri" panose="020F0502020204030204"/>
-              </a:endParaRPr>
             </a:p>
           </p:txBody>
         </p:sp>
@@ -16607,12 +16306,12 @@
           <a:graphicData uri="http://schemas.openxmlformats.org/presentationml/2006/ole">
             <mc:AlternateContent xmlns:mc="http://schemas.openxmlformats.org/markup-compatibility/2006">
               <mc:Choice xmlns:v="urn:schemas-microsoft-com:vml" Requires="v">
-                <p:oleObj spid="_x0000_s5" name="Image" r:id="rId3" imgW="4943475" imgH="438150" progId="Photoshop.Image.13">
+                <p:oleObj name="Image" r:id="rId5" imgW="4943475" imgH="438150" progId="Photoshop.Image.13">
                   <p:embed/>
                 </p:oleObj>
               </mc:Choice>
               <mc:Fallback>
-                <p:oleObj name="Image" r:id="rId3" imgW="4943475" imgH="438150" progId="Photoshop.Image.13">
+                <p:oleObj name="Image" r:id="rId5" imgW="4943475" imgH="438150" progId="Photoshop.Image.13">
                   <p:embed/>
                   <p:pic>
                     <p:nvPicPr>
@@ -16621,7 +16320,7 @@
                       <p:nvPr/>
                     </p:nvPicPr>
                     <p:blipFill>
-                      <a:blip r:embed="rId4"/>
+                      <a:blip r:embed="rId6"/>
                       <a:stretch>
                         <a:fillRect/>
                       </a:stretch>
@@ -16684,7 +16383,6 @@
               <a:rPr lang="en-US" altLang="zh-CN" sz="2400" dirty="0"/>
               <a:t> like this:</a:t>
             </a:r>
-            <a:endParaRPr lang="en-US" altLang="zh-CN" sz="2400" dirty="0"/>
           </a:p>
         </p:txBody>
       </p:sp>
@@ -16987,12 +16685,12 @@
           <a:graphicData uri="http://schemas.openxmlformats.org/presentationml/2006/ole">
             <mc:AlternateContent xmlns:mc="http://schemas.openxmlformats.org/markup-compatibility/2006">
               <mc:Choice xmlns:v="urn:schemas-microsoft-com:vml" Requires="v">
-                <p:oleObj spid="_x0000_s2" name="Image" r:id="rId1" imgW="4467225" imgH="5229225" progId="Photoshop.Image.13">
+                <p:oleObj name="Image" r:id="rId3" imgW="4467225" imgH="5229225" progId="Photoshop.Image.13">
                   <p:embed/>
                 </p:oleObj>
               </mc:Choice>
               <mc:Fallback>
-                <p:oleObj name="Image" r:id="rId1" imgW="4467225" imgH="5229225" progId="Photoshop.Image.13">
+                <p:oleObj name="Image" r:id="rId3" imgW="4467225" imgH="5229225" progId="Photoshop.Image.13">
                   <p:embed/>
                   <p:pic>
                     <p:nvPicPr>
@@ -17001,7 +16699,7 @@
                       <p:nvPr/>
                     </p:nvPicPr>
                     <p:blipFill>
-                      <a:blip r:embed="rId2"/>
+                      <a:blip r:embed="rId4"/>
                       <a:stretch>
                         <a:fillRect/>
                       </a:stretch>
@@ -17038,12 +16736,12 @@
           <a:graphicData uri="http://schemas.openxmlformats.org/presentationml/2006/ole">
             <mc:AlternateContent xmlns:mc="http://schemas.openxmlformats.org/markup-compatibility/2006">
               <mc:Choice xmlns:v="urn:schemas-microsoft-com:vml" Requires="v">
-                <p:oleObj spid="_x0000_s3" name="Image" r:id="rId3" imgW="5495925" imgH="409575" progId="Photoshop.Image.13">
+                <p:oleObj name="Image" r:id="rId5" imgW="5495925" imgH="409575" progId="Photoshop.Image.13">
                   <p:embed/>
                 </p:oleObj>
               </mc:Choice>
               <mc:Fallback>
-                <p:oleObj name="Image" r:id="rId3" imgW="5495925" imgH="409575" progId="Photoshop.Image.13">
+                <p:oleObj name="Image" r:id="rId5" imgW="5495925" imgH="409575" progId="Photoshop.Image.13">
                   <p:embed/>
                   <p:pic>
                     <p:nvPicPr>
@@ -17052,7 +16750,7 @@
                       <p:nvPr/>
                     </p:nvPicPr>
                     <p:blipFill>
-                      <a:blip r:embed="rId4"/>
+                      <a:blip r:embed="rId6"/>
                       <a:stretch>
                         <a:fillRect/>
                       </a:stretch>
@@ -17419,12 +17117,6 @@
                 </a:rPr>
                 <a:t>to a target will prevent making from confusing the phony target with a file name.</a:t>
               </a:r>
-              <a:endParaRPr lang="en-US" sz="2400" dirty="0">
-                <a:solidFill>
-                  <a:prstClr val="black"/>
-                </a:solidFill>
-                <a:latin typeface="Calibri" panose="020F0502020204030204"/>
-              </a:endParaRPr>
             </a:p>
           </p:txBody>
         </p:sp>
@@ -17804,12 +17496,6 @@
                 </a:rPr>
                 <a:t> command can not execute clean part.</a:t>
               </a:r>
-              <a:endParaRPr lang="en-US" sz="2400" dirty="0">
-                <a:solidFill>
-                  <a:prstClr val="black"/>
-                </a:solidFill>
-                <a:latin typeface="Calibri" panose="020F0502020204030204"/>
-              </a:endParaRPr>
             </a:p>
           </p:txBody>
         </p:sp>
@@ -18176,13 +17862,6 @@
               </a:rPr>
               <a:t>: search file    </a:t>
             </a:r>
-            <a:endParaRPr lang="en-US" altLang="zh-CN" sz="2400" dirty="0">
-              <a:solidFill>
-                <a:prstClr val="black"/>
-              </a:solidFill>
-              <a:latin typeface="Calibri" panose="020F0502020204030204"/>
-              <a:ea typeface="宋体" panose="02010600030101010101" pitchFamily="2" charset="-122"/>
-            </a:endParaRPr>
           </a:p>
           <a:p>
             <a:pPr defTabSz="1076960"/>
@@ -18196,13 +17875,6 @@
               </a:rPr>
               <a:t>for example: </a:t>
             </a:r>
-            <a:endParaRPr lang="en-US" altLang="zh-CN" sz="2400" dirty="0">
-              <a:solidFill>
-                <a:prstClr val="black"/>
-              </a:solidFill>
-              <a:latin typeface="Calibri" panose="020F0502020204030204"/>
-              <a:ea typeface="宋体" panose="02010600030101010101" pitchFamily="2" charset="-122"/>
-            </a:endParaRPr>
           </a:p>
           <a:p>
             <a:pPr defTabSz="1076960"/>
@@ -18256,13 +17928,6 @@
               </a:rPr>
               <a:t>)</a:t>
             </a:r>
-            <a:endParaRPr lang="en-US" altLang="zh-CN" sz="2400" dirty="0">
-              <a:solidFill>
-                <a:prstClr val="black"/>
-              </a:solidFill>
-              <a:latin typeface="Calibri" panose="020F0502020204030204"/>
-              <a:ea typeface="宋体" panose="02010600030101010101" pitchFamily="2" charset="-122"/>
-            </a:endParaRPr>
           </a:p>
         </p:txBody>
       </p:sp>
@@ -18622,12 +18287,6 @@
                 </a:rPr>
                 <a:t> files in the current directory, and return to SRC</a:t>
               </a:r>
-              <a:endParaRPr lang="en-US" sz="2400" dirty="0">
-                <a:solidFill>
-                  <a:prstClr val="black"/>
-                </a:solidFill>
-                <a:latin typeface="Calibri" panose="020F0502020204030204"/>
-              </a:endParaRPr>
             </a:p>
           </p:txBody>
         </p:sp>
@@ -18684,12 +18343,12 @@
           <a:graphicData uri="http://schemas.openxmlformats.org/presentationml/2006/ole">
             <mc:AlternateContent xmlns:mc="http://schemas.openxmlformats.org/markup-compatibility/2006">
               <mc:Choice xmlns:v="urn:schemas-microsoft-com:vml" Requires="v">
-                <p:oleObj spid="_x0000_s2" name="Image" r:id="rId1" imgW="2857500" imgH="819150" progId="Photoshop.Image.13">
+                <p:oleObj name="Image" r:id="rId3" imgW="2857500" imgH="819150" progId="Photoshop.Image.13">
                   <p:embed/>
                 </p:oleObj>
               </mc:Choice>
               <mc:Fallback>
-                <p:oleObj name="Image" r:id="rId1" imgW="2857500" imgH="819150" progId="Photoshop.Image.13">
+                <p:oleObj name="Image" r:id="rId3" imgW="2857500" imgH="819150" progId="Photoshop.Image.13">
                   <p:embed/>
                   <p:pic>
                     <p:nvPicPr>
@@ -18698,7 +18357,7 @@
                       <p:nvPr/>
                     </p:nvPicPr>
                     <p:blipFill>
-                      <a:blip r:embed="rId2"/>
+                      <a:blip r:embed="rId4"/>
                       <a:stretch>
                         <a:fillRect/>
                       </a:stretch>
@@ -18735,12 +18394,12 @@
           <a:graphicData uri="http://schemas.openxmlformats.org/presentationml/2006/ole">
             <mc:AlternateContent xmlns:mc="http://schemas.openxmlformats.org/markup-compatibility/2006">
               <mc:Choice xmlns:v="urn:schemas-microsoft-com:vml" Requires="v">
-                <p:oleObj spid="_x0000_s5" name="Image" r:id="rId3" imgW="4991100" imgH="390525" progId="Photoshop.Image.13">
+                <p:oleObj name="Image" r:id="rId5" imgW="4991100" imgH="390525" progId="Photoshop.Image.13">
                   <p:embed/>
                 </p:oleObj>
               </mc:Choice>
               <mc:Fallback>
-                <p:oleObj name="Image" r:id="rId3" imgW="4991100" imgH="390525" progId="Photoshop.Image.13">
+                <p:oleObj name="Image" r:id="rId5" imgW="4991100" imgH="390525" progId="Photoshop.Image.13">
                   <p:embed/>
                   <p:pic>
                     <p:nvPicPr>
@@ -18749,7 +18408,7 @@
                       <p:nvPr/>
                     </p:nvPicPr>
                     <p:blipFill>
-                      <a:blip r:embed="rId4"/>
+                      <a:blip r:embed="rId6"/>
                       <a:stretch>
                         <a:fillRect/>
                       </a:stretch>
@@ -19073,12 +18732,6 @@
                 </a:rPr>
                 <a:t> files in the current directory</a:t>
               </a:r>
-              <a:endParaRPr lang="en-US" sz="2400" dirty="0">
-                <a:solidFill>
-                  <a:prstClr val="black"/>
-                </a:solidFill>
-                <a:latin typeface="Calibri" panose="020F0502020204030204"/>
-              </a:endParaRPr>
             </a:p>
           </p:txBody>
         </p:sp>
@@ -19373,12 +19026,12 @@
           <a:graphicData uri="http://schemas.openxmlformats.org/presentationml/2006/ole">
             <mc:AlternateContent xmlns:mc="http://schemas.openxmlformats.org/markup-compatibility/2006">
               <mc:Choice xmlns:v="urn:schemas-microsoft-com:vml" Requires="v">
-                <p:oleObj spid="_x0000_s2" name="Image" r:id="rId1" imgW="4962525" imgH="600075" progId="Photoshop.Image.13">
+                <p:oleObj name="Image" r:id="rId2" imgW="4962525" imgH="600075" progId="Photoshop.Image.13">
                   <p:embed/>
                 </p:oleObj>
               </mc:Choice>
               <mc:Fallback>
-                <p:oleObj name="Image" r:id="rId1" imgW="4962525" imgH="600075" progId="Photoshop.Image.13">
+                <p:oleObj name="Image" r:id="rId2" imgW="4962525" imgH="600075" progId="Photoshop.Image.13">
                   <p:embed/>
                   <p:pic>
                     <p:nvPicPr>
@@ -19387,7 +19040,7 @@
                       <p:nvPr/>
                     </p:nvPicPr>
                     <p:blipFill>
-                      <a:blip r:embed="rId2"/>
+                      <a:blip r:embed="rId3"/>
                       <a:stretch>
                         <a:fillRect/>
                       </a:stretch>
@@ -19458,13 +19111,6 @@
               </a:rPr>
               <a:t>pattern substitution): replace file   </a:t>
             </a:r>
-            <a:endParaRPr lang="en-US" altLang="zh-CN" sz="2905" dirty="0">
-              <a:solidFill>
-                <a:prstClr val="black"/>
-              </a:solidFill>
-              <a:latin typeface="Calibri" panose="020F0502020204030204"/>
-              <a:ea typeface="宋体" panose="02010600030101010101" pitchFamily="2" charset="-122"/>
-            </a:endParaRPr>
           </a:p>
           <a:p>
             <a:pPr defTabSz="1076960"/>
@@ -19498,13 +19144,6 @@
               </a:rPr>
               <a:t> original pattern, target pattern, file list)</a:t>
             </a:r>
-            <a:endParaRPr lang="en-US" altLang="zh-CN" sz="2905" dirty="0">
-              <a:solidFill>
-                <a:prstClr val="black"/>
-              </a:solidFill>
-              <a:latin typeface="Calibri" panose="020F0502020204030204"/>
-              <a:ea typeface="宋体" panose="02010600030101010101" pitchFamily="2" charset="-122"/>
-            </a:endParaRPr>
           </a:p>
         </p:txBody>
       </p:sp>
@@ -19811,12 +19450,6 @@
                 </a:rPr>
                 <a:t> files with .o files </a:t>
               </a:r>
-              <a:endParaRPr lang="en-US" sz="2400" dirty="0">
-                <a:solidFill>
-                  <a:prstClr val="black"/>
-                </a:solidFill>
-                <a:latin typeface="Calibri" panose="020F0502020204030204"/>
-              </a:endParaRPr>
             </a:p>
           </p:txBody>
         </p:sp>
@@ -19890,13 +19523,6 @@
               </a:rPr>
               <a:t>for example: </a:t>
             </a:r>
-            <a:endParaRPr lang="en-US" altLang="zh-CN" sz="2400" dirty="0">
-              <a:solidFill>
-                <a:prstClr val="black"/>
-              </a:solidFill>
-              <a:latin typeface="Calibri" panose="020F0502020204030204"/>
-              <a:ea typeface="宋体" panose="02010600030101010101" pitchFamily="2" charset="-122"/>
-            </a:endParaRPr>
           </a:p>
           <a:p>
             <a:pPr defTabSz="1076960"/>
@@ -20263,12 +19889,6 @@
                 </a:rPr>
                 <a:t> files with .o files </a:t>
               </a:r>
-              <a:endParaRPr lang="en-US" sz="2400" dirty="0">
-                <a:solidFill>
-                  <a:prstClr val="black"/>
-                </a:solidFill>
-                <a:latin typeface="Calibri" panose="020F0502020204030204"/>
-              </a:endParaRPr>
             </a:p>
           </p:txBody>
         </p:sp>
@@ -20327,12 +19947,12 @@
           <a:graphicData uri="http://schemas.openxmlformats.org/presentationml/2006/ole">
             <mc:AlternateContent xmlns:mc="http://schemas.openxmlformats.org/markup-compatibility/2006">
               <mc:Choice xmlns:v="urn:schemas-microsoft-com:vml" Requires="v">
-                <p:oleObj spid="_x0000_s9" name="Image" r:id="rId3" imgW="3981450" imgH="1428750" progId="Photoshop.Image.13">
+                <p:oleObj name="Image" r:id="rId4" imgW="3981450" imgH="1428750" progId="Photoshop.Image.13">
                   <p:embed/>
                 </p:oleObj>
               </mc:Choice>
               <mc:Fallback>
-                <p:oleObj name="Image" r:id="rId3" imgW="3981450" imgH="1428750" progId="Photoshop.Image.13">
+                <p:oleObj name="Image" r:id="rId4" imgW="3981450" imgH="1428750" progId="Photoshop.Image.13">
                   <p:embed/>
                   <p:pic>
                     <p:nvPicPr>
@@ -20341,7 +19961,7 @@
                       <p:nvPr/>
                     </p:nvPicPr>
                     <p:blipFill>
-                      <a:blip r:embed="rId4"/>
+                      <a:blip r:embed="rId5"/>
                       <a:stretch>
                         <a:fillRect/>
                       </a:stretch>
@@ -20661,12 +20281,12 @@
           <a:graphicData uri="http://schemas.openxmlformats.org/presentationml/2006/ole">
             <mc:AlternateContent xmlns:mc="http://schemas.openxmlformats.org/markup-compatibility/2006">
               <mc:Choice xmlns:v="urn:schemas-microsoft-com:vml" Requires="v">
-                <p:oleObj spid="_x0000_s2" name="Image" r:id="rId1" imgW="3448050" imgH="1609725" progId="Photoshop.Image.13">
+                <p:oleObj name="Image" r:id="rId2" imgW="3448050" imgH="1609725" progId="Photoshop.Image.13">
                   <p:embed/>
                 </p:oleObj>
               </mc:Choice>
               <mc:Fallback>
-                <p:oleObj name="Image" r:id="rId1" imgW="3448050" imgH="1609725" progId="Photoshop.Image.13">
+                <p:oleObj name="Image" r:id="rId2" imgW="3448050" imgH="1609725" progId="Photoshop.Image.13">
                   <p:embed/>
                   <p:pic>
                     <p:nvPicPr>
@@ -20675,7 +20295,7 @@
                       <p:nvPr/>
                     </p:nvPicPr>
                     <p:blipFill>
-                      <a:blip r:embed="rId2"/>
+                      <a:blip r:embed="rId3"/>
                       <a:stretch>
                         <a:fillRect/>
                       </a:stretch>
@@ -20712,12 +20332,12 @@
           <a:graphicData uri="http://schemas.openxmlformats.org/presentationml/2006/ole">
             <mc:AlternateContent xmlns:mc="http://schemas.openxmlformats.org/markup-compatibility/2006">
               <mc:Choice xmlns:v="urn:schemas-microsoft-com:vml" Requires="v">
-                <p:oleObj spid="_x0000_s5" name="Image" r:id="rId3" imgW="5705475" imgH="6276975" progId="Photoshop.Image.13">
+                <p:oleObj name="Image" r:id="rId4" imgW="5705475" imgH="6276975" progId="Photoshop.Image.13">
                   <p:embed/>
                 </p:oleObj>
               </mc:Choice>
               <mc:Fallback>
-                <p:oleObj name="Image" r:id="rId3" imgW="5705475" imgH="6276975" progId="Photoshop.Image.13">
+                <p:oleObj name="Image" r:id="rId4" imgW="5705475" imgH="6276975" progId="Photoshop.Image.13">
                   <p:embed/>
                   <p:pic>
                     <p:nvPicPr>
@@ -20726,7 +20346,7 @@
                       <p:nvPr/>
                     </p:nvPicPr>
                     <p:blipFill>
-                      <a:blip r:embed="rId4"/>
+                      <a:blip r:embed="rId5"/>
                       <a:stretch>
                         <a:fillRect/>
                       </a:stretch>
@@ -21671,12 +21291,12 @@
           <a:graphicData uri="http://schemas.openxmlformats.org/presentationml/2006/ole">
             <mc:AlternateContent xmlns:mc="http://schemas.openxmlformats.org/markup-compatibility/2006">
               <mc:Choice xmlns:v="urn:schemas-microsoft-com:vml" Requires="v">
-                <p:oleObj spid="_x0000_s17" name="Image" r:id="rId5" imgW="5857875" imgH="990600" progId="Photoshop.Image.13">
+                <p:oleObj name="Image" r:id="rId6" imgW="5857875" imgH="990600" progId="Photoshop.Image.13">
                   <p:embed/>
                 </p:oleObj>
               </mc:Choice>
               <mc:Fallback>
-                <p:oleObj name="Image" r:id="rId5" imgW="5857875" imgH="990600" progId="Photoshop.Image.13">
+                <p:oleObj name="Image" r:id="rId6" imgW="5857875" imgH="990600" progId="Photoshop.Image.13">
                   <p:embed/>
                   <p:pic>
                     <p:nvPicPr>
@@ -21685,7 +21305,7 @@
                       <p:nvPr/>
                     </p:nvPicPr>
                     <p:blipFill>
-                      <a:blip r:embed="rId6"/>
+                      <a:blip r:embed="rId7"/>
                       <a:stretch>
                         <a:fillRect/>
                       </a:stretch>
@@ -22019,12 +21639,6 @@
                 </a:rPr>
                 <a:t> folder</a:t>
               </a:r>
-              <a:endParaRPr lang="en-US" sz="1815" dirty="0">
-                <a:solidFill>
-                  <a:schemeClr val="bg1"/>
-                </a:solidFill>
-                <a:latin typeface="Calibri" panose="020F0502020204030204"/>
-              </a:endParaRPr>
             </a:p>
           </p:txBody>
         </p:sp>
@@ -22641,20 +22255,6 @@
               </a:rPr>
               <a:t> Exercises</a:t>
             </a:r>
-            <a:endParaRPr kumimoji="0" lang="en-US" altLang="zh-CN" sz="3600" b="1" i="0" u="none" strike="noStrike" kern="1200" cap="none" spc="0" normalizeH="0" baseline="0" noProof="0" dirty="0">
-              <a:ln>
-                <a:noFill/>
-              </a:ln>
-              <a:solidFill>
-                <a:prstClr val="black"/>
-              </a:solidFill>
-              <a:effectLst/>
-              <a:uLnTx/>
-              <a:uFillTx/>
-              <a:latin typeface="Calibri" panose="020F0502020204030204"/>
-              <a:ea typeface="宋体" panose="02010600030101010101" pitchFamily="2" charset="-122"/>
-              <a:cs typeface="+mj-cs"/>
-            </a:endParaRPr>
           </a:p>
         </p:txBody>
       </p:sp>
@@ -22667,7 +22267,7 @@
           <p:nvPr/>
         </p:nvPicPr>
         <p:blipFill>
-          <a:blip r:embed="rId1"/>
+          <a:blip r:embed="rId2"/>
           <a:stretch>
             <a:fillRect/>
           </a:stretch>
@@ -22691,7 +22291,7 @@
           <p:nvPr/>
         </p:nvPicPr>
         <p:blipFill>
-          <a:blip r:embed="rId2"/>
+          <a:blip r:embed="rId3"/>
           <a:stretch>
             <a:fillRect/>
           </a:stretch>
@@ -22715,7 +22315,7 @@
           <p:nvPr/>
         </p:nvPicPr>
         <p:blipFill>
-          <a:blip r:embed="rId3"/>
+          <a:blip r:embed="rId4"/>
           <a:stretch>
             <a:fillRect/>
           </a:stretch>
@@ -22739,7 +22339,7 @@
           <p:nvPr/>
         </p:nvPicPr>
         <p:blipFill>
-          <a:blip r:embed="rId4"/>
+          <a:blip r:embed="rId5"/>
           <a:stretch>
             <a:fillRect/>
           </a:stretch>
@@ -22969,20 +22569,6 @@
               </a:rPr>
               <a:t> Exercises</a:t>
             </a:r>
-            <a:endParaRPr kumimoji="0" lang="en-US" altLang="zh-CN" sz="3600" b="1" i="0" u="none" strike="noStrike" kern="1200" cap="none" spc="0" normalizeH="0" baseline="0" noProof="0" dirty="0">
-              <a:ln>
-                <a:noFill/>
-              </a:ln>
-              <a:solidFill>
-                <a:prstClr val="black"/>
-              </a:solidFill>
-              <a:effectLst/>
-              <a:uLnTx/>
-              <a:uFillTx/>
-              <a:latin typeface="Calibri" panose="020F0502020204030204"/>
-              <a:ea typeface="宋体" panose="02010600030101010101" pitchFamily="2" charset="-122"/>
-              <a:cs typeface="+mj-cs"/>
-            </a:endParaRPr>
           </a:p>
         </p:txBody>
       </p:sp>
@@ -22995,7 +22581,7 @@
           <p:nvPr/>
         </p:nvPicPr>
         <p:blipFill>
-          <a:blip r:embed="rId1"/>
+          <a:blip r:embed="rId2"/>
           <a:stretch>
             <a:fillRect/>
           </a:stretch>
@@ -23019,7 +22605,7 @@
           <p:nvPr/>
         </p:nvPicPr>
         <p:blipFill>
-          <a:blip r:embed="rId2"/>
+          <a:blip r:embed="rId3"/>
           <a:stretch>
             <a:fillRect/>
           </a:stretch>
@@ -23060,14 +22646,12 @@
               <a:rPr lang="en-US" altLang="zh-CN" dirty="0"/>
               <a:t>If you input an integer that is greater </a:t>
             </a:r>
-            <a:endParaRPr lang="en-US" altLang="zh-CN" dirty="0"/>
           </a:p>
           <a:p>
             <a:r>
               <a:rPr lang="en-US" altLang="zh-CN" dirty="0"/>
               <a:t>than 20, how about the result? Is that </a:t>
             </a:r>
-            <a:endParaRPr lang="en-US" altLang="zh-CN" dirty="0"/>
           </a:p>
           <a:p>
             <a:r>
@@ -23095,7 +22679,14 @@
         <p:cNvGrpSpPr/>
         <p:nvPr/>
       </p:nvGrpSpPr>
-      <p:grpSpPr/>
+      <p:grpSpPr>
+        <a:xfrm>
+          <a:off x="0" y="0"/>
+          <a:ext cx="0" cy="0"/>
+          <a:chOff x="0" y="0"/>
+          <a:chExt cx="0" cy="0"/>
+        </a:xfrm>
+      </p:grpSpPr>
       <p:sp>
         <p:nvSpPr>
           <p:cNvPr id="2" name="标题 1"/>
@@ -23109,12 +22700,12 @@
         <p:spPr/>
         <p:txBody>
           <a:bodyPr/>
+          <a:lstStyle/>
           <a:p>
             <a:r>
               <a:rPr lang="en-US" altLang="zh-CN"/>
               <a:t>Making a calculator</a:t>
             </a:r>
-            <a:endParaRPr lang="en-US" altLang="zh-CN"/>
           </a:p>
         </p:txBody>
       </p:sp>
@@ -23131,47 +22722,42 @@
         <p:spPr/>
         <p:txBody>
           <a:bodyPr/>
+          <a:lstStyle/>
           <a:p>
             <a:r>
               <a:rPr lang="en-US" altLang="zh-CN"/>
               <a:t>Software requirement.</a:t>
             </a:r>
-            <a:endParaRPr lang="en-US" altLang="zh-CN"/>
           </a:p>
           <a:p>
             <a:r>
               <a:rPr lang="en-US" altLang="zh-CN"/>
               <a:t>System design.</a:t>
             </a:r>
-            <a:endParaRPr lang="en-US" altLang="zh-CN"/>
           </a:p>
           <a:p>
             <a:r>
               <a:rPr lang="en-US" altLang="zh-CN"/>
               <a:t>Design data types.</a:t>
             </a:r>
-            <a:endParaRPr lang="en-US" altLang="zh-CN"/>
           </a:p>
           <a:p>
             <a:r>
               <a:rPr lang="en-US" altLang="zh-CN"/>
               <a:t>Performance issue.</a:t>
             </a:r>
-            <a:endParaRPr lang="en-US" altLang="zh-CN"/>
           </a:p>
           <a:p>
             <a:r>
               <a:rPr lang="en-US" altLang="zh-CN"/>
               <a:t>User interface?</a:t>
             </a:r>
-            <a:endParaRPr lang="en-US" altLang="zh-CN"/>
           </a:p>
           <a:p>
             <a:r>
               <a:rPr lang="en-US" altLang="zh-CN"/>
               <a:t>Test.</a:t>
             </a:r>
-            <a:endParaRPr lang="en-US" altLang="zh-CN"/>
           </a:p>
           <a:p>
             <a:endParaRPr lang="en-US" altLang="zh-CN"/>
@@ -23179,6 +22765,400 @@
         </p:txBody>
       </p:sp>
     </p:spTree>
+  </p:cSld>
+  <p:clrMapOvr>
+    <a:masterClrMapping/>
+  </p:clrMapOvr>
+</p:sld>
+</file>
+
+<file path=ppt/slides/slide30.xml><?xml version="1.0" encoding="utf-8"?>
+<p:sld xmlns:a="http://schemas.openxmlformats.org/drawingml/2006/main" xmlns:r="http://schemas.openxmlformats.org/officeDocument/2006/relationships" xmlns:p="http://schemas.openxmlformats.org/presentationml/2006/main">
+  <p:cSld>
+    <p:spTree>
+      <p:nvGrpSpPr>
+        <p:cNvPr id="1" name=""/>
+        <p:cNvGrpSpPr/>
+        <p:nvPr/>
+      </p:nvGrpSpPr>
+      <p:grpSpPr>
+        <a:xfrm>
+          <a:off x="0" y="0"/>
+          <a:ext cx="0" cy="0"/>
+          <a:chOff x="0" y="0"/>
+          <a:chExt cx="0" cy="0"/>
+        </a:xfrm>
+      </p:grpSpPr>
+      <p:sp>
+        <p:nvSpPr>
+          <p:cNvPr id="2" name="标题 1"/>
+          <p:cNvSpPr>
+            <a:spLocks noGrp="1"/>
+          </p:cNvSpPr>
+          <p:nvPr>
+            <p:ph type="title"/>
+          </p:nvPr>
+        </p:nvSpPr>
+        <p:spPr>
+          <a:xfrm>
+            <a:off x="732180" y="942390"/>
+            <a:ext cx="9848736" cy="3657601"/>
+          </a:xfrm>
+        </p:spPr>
+        <p:txBody>
+          <a:bodyPr>
+            <a:normAutofit/>
+          </a:bodyPr>
+          <a:lstStyle/>
+          <a:p>
+            <a:r>
+              <a:rPr kumimoji="1" lang="en-US" altLang="zh-CN" sz="2400" dirty="0"/>
+              <a:t>3. Write a program to implement a simple calculator. Print five arithmetic operators as a menu for user to select. When the user inputs an operator and two operands(suppose both are integers and in the int range),show the answer on the screen. After that, ask the user whether the operation needs to continue.</a:t>
+            </a:r>
+            <a:r>
+              <a:rPr kumimoji="1" lang="zh-CN" altLang="en-US" sz="2400" dirty="0"/>
+              <a:t> </a:t>
+            </a:r>
+            <a:r>
+              <a:rPr kumimoji="1" lang="en-US" altLang="zh-CN" sz="2400" dirty="0"/>
+              <a:t>The</a:t>
+            </a:r>
+            <a:r>
+              <a:rPr kumimoji="1" lang="zh-CN" altLang="en-US" sz="2400" dirty="0"/>
+              <a:t> </a:t>
+            </a:r>
+            <a:r>
+              <a:rPr kumimoji="1" lang="en-US" altLang="zh-CN" sz="2400" dirty="0"/>
+              <a:t>operation</a:t>
+            </a:r>
+            <a:r>
+              <a:rPr kumimoji="1" lang="zh-CN" altLang="en-US" sz="2400" dirty="0"/>
+              <a:t> </a:t>
+            </a:r>
+            <a:r>
+              <a:rPr kumimoji="1" lang="en-US" altLang="zh-CN" sz="2400" dirty="0"/>
+              <a:t>will</a:t>
+            </a:r>
+            <a:r>
+              <a:rPr kumimoji="1" lang="zh-CN" altLang="en-US" sz="2400" dirty="0"/>
+              <a:t> </a:t>
+            </a:r>
+            <a:r>
+              <a:rPr kumimoji="1" lang="en-US" altLang="zh-CN" sz="2400" dirty="0"/>
+              <a:t>be</a:t>
+            </a:r>
+            <a:r>
+              <a:rPr kumimoji="1" lang="zh-CN" altLang="en-US" sz="2400" dirty="0"/>
+              <a:t> </a:t>
+            </a:r>
+            <a:r>
+              <a:rPr kumimoji="1" lang="en-US" altLang="zh-CN" sz="2400" dirty="0"/>
+              <a:t>over</a:t>
+            </a:r>
+            <a:r>
+              <a:rPr kumimoji="1" lang="zh-CN" altLang="en-US" sz="2400" dirty="0"/>
+              <a:t> </a:t>
+            </a:r>
+            <a:r>
+              <a:rPr kumimoji="1" lang="en-US" altLang="zh-CN" sz="2400" dirty="0"/>
+              <a:t>if</a:t>
+            </a:r>
+            <a:r>
+              <a:rPr kumimoji="1" lang="zh-CN" altLang="en-US" sz="2400" dirty="0"/>
+              <a:t> </a:t>
+            </a:r>
+            <a:r>
+              <a:rPr kumimoji="1" lang="en-US" altLang="zh-CN" sz="2400" dirty="0"/>
+              <a:t>the</a:t>
+            </a:r>
+            <a:r>
+              <a:rPr kumimoji="1" lang="zh-CN" altLang="en-US" sz="2400" dirty="0"/>
+              <a:t> </a:t>
+            </a:r>
+            <a:r>
+              <a:rPr kumimoji="1" lang="en-US" altLang="zh-CN" sz="2400" dirty="0"/>
+              <a:t>user</a:t>
+            </a:r>
+            <a:r>
+              <a:rPr kumimoji="1" lang="zh-CN" altLang="en-US" sz="2400" dirty="0"/>
+              <a:t> </a:t>
+            </a:r>
+            <a:r>
+              <a:rPr kumimoji="1" lang="en-US" altLang="zh-CN" sz="2400" dirty="0"/>
+              <a:t>wants</a:t>
+            </a:r>
+            <a:r>
+              <a:rPr kumimoji="1" lang="zh-CN" altLang="en-US" sz="2400" dirty="0"/>
+              <a:t> </a:t>
+            </a:r>
+            <a:r>
+              <a:rPr kumimoji="1" lang="en-US" altLang="zh-CN" sz="2400" dirty="0"/>
+              <a:t>to</a:t>
+            </a:r>
+            <a:r>
+              <a:rPr kumimoji="1" lang="zh-CN" altLang="en-US" sz="2400" dirty="0"/>
+              <a:t> </a:t>
+            </a:r>
+            <a:r>
+              <a:rPr kumimoji="1" lang="en-US" altLang="zh-CN" sz="2400" dirty="0"/>
+              <a:t>exit. Every operation must be define as a function. Your program must use </a:t>
+            </a:r>
+            <a:r>
+              <a:rPr kumimoji="1" lang="en-US" altLang="zh-CN" sz="2400" b="1" dirty="0"/>
+              <a:t>switch statement </a:t>
+            </a:r>
+            <a:r>
+              <a:rPr kumimoji="1" lang="en-US" altLang="zh-CN" sz="2400" dirty="0"/>
+              <a:t>to select an operator and can handle if the dividend is zero. Write a </a:t>
+            </a:r>
+            <a:r>
+              <a:rPr kumimoji="1" lang="en-US" altLang="zh-CN" sz="2400" b="1" dirty="0" err="1"/>
+              <a:t>makefile</a:t>
+            </a:r>
+            <a:r>
+              <a:rPr kumimoji="1" lang="en-US" altLang="zh-CN" sz="2400" b="1" dirty="0"/>
+              <a:t> </a:t>
+            </a:r>
+            <a:r>
+              <a:rPr kumimoji="1" lang="en-US" altLang="zh-CN" sz="2400" dirty="0"/>
+              <a:t>to complete the compilation.</a:t>
+            </a:r>
+            <a:br>
+              <a:rPr kumimoji="1" lang="en-US" altLang="zh-CN" sz="2400" dirty="0"/>
+            </a:br>
+            <a:endParaRPr kumimoji="1" lang="zh-CN" altLang="en-US" sz="2400" dirty="0"/>
+          </a:p>
+        </p:txBody>
+      </p:sp>
+      <p:sp>
+        <p:nvSpPr>
+          <p:cNvPr id="10" name="Title 1"/>
+          <p:cNvSpPr txBox="1"/>
+          <p:nvPr/>
+        </p:nvSpPr>
+        <p:spPr>
+          <a:xfrm>
+            <a:off x="1195970" y="368559"/>
+            <a:ext cx="8100392" cy="685800"/>
+          </a:xfrm>
+          <a:prstGeom prst="rect">
+            <a:avLst/>
+          </a:prstGeom>
+        </p:spPr>
+        <p:txBody>
+          <a:bodyPr vert="horz" lIns="91440" tIns="45720" rIns="91440" bIns="45720" rtlCol="0" anchor="ctr">
+            <a:noAutofit/>
+          </a:bodyPr>
+          <a:lstStyle>
+            <a:lvl1pPr algn="l" defTabSz="914400" rtl="0" eaLnBrk="1" latinLnBrk="0" hangingPunct="1">
+              <a:lnSpc>
+                <a:spcPct val="90000"/>
+              </a:lnSpc>
+              <a:spcBef>
+                <a:spcPct val="0"/>
+              </a:spcBef>
+              <a:buNone/>
+              <a:defRPr sz="4400" kern="1200">
+                <a:solidFill>
+                  <a:schemeClr val="tx1"/>
+                </a:solidFill>
+                <a:latin typeface="+mj-lt"/>
+                <a:ea typeface="+mj-ea"/>
+                <a:cs typeface="+mj-cs"/>
+              </a:defRPr>
+            </a:lvl1pPr>
+          </a:lstStyle>
+          <a:p>
+            <a:pPr marL="0" marR="0" lvl="0" indent="0" algn="l" defTabSz="914400" rtl="0" eaLnBrk="1" fontAlgn="auto" latinLnBrk="0" hangingPunct="1">
+              <a:lnSpc>
+                <a:spcPct val="90000"/>
+              </a:lnSpc>
+              <a:spcBef>
+                <a:spcPct val="0"/>
+              </a:spcBef>
+              <a:spcAft>
+                <a:spcPts val="0"/>
+              </a:spcAft>
+              <a:buClrTx/>
+              <a:buSzTx/>
+              <a:buFontTx/>
+              <a:buNone/>
+              <a:tabLst/>
+              <a:defRPr/>
+            </a:pPr>
+            <a:r>
+              <a:rPr kumimoji="0" lang="en-US" altLang="zh-CN" sz="3600" b="1" i="0" u="none" strike="noStrike" kern="1200" cap="none" spc="0" normalizeH="0" baseline="0" noProof="0" dirty="0">
+                <a:ln>
+                  <a:noFill/>
+                </a:ln>
+                <a:solidFill>
+                  <a:prstClr val="black"/>
+                </a:solidFill>
+                <a:effectLst/>
+                <a:uLnTx/>
+                <a:uFillTx/>
+                <a:latin typeface="Calibri" panose="020F0502020204030204"/>
+                <a:ea typeface="宋体" panose="02010600030101010101" pitchFamily="2" charset="-122"/>
+                <a:cs typeface="+mj-cs"/>
+              </a:rPr>
+              <a:t> Exercises</a:t>
+            </a:r>
+          </a:p>
+        </p:txBody>
+      </p:sp>
+    </p:spTree>
+    <p:extLst>
+      <p:ext uri="{BB962C8B-B14F-4D97-AF65-F5344CB8AC3E}">
+        <p14:creationId xmlns:p14="http://schemas.microsoft.com/office/powerpoint/2010/main" val="4115142739"/>
+      </p:ext>
+    </p:extLst>
+  </p:cSld>
+  <p:clrMapOvr>
+    <a:masterClrMapping/>
+  </p:clrMapOvr>
+</p:sld>
+</file>
+
+<file path=ppt/slides/slide31.xml><?xml version="1.0" encoding="utf-8"?>
+<p:sld xmlns:a="http://schemas.openxmlformats.org/drawingml/2006/main" xmlns:r="http://schemas.openxmlformats.org/officeDocument/2006/relationships" xmlns:p="http://schemas.openxmlformats.org/presentationml/2006/main">
+  <p:cSld>
+    <p:spTree>
+      <p:nvGrpSpPr>
+        <p:cNvPr id="1" name=""/>
+        <p:cNvGrpSpPr/>
+        <p:nvPr/>
+      </p:nvGrpSpPr>
+      <p:grpSpPr>
+        <a:xfrm>
+          <a:off x="0" y="0"/>
+          <a:ext cx="0" cy="0"/>
+          <a:chOff x="0" y="0"/>
+          <a:chExt cx="0" cy="0"/>
+        </a:xfrm>
+      </p:grpSpPr>
+      <p:grpSp>
+        <p:nvGrpSpPr>
+          <p:cNvPr id="14" name="组合 13">
+            <a:extLst>
+              <a:ext uri="{FF2B5EF4-FFF2-40B4-BE49-F238E27FC236}">
+                <a16:creationId xmlns:a16="http://schemas.microsoft.com/office/drawing/2014/main" id="{F063E835-A49A-43F2-9492-0095C59F50BE}"/>
+              </a:ext>
+            </a:extLst>
+          </p:cNvPr>
+          <p:cNvGrpSpPr/>
+          <p:nvPr/>
+        </p:nvGrpSpPr>
+        <p:grpSpPr>
+          <a:xfrm>
+            <a:off x="3651282" y="735660"/>
+            <a:ext cx="5086350" cy="5934075"/>
+            <a:chOff x="2578261" y="185154"/>
+            <a:chExt cx="5086350" cy="5934075"/>
+          </a:xfrm>
+        </p:grpSpPr>
+        <p:pic>
+          <p:nvPicPr>
+            <p:cNvPr id="9" name="图片 8">
+              <a:extLst>
+                <a:ext uri="{FF2B5EF4-FFF2-40B4-BE49-F238E27FC236}">
+                  <a16:creationId xmlns:a16="http://schemas.microsoft.com/office/drawing/2014/main" id="{E4B32AFF-3F40-4EDC-AC2E-9C98D9D8497E}"/>
+                </a:ext>
+              </a:extLst>
+            </p:cNvPr>
+            <p:cNvPicPr>
+              <a:picLocks noChangeAspect="1"/>
+            </p:cNvPicPr>
+            <p:nvPr/>
+          </p:nvPicPr>
+          <p:blipFill>
+            <a:blip r:embed="rId2"/>
+            <a:stretch>
+              <a:fillRect/>
+            </a:stretch>
+          </p:blipFill>
+          <p:spPr>
+            <a:xfrm>
+              <a:off x="2587592" y="185154"/>
+              <a:ext cx="5038725" cy="2886075"/>
+            </a:xfrm>
+            <a:prstGeom prst="rect">
+              <a:avLst/>
+            </a:prstGeom>
+          </p:spPr>
+        </p:pic>
+        <p:pic>
+          <p:nvPicPr>
+            <p:cNvPr id="13" name="图片 12">
+              <a:extLst>
+                <a:ext uri="{FF2B5EF4-FFF2-40B4-BE49-F238E27FC236}">
+                  <a16:creationId xmlns:a16="http://schemas.microsoft.com/office/drawing/2014/main" id="{65F7566B-54D5-46AA-A628-C3CB6143DC2B}"/>
+                </a:ext>
+              </a:extLst>
+            </p:cNvPr>
+            <p:cNvPicPr>
+              <a:picLocks noChangeAspect="1"/>
+            </p:cNvPicPr>
+            <p:nvPr/>
+          </p:nvPicPr>
+          <p:blipFill>
+            <a:blip r:embed="rId3"/>
+            <a:stretch>
+              <a:fillRect/>
+            </a:stretch>
+          </p:blipFill>
+          <p:spPr>
+            <a:xfrm>
+              <a:off x="2578261" y="3071229"/>
+              <a:ext cx="5086350" cy="3048000"/>
+            </a:xfrm>
+            <a:prstGeom prst="rect">
+              <a:avLst/>
+            </a:prstGeom>
+          </p:spPr>
+        </p:pic>
+      </p:grpSp>
+      <p:sp>
+        <p:nvSpPr>
+          <p:cNvPr id="15" name="文本框 14">
+            <a:extLst>
+              <a:ext uri="{FF2B5EF4-FFF2-40B4-BE49-F238E27FC236}">
+                <a16:creationId xmlns:a16="http://schemas.microsoft.com/office/drawing/2014/main" id="{85973033-F24C-4E28-9AAF-282B05676675}"/>
+              </a:ext>
+            </a:extLst>
+          </p:cNvPr>
+          <p:cNvSpPr txBox="1"/>
+          <p:nvPr/>
+        </p:nvSpPr>
+        <p:spPr>
+          <a:xfrm>
+            <a:off x="1679510" y="895739"/>
+            <a:ext cx="1646605" cy="369332"/>
+          </a:xfrm>
+          <a:prstGeom prst="rect">
+            <a:avLst/>
+          </a:prstGeom>
+          <a:noFill/>
+        </p:spPr>
+        <p:txBody>
+          <a:bodyPr wrap="none" rtlCol="0">
+            <a:spAutoFit/>
+          </a:bodyPr>
+          <a:lstStyle/>
+          <a:p>
+            <a:r>
+              <a:rPr lang="en-US" altLang="zh-CN" dirty="0"/>
+              <a:t>Output sample:</a:t>
+            </a:r>
+            <a:endParaRPr lang="zh-CN" altLang="en-US" dirty="0"/>
+          </a:p>
+        </p:txBody>
+      </p:sp>
+    </p:spTree>
+    <p:extLst>
+      <p:ext uri="{BB962C8B-B14F-4D97-AF65-F5344CB8AC3E}">
+        <p14:creationId xmlns:p14="http://schemas.microsoft.com/office/powerpoint/2010/main" val="2175447714"/>
+      </p:ext>
+    </p:extLst>
   </p:cSld>
   <p:clrMapOvr>
     <a:masterClrMapping/>
@@ -23195,7 +23175,14 @@
         <p:cNvGrpSpPr/>
         <p:nvPr/>
       </p:nvGrpSpPr>
-      <p:grpSpPr/>
+      <p:grpSpPr>
+        <a:xfrm>
+          <a:off x="0" y="0"/>
+          <a:ext cx="0" cy="0"/>
+          <a:chOff x="0" y="0"/>
+          <a:chExt cx="0" cy="0"/>
+        </a:xfrm>
+      </p:grpSpPr>
       <p:sp>
         <p:nvSpPr>
           <p:cNvPr id="2" name="标题 1"/>
@@ -23211,6 +23198,7 @@
           <a:bodyPr>
             <a:normAutofit/>
           </a:bodyPr>
+          <a:lstStyle/>
           <a:p>
             <a:r>
               <a:rPr lang="en-US" altLang="zh-CN">
@@ -23240,12 +23228,12 @@
         </p:spPr>
         <p:txBody>
           <a:bodyPr/>
+          <a:lstStyle/>
           <a:p>
             <a:r>
               <a:rPr lang="en-US" altLang="zh-CN"/>
               <a:t>Be clear of what you want with a calculator.</a:t>
             </a:r>
-            <a:endParaRPr lang="en-US" altLang="zh-CN"/>
           </a:p>
           <a:p>
             <a:endParaRPr lang="en-US" altLang="zh-CN"/>
@@ -23255,7 +23243,6 @@
               <a:rPr lang="en-US" altLang="zh-CN"/>
               <a:t>integers, floating point numbers, complex numbers?</a:t>
             </a:r>
-            <a:endParaRPr lang="en-US" altLang="zh-CN"/>
           </a:p>
           <a:p>
             <a:endParaRPr lang="en-US" altLang="zh-CN"/>
@@ -23265,7 +23252,6 @@
               <a:rPr lang="en-US" altLang="zh-CN"/>
               <a:t>addition, substraction, multiplication, division, sine, cosine,...,power?</a:t>
             </a:r>
-            <a:endParaRPr lang="en-US" altLang="zh-CN"/>
           </a:p>
           <a:p>
             <a:endParaRPr lang="en-US" altLang="zh-CN"/>
@@ -23275,7 +23261,6 @@
               <a:rPr lang="en-US" altLang="zh-CN"/>
               <a:t>graphic user interface, drawing graphs, storing variables?</a:t>
             </a:r>
-            <a:endParaRPr lang="en-US" altLang="zh-CN"/>
           </a:p>
         </p:txBody>
       </p:sp>
@@ -23296,7 +23281,14 @@
         <p:cNvGrpSpPr/>
         <p:nvPr/>
       </p:nvGrpSpPr>
-      <p:grpSpPr/>
+      <p:grpSpPr>
+        <a:xfrm>
+          <a:off x="0" y="0"/>
+          <a:ext cx="0" cy="0"/>
+          <a:chOff x="0" y="0"/>
+          <a:chExt cx="0" cy="0"/>
+        </a:xfrm>
+      </p:grpSpPr>
       <p:sp>
         <p:nvSpPr>
           <p:cNvPr id="8" name="矩形 7"/>
@@ -23336,6 +23328,7 @@
         </p:style>
         <p:txBody>
           <a:bodyPr rtlCol="0" anchor="ctr"/>
+          <a:lstStyle/>
           <a:p>
             <a:pPr algn="ctr"/>
             <a:endParaRPr lang="zh-CN" altLang="en-US"/>
@@ -23381,6 +23374,7 @@
         </p:style>
         <p:txBody>
           <a:bodyPr rtlCol="0" anchor="ctr"/>
+          <a:lstStyle/>
           <a:p>
             <a:pPr algn="ctr"/>
             <a:endParaRPr lang="zh-CN" altLang="en-US"/>
@@ -23400,18 +23394,13 @@
         <p:spPr/>
         <p:txBody>
           <a:bodyPr/>
+          <a:lstStyle/>
           <a:p>
             <a:r>
               <a:rPr lang="en-US" altLang="zh-CN">
                 <a:sym typeface="+mn-ea"/>
               </a:rPr>
-              <a:t>Making a calculator: </a:t>
-            </a:r>
-            <a:r>
-              <a:rPr lang="en-US" altLang="zh-CN">
-                <a:sym typeface="+mn-ea"/>
-              </a:rPr>
-              <a:t>Design system</a:t>
+              <a:t>Making a calculator: Design system</a:t>
             </a:r>
             <a:endParaRPr lang="zh-CN" altLang="en-US"/>
           </a:p>
@@ -23430,12 +23419,12 @@
         <p:spPr/>
         <p:txBody>
           <a:bodyPr/>
+          <a:lstStyle/>
           <a:p>
             <a:r>
               <a:rPr lang="en-US" altLang="zh-CN"/>
               <a:t>You need to design basic framework of your system.</a:t>
             </a:r>
-            <a:endParaRPr lang="en-US" altLang="zh-CN"/>
           </a:p>
           <a:p>
             <a:endParaRPr lang="en-US" altLang="zh-CN"/>
@@ -23445,7 +23434,6 @@
               <a:rPr lang="en-US" altLang="zh-CN"/>
               <a:t>Which one do you prefer? Left or right?</a:t>
             </a:r>
-            <a:endParaRPr lang="en-US" altLang="zh-CN"/>
           </a:p>
           <a:p>
             <a:pPr marL="0" indent="0">
@@ -23475,13 +23463,13 @@
           <a:bodyPr wrap="none" rtlCol="0">
             <a:spAutoFit/>
           </a:bodyPr>
+          <a:lstStyle/>
           <a:p>
             <a:pPr algn="l"/>
             <a:r>
               <a:rPr lang="en-US" altLang="zh-CN"/>
               <a:t>Panel panel();</a:t>
             </a:r>
-            <a:endParaRPr lang="en-US" altLang="zh-CN"/>
           </a:p>
           <a:p>
             <a:pPr algn="l"/>
@@ -23489,7 +23477,6 @@
               <a:rPr lang="en-US" altLang="zh-CN"/>
               <a:t>Button button1;</a:t>
             </a:r>
-            <a:endParaRPr lang="en-US" altLang="zh-CN"/>
           </a:p>
           <a:p>
             <a:pPr algn="l"/>
@@ -23516,14 +23503,12 @@
               <a:rPr lang="en-US" altLang="zh-CN"/>
               <a:t>......</a:t>
             </a:r>
-            <a:endParaRPr lang="en-US" altLang="zh-CN"/>
           </a:p>
           <a:p>
             <a:r>
               <a:rPr lang="en-US" altLang="zh-CN"/>
               <a:t>Button buttonEquals;</a:t>
             </a:r>
-            <a:endParaRPr lang="en-US" altLang="zh-CN"/>
           </a:p>
           <a:p>
             <a:endParaRPr lang="en-US" altLang="zh-CN"/>
@@ -23533,7 +23518,6 @@
               <a:rPr lang="en-US" altLang="zh-CN"/>
               <a:t>buttonEquals.addActionListener(...)</a:t>
             </a:r>
-            <a:endParaRPr lang="en-US" altLang="zh-CN"/>
           </a:p>
         </p:txBody>
       </p:sp>
@@ -23557,61 +23541,54 @@
           <a:bodyPr wrap="none" rtlCol="0">
             <a:spAutoFit/>
           </a:bodyPr>
+          <a:lstStyle/>
           <a:p>
             <a:r>
               <a:rPr lang="en-US" altLang="zh-CN"/>
               <a:t>int main() {</a:t>
             </a:r>
-            <a:endParaRPr lang="en-US" altLang="zh-CN"/>
           </a:p>
           <a:p>
             <a:r>
               <a:rPr lang="en-US" altLang="zh-CN"/>
               <a:t>    prepareUI();</a:t>
             </a:r>
-            <a:endParaRPr lang="en-US" altLang="zh-CN"/>
           </a:p>
           <a:p>
             <a:r>
               <a:rPr lang="en-US" altLang="zh-CN"/>
               <a:t>    while( true ) {</a:t>
             </a:r>
-            <a:endParaRPr lang="en-US" altLang="zh-CN"/>
           </a:p>
           <a:p>
             <a:r>
               <a:rPr lang="en-US" altLang="zh-CN"/>
               <a:t>        string s = getQuestionFromInput();</a:t>
             </a:r>
-            <a:endParaRPr lang="en-US" altLang="zh-CN"/>
           </a:p>
           <a:p>
             <a:r>
               <a:rPr lang="en-US" altLang="zh-CN"/>
               <a:t>        processQuestion(s);</a:t>
             </a:r>
-            <a:endParaRPr lang="en-US" altLang="zh-CN"/>
           </a:p>
           <a:p>
             <a:r>
               <a:rPr lang="en-US" altLang="zh-CN"/>
               <a:t>        wait(16);</a:t>
             </a:r>
-            <a:endParaRPr lang="en-US" altLang="zh-CN"/>
           </a:p>
           <a:p>
             <a:r>
               <a:rPr lang="en-US" altLang="zh-CN"/>
               <a:t>    }</a:t>
             </a:r>
-            <a:endParaRPr lang="en-US" altLang="zh-CN"/>
           </a:p>
           <a:p>
             <a:r>
               <a:rPr lang="en-US" altLang="zh-CN"/>
               <a:t>}</a:t>
             </a:r>
-            <a:endParaRPr lang="en-US" altLang="zh-CN"/>
           </a:p>
         </p:txBody>
       </p:sp>
@@ -23632,7 +23609,14 @@
         <p:cNvGrpSpPr/>
         <p:nvPr/>
       </p:nvGrpSpPr>
-      <p:grpSpPr/>
+      <p:grpSpPr>
+        <a:xfrm>
+          <a:off x="0" y="0"/>
+          <a:ext cx="0" cy="0"/>
+          <a:chOff x="0" y="0"/>
+          <a:chExt cx="0" cy="0"/>
+        </a:xfrm>
+      </p:grpSpPr>
       <p:sp>
         <p:nvSpPr>
           <p:cNvPr id="2" name="标题 1"/>
@@ -23646,18 +23630,13 @@
         <p:spPr/>
         <p:txBody>
           <a:bodyPr/>
+          <a:lstStyle/>
           <a:p>
             <a:r>
               <a:rPr lang="en-US" altLang="zh-CN">
                 <a:sym typeface="+mn-ea"/>
               </a:rPr>
-              <a:t>Making a calculator: </a:t>
-            </a:r>
-            <a:r>
-              <a:rPr lang="en-US" altLang="zh-CN">
-                <a:sym typeface="+mn-ea"/>
-              </a:rPr>
-              <a:t>Design data types</a:t>
+              <a:t>Making a calculator: Design data types</a:t>
             </a:r>
             <a:endParaRPr lang="zh-CN" altLang="en-US"/>
           </a:p>
@@ -23676,12 +23655,12 @@
         <p:spPr/>
         <p:txBody>
           <a:bodyPr/>
+          <a:lstStyle/>
           <a:p>
             <a:r>
               <a:rPr lang="en-US" altLang="zh-CN"/>
               <a:t>Which data types do you choose?  int, float, long long?</a:t>
             </a:r>
-            <a:endParaRPr lang="en-US" altLang="zh-CN"/>
           </a:p>
           <a:p>
             <a:endParaRPr lang="en-US" altLang="zh-CN"/>
@@ -23691,7 +23670,6 @@
               <a:rPr lang="en-US" altLang="zh-CN"/>
               <a:t>It’s inevitable that user will need number larger than max value of long long int.</a:t>
             </a:r>
-            <a:endParaRPr lang="en-US" altLang="zh-CN"/>
           </a:p>
           <a:p>
             <a:endParaRPr lang="en-US" altLang="zh-CN"/>
@@ -23701,7 +23679,6 @@
               <a:rPr lang="en-US" altLang="zh-CN"/>
               <a:t>Need to use high precision calculation.</a:t>
             </a:r>
-            <a:endParaRPr lang="en-US" altLang="zh-CN"/>
           </a:p>
           <a:p>
             <a:endParaRPr lang="en-US" altLang="zh-CN"/>
@@ -23725,7 +23702,14 @@
         <p:cNvGrpSpPr/>
         <p:nvPr/>
       </p:nvGrpSpPr>
-      <p:grpSpPr/>
+      <p:grpSpPr>
+        <a:xfrm>
+          <a:off x="0" y="0"/>
+          <a:ext cx="0" cy="0"/>
+          <a:chOff x="0" y="0"/>
+          <a:chExt cx="0" cy="0"/>
+        </a:xfrm>
+      </p:grpSpPr>
       <p:sp>
         <p:nvSpPr>
           <p:cNvPr id="6" name="矩形 5"/>
@@ -23759,6 +23743,7 @@
         </p:style>
         <p:txBody>
           <a:bodyPr rtlCol="0" anchor="ctr"/>
+          <a:lstStyle/>
           <a:p>
             <a:pPr algn="ctr"/>
             <a:endParaRPr lang="zh-CN" altLang="en-US"/>
@@ -23780,6 +23765,7 @@
           <a:bodyPr>
             <a:normAutofit/>
           </a:bodyPr>
+          <a:lstStyle/>
           <a:p>
             <a:r>
               <a:rPr lang="en-US" altLang="zh-CN">
@@ -23804,6 +23790,7 @@
         <p:spPr/>
         <p:txBody>
           <a:bodyPr/>
+          <a:lstStyle/>
           <a:p>
             <a:r>
               <a:rPr lang="en-US" altLang="zh-CN">
@@ -23811,16 +23798,12 @@
               </a:rPr>
               <a:t>Need to use high precision calculation.</a:t>
             </a:r>
-            <a:endParaRPr lang="en-US" altLang="zh-CN">
-              <a:sym typeface="+mn-ea"/>
-            </a:endParaRPr>
           </a:p>
           <a:p>
             <a:r>
               <a:rPr lang="en-US" altLang="zh-CN"/>
               <a:t>Use arrays to store an integer (be very careful with array index).</a:t>
             </a:r>
-            <a:endParaRPr lang="en-US" altLang="zh-CN"/>
           </a:p>
         </p:txBody>
       </p:sp>
@@ -23833,7 +23816,7 @@
           <p:nvPr/>
         </p:nvPicPr>
         <p:blipFill>
-          <a:blip r:embed="rId1"/>
+          <a:blip r:embed="rId2"/>
           <a:stretch>
             <a:fillRect/>
           </a:stretch>
@@ -23865,7 +23848,14 @@
         <p:cNvGrpSpPr/>
         <p:nvPr/>
       </p:nvGrpSpPr>
-      <p:grpSpPr/>
+      <p:grpSpPr>
+        <a:xfrm>
+          <a:off x="0" y="0"/>
+          <a:ext cx="0" cy="0"/>
+          <a:chOff x="0" y="0"/>
+          <a:chExt cx="0" cy="0"/>
+        </a:xfrm>
+      </p:grpSpPr>
       <p:sp>
         <p:nvSpPr>
           <p:cNvPr id="2" name="标题 1"/>
@@ -23879,6 +23869,7 @@
         <p:spPr/>
         <p:txBody>
           <a:bodyPr/>
+          <a:lstStyle/>
           <a:p>
             <a:r>
               <a:rPr lang="en-US" altLang="zh-CN">
@@ -23903,12 +23894,12 @@
         <p:spPr/>
         <p:txBody>
           <a:bodyPr/>
+          <a:lstStyle/>
           <a:p>
             <a:r>
               <a:rPr lang="en-US" altLang="en-US"/>
               <a:t>What about floating point?</a:t>
             </a:r>
-            <a:endParaRPr lang="en-US" altLang="en-US"/>
           </a:p>
           <a:p>
             <a:r>
@@ -23922,7 +23913,6 @@
               <a:rPr lang="en-US" altLang="zh-CN"/>
               <a:t>Possible solution:</a:t>
             </a:r>
-            <a:endParaRPr lang="en-US" altLang="zh-CN"/>
           </a:p>
           <a:p>
             <a:r>
@@ -23941,7 +23931,6 @@
               <a:rPr lang="en-US" altLang="zh-CN"/>
               <a:t>;</a:t>
             </a:r>
-            <a:endParaRPr lang="en-US" altLang="zh-CN"/>
           </a:p>
           <a:p>
             <a:r>
@@ -23960,7 +23949,6 @@
               <a:rPr lang="en-US" altLang="zh-CN"/>
               <a:t>;</a:t>
             </a:r>
-            <a:endParaRPr lang="en-US" altLang="zh-CN"/>
           </a:p>
           <a:p>
             <a:r>
@@ -23987,11 +23975,6 @@
               </a:rPr>
               <a:t>scale</a:t>
             </a:r>
-            <a:endParaRPr lang="en-US" altLang="zh-CN">
-              <a:solidFill>
-                <a:srgbClr val="FF0000"/>
-              </a:solidFill>
-            </a:endParaRPr>
           </a:p>
         </p:txBody>
       </p:sp>
@@ -24012,7 +23995,14 @@
         <p:cNvGrpSpPr/>
         <p:nvPr/>
       </p:nvGrpSpPr>
-      <p:grpSpPr/>
+      <p:grpSpPr>
+        <a:xfrm>
+          <a:off x="0" y="0"/>
+          <a:ext cx="0" cy="0"/>
+          <a:chOff x="0" y="0"/>
+          <a:chExt cx="0" cy="0"/>
+        </a:xfrm>
+      </p:grpSpPr>
       <p:sp>
         <p:nvSpPr>
           <p:cNvPr id="2" name="标题 1"/>
@@ -24026,18 +24016,13 @@
         <p:spPr/>
         <p:txBody>
           <a:bodyPr/>
+          <a:lstStyle/>
           <a:p>
             <a:r>
               <a:rPr lang="en-US" altLang="zh-CN">
                 <a:sym typeface="+mn-ea"/>
               </a:rPr>
-              <a:t>Making a calculator: </a:t>
-            </a:r>
-            <a:r>
-              <a:rPr lang="en-US" altLang="zh-CN">
-                <a:sym typeface="+mn-ea"/>
-              </a:rPr>
-              <a:t>Performance issue</a:t>
+              <a:t>Making a calculator: Performance issue</a:t>
             </a:r>
             <a:endParaRPr lang="zh-CN" altLang="en-US"/>
           </a:p>
@@ -24056,12 +24041,12 @@
         <p:spPr/>
         <p:txBody>
           <a:bodyPr/>
-          <a:p>
-            <a:r>
-              <a:rPr lang="en-US" altLang="zh-CN"/>
-              <a:t>How to do multiplycations with reversely arranged array?</a:t>
-            </a:r>
-            <a:endParaRPr lang="en-US" altLang="zh-CN"/>
+          <a:lstStyle/>
+          <a:p>
+            <a:r>
+              <a:rPr lang="en-US" altLang="zh-CN" dirty="0"/>
+              <a:t>How to do multiplications with reversely arranged array?</a:t>
+            </a:r>
           </a:p>
         </p:txBody>
       </p:sp>
@@ -24074,7 +24059,7 @@
           <p:nvPr/>
         </p:nvPicPr>
         <p:blipFill>
-          <a:blip r:embed="rId1"/>
+          <a:blip r:embed="rId2"/>
           <a:stretch>
             <a:fillRect/>
           </a:stretch>
@@ -24348,6 +24333,8 @@
       </a:bgFillStyleLst>
     </a:fmtScheme>
   </a:themeElements>
+  <a:objectDefaults/>
+  <a:extraClrSchemeLst/>
   <a:extLst>
     <a:ext uri="{05A4C25C-085E-4340-85A3-A5531E510DB2}">
       <thm15:themeFamily xmlns:thm15="http://schemas.microsoft.com/office/thememl/2012/main" name="Office Theme" id="{62F939B6-93AF-4DB8-9C6B-D6C7DFDC589F}" vid="{4A3C46E8-61CC-4603-A589-7422A47A8E4A}"/>
@@ -24607,6 +24594,8 @@
       </a:bgFillStyleLst>
     </a:fmtScheme>
   </a:themeElements>
+  <a:objectDefaults/>
+  <a:extraClrSchemeLst/>
   <a:extLst>
     <a:ext uri="{05A4C25C-085E-4340-85A3-A5531E510DB2}">
       <thm15:themeFamily xmlns:thm15="http://schemas.microsoft.com/office/thememl/2012/main" name="Office Theme" id="{62F939B6-93AF-4DB8-9C6B-D6C7DFDC589F}" vid="{4A3C46E8-61CC-4603-A589-7422A47A8E4A}"/>
@@ -24866,6 +24855,8 @@
       </a:bgFillStyleLst>
     </a:fmtScheme>
   </a:themeElements>
+  <a:objectDefaults/>
+  <a:extraClrSchemeLst/>
   <a:extLst>
     <a:ext uri="{05A4C25C-085E-4340-85A3-A5531E510DB2}">
       <thm15:themeFamily xmlns:thm15="http://schemas.microsoft.com/office/thememl/2012/main" name="Office Theme" id="{62F939B6-93AF-4DB8-9C6B-D6C7DFDC589F}" vid="{4A3C46E8-61CC-4603-A589-7422A47A8E4A}"/>

</xml_diff>

<commit_message>
Lab03 update by Ms. Liao Qimei
</commit_message>
<xml_diff>
--- a/week03/Lab03.pptx
+++ b/week03/Lab03.pptx
@@ -6,7 +6,7 @@
     <p:sldMasterId id="2147483660" r:id="rId2"/>
   </p:sldMasterIdLst>
   <p:notesMasterIdLst>
-    <p:notesMasterId r:id="rId25"/>
+    <p:notesMasterId r:id="rId26"/>
   </p:notesMasterIdLst>
   <p:sldIdLst>
     <p:sldId id="256" r:id="rId3"/>
@@ -19,18 +19,19 @@
     <p:sldId id="584" r:id="rId10"/>
     <p:sldId id="595" r:id="rId11"/>
     <p:sldId id="586" r:id="rId12"/>
-    <p:sldId id="581" r:id="rId13"/>
-    <p:sldId id="601" r:id="rId14"/>
-    <p:sldId id="594" r:id="rId15"/>
-    <p:sldId id="573" r:id="rId16"/>
-    <p:sldId id="574" r:id="rId17"/>
-    <p:sldId id="577" r:id="rId18"/>
-    <p:sldId id="596" r:id="rId19"/>
-    <p:sldId id="597" r:id="rId20"/>
-    <p:sldId id="446" r:id="rId21"/>
-    <p:sldId id="598" r:id="rId22"/>
-    <p:sldId id="599" r:id="rId23"/>
-    <p:sldId id="600" r:id="rId24"/>
+    <p:sldId id="601" r:id="rId13"/>
+    <p:sldId id="581" r:id="rId14"/>
+    <p:sldId id="602" r:id="rId15"/>
+    <p:sldId id="594" r:id="rId16"/>
+    <p:sldId id="573" r:id="rId17"/>
+    <p:sldId id="574" r:id="rId18"/>
+    <p:sldId id="577" r:id="rId19"/>
+    <p:sldId id="596" r:id="rId20"/>
+    <p:sldId id="597" r:id="rId21"/>
+    <p:sldId id="446" r:id="rId22"/>
+    <p:sldId id="598" r:id="rId23"/>
+    <p:sldId id="599" r:id="rId24"/>
+    <p:sldId id="600" r:id="rId25"/>
   </p:sldIdLst>
   <p:sldSz cx="12192000" cy="6858000"/>
   <p:notesSz cx="6858000" cy="9144000"/>
@@ -6572,6 +6573,87 @@
           <a:chExt cx="0" cy="0"/>
         </a:xfrm>
       </p:grpSpPr>
+      <p:grpSp>
+        <p:nvGrpSpPr>
+          <p:cNvPr id="22" name="组合 21">
+            <a:extLst>
+              <a:ext uri="{FF2B5EF4-FFF2-40B4-BE49-F238E27FC236}">
+                <a16:creationId xmlns:a16="http://schemas.microsoft.com/office/drawing/2014/main" id="{DFED3F35-9ED4-8087-BF4A-F7AB596A9B94}"/>
+              </a:ext>
+            </a:extLst>
+          </p:cNvPr>
+          <p:cNvGrpSpPr/>
+          <p:nvPr/>
+        </p:nvGrpSpPr>
+        <p:grpSpPr>
+          <a:xfrm>
+            <a:off x="890096" y="2134924"/>
+            <a:ext cx="6997231" cy="2865936"/>
+            <a:chOff x="890096" y="2134924"/>
+            <a:chExt cx="6997231" cy="2865936"/>
+          </a:xfrm>
+        </p:grpSpPr>
+        <p:pic>
+          <p:nvPicPr>
+            <p:cNvPr id="5" name="图片 4">
+              <a:extLst>
+                <a:ext uri="{FF2B5EF4-FFF2-40B4-BE49-F238E27FC236}">
+                  <a16:creationId xmlns:a16="http://schemas.microsoft.com/office/drawing/2014/main" id="{462AB69A-3457-A41D-40C6-6C247F5D66E5}"/>
+                </a:ext>
+              </a:extLst>
+            </p:cNvPr>
+            <p:cNvPicPr>
+              <a:picLocks noChangeAspect="1"/>
+            </p:cNvPicPr>
+            <p:nvPr/>
+          </p:nvPicPr>
+          <p:blipFill>
+            <a:blip r:embed="rId2"/>
+            <a:stretch>
+              <a:fillRect/>
+            </a:stretch>
+          </p:blipFill>
+          <p:spPr>
+            <a:xfrm>
+              <a:off x="890096" y="2134924"/>
+              <a:ext cx="6997231" cy="2047970"/>
+            </a:xfrm>
+            <a:prstGeom prst="rect">
+              <a:avLst/>
+            </a:prstGeom>
+          </p:spPr>
+        </p:pic>
+        <p:pic>
+          <p:nvPicPr>
+            <p:cNvPr id="21" name="图片 20">
+              <a:extLst>
+                <a:ext uri="{FF2B5EF4-FFF2-40B4-BE49-F238E27FC236}">
+                  <a16:creationId xmlns:a16="http://schemas.microsoft.com/office/drawing/2014/main" id="{908BC8BD-7B27-3034-A9D5-48366AAF4B17}"/>
+                </a:ext>
+              </a:extLst>
+            </p:cNvPr>
+            <p:cNvPicPr>
+              <a:picLocks noChangeAspect="1"/>
+            </p:cNvPicPr>
+            <p:nvPr/>
+          </p:nvPicPr>
+          <p:blipFill>
+            <a:blip r:embed="rId3"/>
+            <a:stretch>
+              <a:fillRect/>
+            </a:stretch>
+          </p:blipFill>
+          <p:spPr>
+            <a:xfrm>
+              <a:off x="890096" y="4181710"/>
+              <a:ext cx="6997231" cy="819150"/>
+            </a:xfrm>
+            <a:prstGeom prst="rect">
+              <a:avLst/>
+            </a:prstGeom>
+          </p:spPr>
+        </p:pic>
+      </p:grpSp>
       <p:sp>
         <p:nvSpPr>
           <p:cNvPr id="2" name="标题 1"/>
@@ -6677,7 +6759,7 @@
         </p:nvSpPr>
         <p:spPr>
           <a:xfrm>
-            <a:off x="890096" y="4496188"/>
+            <a:off x="1088059" y="5064751"/>
             <a:ext cx="7806432" cy="1597124"/>
           </a:xfrm>
           <a:prstGeom prst="rect">
@@ -6785,36 +6867,6 @@
           </a:p>
         </p:txBody>
       </p:sp>
-      <p:pic>
-        <p:nvPicPr>
-          <p:cNvPr id="5" name="图片 4">
-            <a:extLst>
-              <a:ext uri="{FF2B5EF4-FFF2-40B4-BE49-F238E27FC236}">
-                <a16:creationId xmlns:a16="http://schemas.microsoft.com/office/drawing/2014/main" id="{462AB69A-3457-A41D-40C6-6C247F5D66E5}"/>
-              </a:ext>
-            </a:extLst>
-          </p:cNvPr>
-          <p:cNvPicPr>
-            <a:picLocks noChangeAspect="1"/>
-          </p:cNvPicPr>
-          <p:nvPr/>
-        </p:nvPicPr>
-        <p:blipFill>
-          <a:blip r:embed="rId2"/>
-          <a:stretch>
-            <a:fillRect/>
-          </a:stretch>
-        </p:blipFill>
-        <p:spPr>
-          <a:xfrm>
-            <a:off x="890096" y="2134924"/>
-            <a:ext cx="6997231" cy="2047970"/>
-          </a:xfrm>
-          <a:prstGeom prst="rect">
-            <a:avLst/>
-          </a:prstGeom>
-        </p:spPr>
-      </p:pic>
       <p:grpSp>
         <p:nvGrpSpPr>
           <p:cNvPr id="6" name="组合 5">
@@ -7165,6 +7217,182 @@
           </p:cxnSp>
         </p:grpSp>
       </p:grpSp>
+      <p:grpSp>
+        <p:nvGrpSpPr>
+          <p:cNvPr id="23" name="组合 22">
+            <a:extLst>
+              <a:ext uri="{FF2B5EF4-FFF2-40B4-BE49-F238E27FC236}">
+                <a16:creationId xmlns:a16="http://schemas.microsoft.com/office/drawing/2014/main" id="{52F89A8E-6761-4227-5EA7-74EB74B2F480}"/>
+              </a:ext>
+            </a:extLst>
+          </p:cNvPr>
+          <p:cNvGrpSpPr/>
+          <p:nvPr/>
+        </p:nvGrpSpPr>
+        <p:grpSpPr>
+          <a:xfrm>
+            <a:off x="4672289" y="3618710"/>
+            <a:ext cx="6375892" cy="739820"/>
+            <a:chOff x="4241260" y="1125882"/>
+            <a:chExt cx="6375892" cy="739820"/>
+          </a:xfrm>
+        </p:grpSpPr>
+        <p:sp>
+          <p:nvSpPr>
+            <p:cNvPr id="24" name="文本框 23">
+              <a:extLst>
+                <a:ext uri="{FF2B5EF4-FFF2-40B4-BE49-F238E27FC236}">
+                  <a16:creationId xmlns:a16="http://schemas.microsoft.com/office/drawing/2014/main" id="{235A0C79-0FEA-ACDA-58A6-F7F049D0BEC8}"/>
+                </a:ext>
+              </a:extLst>
+            </p:cNvPr>
+            <p:cNvSpPr txBox="1"/>
+            <p:nvPr/>
+          </p:nvSpPr>
+          <p:spPr>
+            <a:xfrm>
+              <a:off x="7515918" y="1125882"/>
+              <a:ext cx="3101234" cy="400110"/>
+            </a:xfrm>
+            <a:prstGeom prst="rect">
+              <a:avLst/>
+            </a:prstGeom>
+            <a:noFill/>
+          </p:spPr>
+          <p:txBody>
+            <a:bodyPr wrap="none" rtlCol="0">
+              <a:spAutoFit/>
+            </a:bodyPr>
+            <a:lstStyle/>
+            <a:p>
+              <a:r>
+                <a:rPr lang="en-US" altLang="zh-CN" sz="2000" dirty="0"/>
+                <a:t>Delete all the files in demo2</a:t>
+              </a:r>
+              <a:endParaRPr lang="zh-CN" altLang="en-US" sz="2000" dirty="0"/>
+            </a:p>
+          </p:txBody>
+        </p:sp>
+        <p:grpSp>
+          <p:nvGrpSpPr>
+            <p:cNvPr id="25" name="组合 24">
+              <a:extLst>
+                <a:ext uri="{FF2B5EF4-FFF2-40B4-BE49-F238E27FC236}">
+                  <a16:creationId xmlns:a16="http://schemas.microsoft.com/office/drawing/2014/main" id="{91D0F86F-38BF-1C7E-1E58-DEA9D6D7E05D}"/>
+                </a:ext>
+              </a:extLst>
+            </p:cNvPr>
+            <p:cNvGrpSpPr/>
+            <p:nvPr/>
+          </p:nvGrpSpPr>
+          <p:grpSpPr>
+            <a:xfrm>
+              <a:off x="4241260" y="1325937"/>
+              <a:ext cx="3274658" cy="539765"/>
+              <a:chOff x="4241260" y="3514670"/>
+              <a:chExt cx="3274658" cy="539765"/>
+            </a:xfrm>
+          </p:grpSpPr>
+          <p:sp>
+            <p:nvSpPr>
+              <p:cNvPr id="26" name="矩形 25">
+                <a:extLst>
+                  <a:ext uri="{FF2B5EF4-FFF2-40B4-BE49-F238E27FC236}">
+                    <a16:creationId xmlns:a16="http://schemas.microsoft.com/office/drawing/2014/main" id="{717352BD-CF4F-E11A-777D-16CD1B9059DE}"/>
+                  </a:ext>
+                </a:extLst>
+              </p:cNvPr>
+              <p:cNvSpPr/>
+              <p:nvPr/>
+            </p:nvSpPr>
+            <p:spPr>
+              <a:xfrm>
+                <a:off x="4241260" y="3858200"/>
+                <a:ext cx="1484250" cy="196235"/>
+              </a:xfrm>
+              <a:prstGeom prst="rect">
+                <a:avLst/>
+              </a:prstGeom>
+              <a:noFill/>
+              <a:ln w="19050">
+                <a:solidFill>
+                  <a:srgbClr val="FF0000"/>
+                </a:solidFill>
+              </a:ln>
+            </p:spPr>
+            <p:style>
+              <a:lnRef idx="2">
+                <a:schemeClr val="accent1">
+                  <a:shade val="50000"/>
+                </a:schemeClr>
+              </a:lnRef>
+              <a:fillRef idx="1">
+                <a:schemeClr val="accent1"/>
+              </a:fillRef>
+              <a:effectRef idx="0">
+                <a:schemeClr val="accent1"/>
+              </a:effectRef>
+              <a:fontRef idx="minor">
+                <a:schemeClr val="lt1"/>
+              </a:fontRef>
+            </p:style>
+            <p:txBody>
+              <a:bodyPr rtlCol="0" anchor="ctr"/>
+              <a:lstStyle/>
+              <a:p>
+                <a:pPr algn="ctr"/>
+                <a:endParaRPr lang="zh-CN" altLang="en-US"/>
+              </a:p>
+            </p:txBody>
+          </p:sp>
+          <p:cxnSp>
+            <p:nvCxnSpPr>
+              <p:cNvPr id="27" name="直接箭头连接符 26">
+                <a:extLst>
+                  <a:ext uri="{FF2B5EF4-FFF2-40B4-BE49-F238E27FC236}">
+                    <a16:creationId xmlns:a16="http://schemas.microsoft.com/office/drawing/2014/main" id="{D29B84EC-E34E-2966-7285-AB80CB770D3E}"/>
+                  </a:ext>
+                </a:extLst>
+              </p:cNvPr>
+              <p:cNvCxnSpPr>
+                <a:cxnSpLocks/>
+                <a:stCxn id="24" idx="1"/>
+                <a:endCxn id="26" idx="3"/>
+              </p:cNvCxnSpPr>
+              <p:nvPr/>
+            </p:nvCxnSpPr>
+            <p:spPr>
+              <a:xfrm flipH="1">
+                <a:off x="5725510" y="3514670"/>
+                <a:ext cx="1790408" cy="441648"/>
+              </a:xfrm>
+              <a:prstGeom prst="straightConnector1">
+                <a:avLst/>
+              </a:prstGeom>
+              <a:ln w="19050">
+                <a:solidFill>
+                  <a:srgbClr val="FF0000"/>
+                </a:solidFill>
+                <a:tailEnd type="triangle"/>
+              </a:ln>
+            </p:spPr>
+            <p:style>
+              <a:lnRef idx="1">
+                <a:schemeClr val="accent1"/>
+              </a:lnRef>
+              <a:fillRef idx="0">
+                <a:schemeClr val="accent1"/>
+              </a:fillRef>
+              <a:effectRef idx="0">
+                <a:schemeClr val="accent1"/>
+              </a:effectRef>
+              <a:fontRef idx="minor">
+                <a:schemeClr val="tx1"/>
+              </a:fontRef>
+            </p:style>
+          </p:cxnSp>
+        </p:grpSp>
+      </p:grpSp>
     </p:spTree>
     <p:extLst>
       <p:ext uri="{BB962C8B-B14F-4D97-AF65-F5344CB8AC3E}">
@@ -7209,7 +7437,7 @@
                                           </p:stCondLst>
                                         </p:cTn>
                                         <p:tgtEl>
-                                          <p:spTgt spid="5"/>
+                                          <p:spTgt spid="22"/>
                                         </p:tgtEl>
                                         <p:attrNameLst>
                                           <p:attrName>style.visibility</p:attrName>
@@ -7331,7 +7559,7 @@
                             </p:stCondLst>
                             <p:childTnLst>
                               <p:par>
-                                <p:cTn id="17" presetID="1" presetClass="entr" presetSubtype="0" fill="hold" grpId="0" nodeType="clickEffect">
+                                <p:cTn id="17" presetID="1" presetClass="entr" presetSubtype="0" fill="hold" nodeType="clickEffect">
                                   <p:stCondLst>
                                     <p:cond delay="0"/>
                                   </p:stCondLst>
@@ -7339,6 +7567,51 @@
                                     <p:set>
                                       <p:cBhvr>
                                         <p:cTn id="18" dur="1" fill="hold">
+                                          <p:stCondLst>
+                                            <p:cond delay="0"/>
+                                          </p:stCondLst>
+                                        </p:cTn>
+                                        <p:tgtEl>
+                                          <p:spTgt spid="23"/>
+                                        </p:tgtEl>
+                                        <p:attrNameLst>
+                                          <p:attrName>style.visibility</p:attrName>
+                                        </p:attrNameLst>
+                                      </p:cBhvr>
+                                      <p:to>
+                                        <p:strVal val="visible"/>
+                                      </p:to>
+                                    </p:set>
+                                  </p:childTnLst>
+                                </p:cTn>
+                              </p:par>
+                            </p:childTnLst>
+                          </p:cTn>
+                        </p:par>
+                      </p:childTnLst>
+                    </p:cTn>
+                  </p:par>
+                  <p:par>
+                    <p:cTn id="19" fill="hold">
+                      <p:stCondLst>
+                        <p:cond delay="indefinite"/>
+                      </p:stCondLst>
+                      <p:childTnLst>
+                        <p:par>
+                          <p:cTn id="20" fill="hold">
+                            <p:stCondLst>
+                              <p:cond delay="0"/>
+                            </p:stCondLst>
+                            <p:childTnLst>
+                              <p:par>
+                                <p:cTn id="21" presetID="1" presetClass="entr" presetSubtype="0" fill="hold" grpId="0" nodeType="clickEffect">
+                                  <p:stCondLst>
+                                    <p:cond delay="0"/>
+                                  </p:stCondLst>
+                                  <p:childTnLst>
+                                    <p:set>
+                                      <p:cBhvr>
+                                        <p:cTn id="22" dur="1" fill="hold">
                                           <p:stCondLst>
                                             <p:cond delay="0"/>
                                           </p:stCondLst>
@@ -7410,6 +7683,1473 @@
       </p:grpSpPr>
       <p:sp>
         <p:nvSpPr>
+          <p:cNvPr id="3" name="内容占位符 2">
+            <a:extLst>
+              <a:ext uri="{FF2B5EF4-FFF2-40B4-BE49-F238E27FC236}">
+                <a16:creationId xmlns:a16="http://schemas.microsoft.com/office/drawing/2014/main" id="{082D6B0B-9F92-DFC5-E24E-2A3F61D8A47F}"/>
+              </a:ext>
+            </a:extLst>
+          </p:cNvPr>
+          <p:cNvSpPr>
+            <a:spLocks noGrp="1"/>
+          </p:cNvSpPr>
+          <p:nvPr>
+            <p:ph idx="1"/>
+          </p:nvPr>
+        </p:nvSpPr>
+        <p:spPr>
+          <a:xfrm>
+            <a:off x="960747" y="1097852"/>
+            <a:ext cx="11053879" cy="655534"/>
+          </a:xfrm>
+        </p:spPr>
+        <p:txBody>
+          <a:bodyPr>
+            <a:normAutofit/>
+          </a:bodyPr>
+          <a:lstStyle/>
+          <a:p>
+            <a:pPr marL="0" indent="0" algn="just">
+              <a:buNone/>
+            </a:pPr>
+            <a:r>
+              <a:rPr lang="en-US" altLang="zh-CN" sz="2400" b="0" i="0" dirty="0">
+                <a:solidFill>
+                  <a:srgbClr val="333333"/>
+                </a:solidFill>
+                <a:effectLst/>
+              </a:rPr>
+              <a:t>The </a:t>
+            </a:r>
+            <a:r>
+              <a:rPr lang="en-US" altLang="zh-CN" sz="2400" b="1" i="0" u="none" strike="noStrike" dirty="0">
+                <a:effectLst/>
+              </a:rPr>
+              <a:t>cp</a:t>
+            </a:r>
+            <a:r>
+              <a:rPr lang="en-US" altLang="zh-CN" sz="2400" b="0" i="0" dirty="0">
+                <a:solidFill>
+                  <a:srgbClr val="333333"/>
+                </a:solidFill>
+                <a:effectLst/>
+              </a:rPr>
+              <a:t> command is used to copy a file or directory.</a:t>
+            </a:r>
+          </a:p>
+        </p:txBody>
+      </p:sp>
+      <p:sp>
+        <p:nvSpPr>
+          <p:cNvPr id="5" name="标题 1">
+            <a:extLst>
+              <a:ext uri="{FF2B5EF4-FFF2-40B4-BE49-F238E27FC236}">
+                <a16:creationId xmlns:a16="http://schemas.microsoft.com/office/drawing/2014/main" id="{9A08D70F-A9F5-0EF8-C021-908792E7E7F2}"/>
+              </a:ext>
+            </a:extLst>
+          </p:cNvPr>
+          <p:cNvSpPr>
+            <a:spLocks noGrp="1"/>
+          </p:cNvSpPr>
+          <p:nvPr>
+            <p:ph type="title"/>
+          </p:nvPr>
+        </p:nvSpPr>
+        <p:spPr>
+          <a:xfrm>
+            <a:off x="1229886" y="264221"/>
+            <a:ext cx="10515600" cy="833631"/>
+          </a:xfrm>
+        </p:spPr>
+        <p:txBody>
+          <a:bodyPr>
+            <a:normAutofit/>
+          </a:bodyPr>
+          <a:lstStyle/>
+          <a:p>
+            <a:r>
+              <a:rPr lang="en-US" altLang="zh-CN" b="1" dirty="0">
+                <a:sym typeface="+mn-ea"/>
+              </a:rPr>
+              <a:t>cp command and mv command</a:t>
+            </a:r>
+            <a:endParaRPr lang="zh-CN" altLang="en-US" b="1" dirty="0"/>
+          </a:p>
+        </p:txBody>
+      </p:sp>
+      <p:pic>
+        <p:nvPicPr>
+          <p:cNvPr id="9" name="图片 8">
+            <a:extLst>
+              <a:ext uri="{FF2B5EF4-FFF2-40B4-BE49-F238E27FC236}">
+                <a16:creationId xmlns:a16="http://schemas.microsoft.com/office/drawing/2014/main" id="{108E833E-05D9-CD49-F535-0A36F89EFFBE}"/>
+              </a:ext>
+            </a:extLst>
+          </p:cNvPr>
+          <p:cNvPicPr>
+            <a:picLocks noChangeAspect="1"/>
+          </p:cNvPicPr>
+          <p:nvPr/>
+        </p:nvPicPr>
+        <p:blipFill>
+          <a:blip r:embed="rId2"/>
+          <a:stretch>
+            <a:fillRect/>
+          </a:stretch>
+        </p:blipFill>
+        <p:spPr>
+          <a:xfrm>
+            <a:off x="894759" y="1753386"/>
+            <a:ext cx="9586772" cy="1076813"/>
+          </a:xfrm>
+          <a:prstGeom prst="rect">
+            <a:avLst/>
+          </a:prstGeom>
+        </p:spPr>
+      </p:pic>
+      <p:grpSp>
+        <p:nvGrpSpPr>
+          <p:cNvPr id="10" name="组合 9">
+            <a:extLst>
+              <a:ext uri="{FF2B5EF4-FFF2-40B4-BE49-F238E27FC236}">
+                <a16:creationId xmlns:a16="http://schemas.microsoft.com/office/drawing/2014/main" id="{D728FED7-B6E3-84C2-B274-73E050413EBF}"/>
+              </a:ext>
+            </a:extLst>
+          </p:cNvPr>
+          <p:cNvGrpSpPr/>
+          <p:nvPr/>
+        </p:nvGrpSpPr>
+        <p:grpSpPr>
+          <a:xfrm>
+            <a:off x="5170333" y="2059442"/>
+            <a:ext cx="4708495" cy="400110"/>
+            <a:chOff x="4241259" y="1547817"/>
+            <a:chExt cx="4708495" cy="400110"/>
+          </a:xfrm>
+        </p:grpSpPr>
+        <p:sp>
+          <p:nvSpPr>
+            <p:cNvPr id="11" name="文本框 10">
+              <a:extLst>
+                <a:ext uri="{FF2B5EF4-FFF2-40B4-BE49-F238E27FC236}">
+                  <a16:creationId xmlns:a16="http://schemas.microsoft.com/office/drawing/2014/main" id="{27522B0F-6485-C7D3-018B-A130F4D2721A}"/>
+                </a:ext>
+              </a:extLst>
+            </p:cNvPr>
+            <p:cNvSpPr txBox="1"/>
+            <p:nvPr/>
+          </p:nvSpPr>
+          <p:spPr>
+            <a:xfrm>
+              <a:off x="6422844" y="1547817"/>
+              <a:ext cx="2526910" cy="400110"/>
+            </a:xfrm>
+            <a:prstGeom prst="rect">
+              <a:avLst/>
+            </a:prstGeom>
+            <a:noFill/>
+          </p:spPr>
+          <p:txBody>
+            <a:bodyPr wrap="none" rtlCol="0">
+              <a:spAutoFit/>
+            </a:bodyPr>
+            <a:lstStyle/>
+            <a:p>
+              <a:r>
+                <a:rPr lang="en-US" altLang="zh-CN" sz="2000" dirty="0">
+                  <a:solidFill>
+                    <a:schemeClr val="bg1"/>
+                  </a:solidFill>
+                </a:rPr>
+                <a:t>Copy a file into demo2</a:t>
+              </a:r>
+              <a:endParaRPr lang="zh-CN" altLang="en-US" sz="2000" dirty="0">
+                <a:solidFill>
+                  <a:schemeClr val="bg1"/>
+                </a:solidFill>
+              </a:endParaRPr>
+            </a:p>
+          </p:txBody>
+        </p:sp>
+        <p:grpSp>
+          <p:nvGrpSpPr>
+            <p:cNvPr id="12" name="组合 11">
+              <a:extLst>
+                <a:ext uri="{FF2B5EF4-FFF2-40B4-BE49-F238E27FC236}">
+                  <a16:creationId xmlns:a16="http://schemas.microsoft.com/office/drawing/2014/main" id="{3D4A4D97-BF1B-AB3F-2FDA-98DB439A44E7}"/>
+                </a:ext>
+              </a:extLst>
+            </p:cNvPr>
+            <p:cNvGrpSpPr/>
+            <p:nvPr/>
+          </p:nvGrpSpPr>
+          <p:grpSpPr>
+            <a:xfrm>
+              <a:off x="4241259" y="1669467"/>
+              <a:ext cx="2219293" cy="227828"/>
+              <a:chOff x="4241259" y="3858200"/>
+              <a:chExt cx="2219293" cy="227828"/>
+            </a:xfrm>
+          </p:grpSpPr>
+          <p:sp>
+            <p:nvSpPr>
+              <p:cNvPr id="13" name="矩形 12">
+                <a:extLst>
+                  <a:ext uri="{FF2B5EF4-FFF2-40B4-BE49-F238E27FC236}">
+                    <a16:creationId xmlns:a16="http://schemas.microsoft.com/office/drawing/2014/main" id="{11771E14-BB79-BE99-4D74-F8D9B3E8AF10}"/>
+                  </a:ext>
+                </a:extLst>
+              </p:cNvPr>
+              <p:cNvSpPr/>
+              <p:nvPr/>
+            </p:nvSpPr>
+            <p:spPr>
+              <a:xfrm>
+                <a:off x="4241259" y="3858200"/>
+                <a:ext cx="1899769" cy="227828"/>
+              </a:xfrm>
+              <a:prstGeom prst="rect">
+                <a:avLst/>
+              </a:prstGeom>
+              <a:noFill/>
+              <a:ln w="19050">
+                <a:solidFill>
+                  <a:srgbClr val="FF0000"/>
+                </a:solidFill>
+              </a:ln>
+            </p:spPr>
+            <p:style>
+              <a:lnRef idx="2">
+                <a:schemeClr val="accent1">
+                  <a:shade val="50000"/>
+                </a:schemeClr>
+              </a:lnRef>
+              <a:fillRef idx="1">
+                <a:schemeClr val="accent1"/>
+              </a:fillRef>
+              <a:effectRef idx="0">
+                <a:schemeClr val="accent1"/>
+              </a:effectRef>
+              <a:fontRef idx="minor">
+                <a:schemeClr val="lt1"/>
+              </a:fontRef>
+            </p:style>
+            <p:txBody>
+              <a:bodyPr rtlCol="0" anchor="ctr"/>
+              <a:lstStyle/>
+              <a:p>
+                <a:pPr algn="ctr"/>
+                <a:endParaRPr lang="zh-CN" altLang="en-US" dirty="0"/>
+              </a:p>
+            </p:txBody>
+          </p:sp>
+          <p:cxnSp>
+            <p:nvCxnSpPr>
+              <p:cNvPr id="14" name="直接箭头连接符 13">
+                <a:extLst>
+                  <a:ext uri="{FF2B5EF4-FFF2-40B4-BE49-F238E27FC236}">
+                    <a16:creationId xmlns:a16="http://schemas.microsoft.com/office/drawing/2014/main" id="{0572598D-EF77-CF0E-73FC-E3424BE574B9}"/>
+                  </a:ext>
+                </a:extLst>
+              </p:cNvPr>
+              <p:cNvCxnSpPr>
+                <a:cxnSpLocks/>
+              </p:cNvCxnSpPr>
+              <p:nvPr/>
+            </p:nvCxnSpPr>
+            <p:spPr>
+              <a:xfrm flipH="1">
+                <a:off x="6041007" y="3952817"/>
+                <a:ext cx="419545" cy="104865"/>
+              </a:xfrm>
+              <a:prstGeom prst="straightConnector1">
+                <a:avLst/>
+              </a:prstGeom>
+              <a:ln w="19050">
+                <a:solidFill>
+                  <a:srgbClr val="FF0000"/>
+                </a:solidFill>
+                <a:tailEnd type="triangle"/>
+              </a:ln>
+            </p:spPr>
+            <p:style>
+              <a:lnRef idx="1">
+                <a:schemeClr val="accent1"/>
+              </a:lnRef>
+              <a:fillRef idx="0">
+                <a:schemeClr val="accent1"/>
+              </a:fillRef>
+              <a:effectRef idx="0">
+                <a:schemeClr val="accent1"/>
+              </a:effectRef>
+              <a:fontRef idx="minor">
+                <a:schemeClr val="tx1"/>
+              </a:fontRef>
+            </p:style>
+          </p:cxnSp>
+        </p:grpSp>
+      </p:grpSp>
+      <p:sp>
+        <p:nvSpPr>
+          <p:cNvPr id="16" name="文本框 15">
+            <a:extLst>
+              <a:ext uri="{FF2B5EF4-FFF2-40B4-BE49-F238E27FC236}">
+                <a16:creationId xmlns:a16="http://schemas.microsoft.com/office/drawing/2014/main" id="{7C57C35E-5D3F-0E5A-7FCC-9E1875AB5ADD}"/>
+              </a:ext>
+            </a:extLst>
+          </p:cNvPr>
+          <p:cNvSpPr txBox="1"/>
+          <p:nvPr/>
+        </p:nvSpPr>
+        <p:spPr>
+          <a:xfrm>
+            <a:off x="819345" y="3086730"/>
+            <a:ext cx="10784739" cy="830997"/>
+          </a:xfrm>
+          <a:prstGeom prst="rect">
+            <a:avLst/>
+          </a:prstGeom>
+          <a:noFill/>
+        </p:spPr>
+        <p:txBody>
+          <a:bodyPr wrap="square">
+            <a:spAutoFit/>
+          </a:bodyPr>
+          <a:lstStyle/>
+          <a:p>
+            <a:pPr algn="just"/>
+            <a:r>
+              <a:rPr lang="en-US" altLang="zh-CN" sz="2400" b="0" i="0" dirty="0">
+                <a:solidFill>
+                  <a:srgbClr val="333333"/>
+                </a:solidFill>
+                <a:effectLst/>
+              </a:rPr>
+              <a:t>The </a:t>
+            </a:r>
+            <a:r>
+              <a:rPr lang="en-US" altLang="zh-CN" sz="2400" b="1" i="0" u="none" strike="noStrike" dirty="0">
+                <a:effectLst/>
+              </a:rPr>
+              <a:t>mv</a:t>
+            </a:r>
+            <a:r>
+              <a:rPr lang="en-US" altLang="zh-CN" sz="2400" b="0" i="0" dirty="0">
+                <a:solidFill>
+                  <a:srgbClr val="333333"/>
+                </a:solidFill>
+                <a:effectLst/>
+              </a:rPr>
+              <a:t> command is used to move a file or a directory form one location to another location.</a:t>
+            </a:r>
+          </a:p>
+        </p:txBody>
+      </p:sp>
+      <p:pic>
+        <p:nvPicPr>
+          <p:cNvPr id="18" name="图片 17">
+            <a:extLst>
+              <a:ext uri="{FF2B5EF4-FFF2-40B4-BE49-F238E27FC236}">
+                <a16:creationId xmlns:a16="http://schemas.microsoft.com/office/drawing/2014/main" id="{6D08A365-FF5C-289E-5EBD-206189B483EC}"/>
+              </a:ext>
+            </a:extLst>
+          </p:cNvPr>
+          <p:cNvPicPr>
+            <a:picLocks noChangeAspect="1"/>
+          </p:cNvPicPr>
+          <p:nvPr/>
+        </p:nvPicPr>
+        <p:blipFill>
+          <a:blip r:embed="rId3"/>
+          <a:stretch>
+            <a:fillRect/>
+          </a:stretch>
+        </p:blipFill>
+        <p:spPr>
+          <a:xfrm>
+            <a:off x="960747" y="3933875"/>
+            <a:ext cx="8918081" cy="1204826"/>
+          </a:xfrm>
+          <a:prstGeom prst="rect">
+            <a:avLst/>
+          </a:prstGeom>
+        </p:spPr>
+      </p:pic>
+      <p:grpSp>
+        <p:nvGrpSpPr>
+          <p:cNvPr id="19" name="组合 18">
+            <a:extLst>
+              <a:ext uri="{FF2B5EF4-FFF2-40B4-BE49-F238E27FC236}">
+                <a16:creationId xmlns:a16="http://schemas.microsoft.com/office/drawing/2014/main" id="{30F6CA91-D71C-83F3-1EE0-28B91FC7E037}"/>
+              </a:ext>
+            </a:extLst>
+          </p:cNvPr>
+          <p:cNvGrpSpPr/>
+          <p:nvPr/>
+        </p:nvGrpSpPr>
+        <p:grpSpPr>
+          <a:xfrm>
+            <a:off x="5690380" y="3565466"/>
+            <a:ext cx="5658726" cy="570063"/>
+            <a:chOff x="4241259" y="1298886"/>
+            <a:chExt cx="5658726" cy="570063"/>
+          </a:xfrm>
+        </p:grpSpPr>
+        <p:sp>
+          <p:nvSpPr>
+            <p:cNvPr id="20" name="文本框 19">
+              <a:extLst>
+                <a:ext uri="{FF2B5EF4-FFF2-40B4-BE49-F238E27FC236}">
+                  <a16:creationId xmlns:a16="http://schemas.microsoft.com/office/drawing/2014/main" id="{C6FE6B71-BF1B-3F7E-A351-4285A5811AB1}"/>
+                </a:ext>
+              </a:extLst>
+            </p:cNvPr>
+            <p:cNvSpPr txBox="1"/>
+            <p:nvPr/>
+          </p:nvSpPr>
+          <p:spPr>
+            <a:xfrm>
+              <a:off x="7255222" y="1298886"/>
+              <a:ext cx="2644763" cy="400110"/>
+            </a:xfrm>
+            <a:prstGeom prst="rect">
+              <a:avLst/>
+            </a:prstGeom>
+            <a:noFill/>
+          </p:spPr>
+          <p:txBody>
+            <a:bodyPr wrap="none" rtlCol="0">
+              <a:spAutoFit/>
+            </a:bodyPr>
+            <a:lstStyle/>
+            <a:p>
+              <a:r>
+                <a:rPr lang="en-US" altLang="zh-CN" sz="2000" dirty="0"/>
+                <a:t>Move a file into demo2</a:t>
+              </a:r>
+              <a:endParaRPr lang="zh-CN" altLang="en-US" sz="2000" dirty="0"/>
+            </a:p>
+          </p:txBody>
+        </p:sp>
+        <p:grpSp>
+          <p:nvGrpSpPr>
+            <p:cNvPr id="21" name="组合 20">
+              <a:extLst>
+                <a:ext uri="{FF2B5EF4-FFF2-40B4-BE49-F238E27FC236}">
+                  <a16:creationId xmlns:a16="http://schemas.microsoft.com/office/drawing/2014/main" id="{306A1DAC-40E3-3ED3-5903-1723BF45A00C}"/>
+                </a:ext>
+              </a:extLst>
+            </p:cNvPr>
+            <p:cNvGrpSpPr/>
+            <p:nvPr/>
+          </p:nvGrpSpPr>
+          <p:grpSpPr>
+            <a:xfrm>
+              <a:off x="4241259" y="1530146"/>
+              <a:ext cx="3060677" cy="338803"/>
+              <a:chOff x="4241259" y="3718879"/>
+              <a:chExt cx="3060677" cy="338803"/>
+            </a:xfrm>
+          </p:grpSpPr>
+          <p:sp>
+            <p:nvSpPr>
+              <p:cNvPr id="22" name="矩形 21">
+                <a:extLst>
+                  <a:ext uri="{FF2B5EF4-FFF2-40B4-BE49-F238E27FC236}">
+                    <a16:creationId xmlns:a16="http://schemas.microsoft.com/office/drawing/2014/main" id="{5404EFC2-D504-FC6D-3F37-E50E3814E4AD}"/>
+                  </a:ext>
+                </a:extLst>
+              </p:cNvPr>
+              <p:cNvSpPr/>
+              <p:nvPr/>
+            </p:nvSpPr>
+            <p:spPr>
+              <a:xfrm>
+                <a:off x="4241259" y="3858200"/>
+                <a:ext cx="2897439" cy="199482"/>
+              </a:xfrm>
+              <a:prstGeom prst="rect">
+                <a:avLst/>
+              </a:prstGeom>
+              <a:noFill/>
+              <a:ln w="19050">
+                <a:solidFill>
+                  <a:srgbClr val="FF0000"/>
+                </a:solidFill>
+              </a:ln>
+            </p:spPr>
+            <p:style>
+              <a:lnRef idx="2">
+                <a:schemeClr val="accent1">
+                  <a:shade val="50000"/>
+                </a:schemeClr>
+              </a:lnRef>
+              <a:fillRef idx="1">
+                <a:schemeClr val="accent1"/>
+              </a:fillRef>
+              <a:effectRef idx="0">
+                <a:schemeClr val="accent1"/>
+              </a:effectRef>
+              <a:fontRef idx="minor">
+                <a:schemeClr val="lt1"/>
+              </a:fontRef>
+            </p:style>
+            <p:txBody>
+              <a:bodyPr rtlCol="0" anchor="ctr"/>
+              <a:lstStyle/>
+              <a:p>
+                <a:pPr algn="ctr"/>
+                <a:endParaRPr lang="zh-CN" altLang="en-US" dirty="0"/>
+              </a:p>
+            </p:txBody>
+          </p:sp>
+          <p:cxnSp>
+            <p:nvCxnSpPr>
+              <p:cNvPr id="23" name="直接箭头连接符 22">
+                <a:extLst>
+                  <a:ext uri="{FF2B5EF4-FFF2-40B4-BE49-F238E27FC236}">
+                    <a16:creationId xmlns:a16="http://schemas.microsoft.com/office/drawing/2014/main" id="{04F68E12-894B-7962-9FB0-0240608BE405}"/>
+                  </a:ext>
+                </a:extLst>
+              </p:cNvPr>
+              <p:cNvCxnSpPr>
+                <a:cxnSpLocks/>
+              </p:cNvCxnSpPr>
+              <p:nvPr/>
+            </p:nvCxnSpPr>
+            <p:spPr>
+              <a:xfrm flipH="1">
+                <a:off x="6882391" y="3718879"/>
+                <a:ext cx="419545" cy="104865"/>
+              </a:xfrm>
+              <a:prstGeom prst="straightConnector1">
+                <a:avLst/>
+              </a:prstGeom>
+              <a:ln w="19050">
+                <a:solidFill>
+                  <a:srgbClr val="FF0000"/>
+                </a:solidFill>
+                <a:tailEnd type="triangle"/>
+              </a:ln>
+            </p:spPr>
+            <p:style>
+              <a:lnRef idx="1">
+                <a:schemeClr val="accent1"/>
+              </a:lnRef>
+              <a:fillRef idx="0">
+                <a:schemeClr val="accent1"/>
+              </a:fillRef>
+              <a:effectRef idx="0">
+                <a:schemeClr val="accent1"/>
+              </a:effectRef>
+              <a:fontRef idx="minor">
+                <a:schemeClr val="tx1"/>
+              </a:fontRef>
+            </p:style>
+          </p:cxnSp>
+        </p:grpSp>
+      </p:grpSp>
+      <p:sp>
+        <p:nvSpPr>
+          <p:cNvPr id="24" name="椭圆 23">
+            <a:extLst>
+              <a:ext uri="{FF2B5EF4-FFF2-40B4-BE49-F238E27FC236}">
+                <a16:creationId xmlns:a16="http://schemas.microsoft.com/office/drawing/2014/main" id="{4983E4F8-60FA-4E24-F349-9A93DDFBE964}"/>
+              </a:ext>
+            </a:extLst>
+          </p:cNvPr>
+          <p:cNvSpPr/>
+          <p:nvPr/>
+        </p:nvSpPr>
+        <p:spPr>
+          <a:xfrm>
+            <a:off x="904185" y="4383460"/>
+            <a:ext cx="1650478" cy="301658"/>
+          </a:xfrm>
+          <a:prstGeom prst="ellipse">
+            <a:avLst/>
+          </a:prstGeom>
+          <a:noFill/>
+          <a:ln>
+            <a:solidFill>
+              <a:srgbClr val="FF0000"/>
+            </a:solidFill>
+          </a:ln>
+        </p:spPr>
+        <p:style>
+          <a:lnRef idx="2">
+            <a:schemeClr val="accent1">
+              <a:shade val="50000"/>
+            </a:schemeClr>
+          </a:lnRef>
+          <a:fillRef idx="1">
+            <a:schemeClr val="accent1"/>
+          </a:fillRef>
+          <a:effectRef idx="0">
+            <a:schemeClr val="accent1"/>
+          </a:effectRef>
+          <a:fontRef idx="minor">
+            <a:schemeClr val="lt1"/>
+          </a:fontRef>
+        </p:style>
+        <p:txBody>
+          <a:bodyPr rtlCol="0" anchor="ctr"/>
+          <a:lstStyle/>
+          <a:p>
+            <a:pPr algn="ctr"/>
+            <a:endParaRPr lang="zh-CN" altLang="en-US"/>
+          </a:p>
+        </p:txBody>
+      </p:sp>
+      <p:grpSp>
+        <p:nvGrpSpPr>
+          <p:cNvPr id="25" name="组合 24">
+            <a:extLst>
+              <a:ext uri="{FF2B5EF4-FFF2-40B4-BE49-F238E27FC236}">
+                <a16:creationId xmlns:a16="http://schemas.microsoft.com/office/drawing/2014/main" id="{BECFF501-0B68-6657-9780-DA139172BE16}"/>
+              </a:ext>
+            </a:extLst>
+          </p:cNvPr>
+          <p:cNvGrpSpPr/>
+          <p:nvPr/>
+        </p:nvGrpSpPr>
+        <p:grpSpPr>
+          <a:xfrm>
+            <a:off x="978551" y="4899149"/>
+            <a:ext cx="10650875" cy="714517"/>
+            <a:chOff x="4241259" y="1669466"/>
+            <a:chExt cx="10650875" cy="714517"/>
+          </a:xfrm>
+        </p:grpSpPr>
+        <p:sp>
+          <p:nvSpPr>
+            <p:cNvPr id="26" name="文本框 25">
+              <a:extLst>
+                <a:ext uri="{FF2B5EF4-FFF2-40B4-BE49-F238E27FC236}">
+                  <a16:creationId xmlns:a16="http://schemas.microsoft.com/office/drawing/2014/main" id="{3C66C26E-17FF-E2B4-F9F1-F360383C56BA}"/>
+                </a:ext>
+              </a:extLst>
+            </p:cNvPr>
+            <p:cNvSpPr txBox="1"/>
+            <p:nvPr/>
+          </p:nvSpPr>
+          <p:spPr>
+            <a:xfrm>
+              <a:off x="5421446" y="1983873"/>
+              <a:ext cx="9470688" cy="400110"/>
+            </a:xfrm>
+            <a:prstGeom prst="rect">
+              <a:avLst/>
+            </a:prstGeom>
+            <a:noFill/>
+          </p:spPr>
+          <p:txBody>
+            <a:bodyPr wrap="square" rtlCol="0">
+              <a:spAutoFit/>
+            </a:bodyPr>
+            <a:lstStyle/>
+            <a:p>
+              <a:r>
+                <a:rPr lang="en-US" altLang="zh-CN" sz="2000" dirty="0"/>
+                <a:t>The CMakeLists.txt is not in the examples directory because it is moved into demo2.</a:t>
+              </a:r>
+              <a:endParaRPr lang="zh-CN" altLang="en-US" sz="2000" dirty="0"/>
+            </a:p>
+          </p:txBody>
+        </p:sp>
+        <p:grpSp>
+          <p:nvGrpSpPr>
+            <p:cNvPr id="27" name="组合 26">
+              <a:extLst>
+                <a:ext uri="{FF2B5EF4-FFF2-40B4-BE49-F238E27FC236}">
+                  <a16:creationId xmlns:a16="http://schemas.microsoft.com/office/drawing/2014/main" id="{C6C8592E-409D-B4B5-7569-E050CEE6F453}"/>
+                </a:ext>
+              </a:extLst>
+            </p:cNvPr>
+            <p:cNvGrpSpPr/>
+            <p:nvPr/>
+          </p:nvGrpSpPr>
+          <p:grpSpPr>
+            <a:xfrm>
+              <a:off x="4241259" y="1669466"/>
+              <a:ext cx="9098703" cy="436724"/>
+              <a:chOff x="4241259" y="3858199"/>
+              <a:chExt cx="9098703" cy="436724"/>
+            </a:xfrm>
+          </p:grpSpPr>
+          <p:sp>
+            <p:nvSpPr>
+              <p:cNvPr id="28" name="矩形 27">
+                <a:extLst>
+                  <a:ext uri="{FF2B5EF4-FFF2-40B4-BE49-F238E27FC236}">
+                    <a16:creationId xmlns:a16="http://schemas.microsoft.com/office/drawing/2014/main" id="{61A4E3A7-91FA-763C-70F3-3FF82B3C47BC}"/>
+                  </a:ext>
+                </a:extLst>
+              </p:cNvPr>
+              <p:cNvSpPr/>
+              <p:nvPr/>
+            </p:nvSpPr>
+            <p:spPr>
+              <a:xfrm>
+                <a:off x="4241259" y="3858199"/>
+                <a:ext cx="9098703" cy="301657"/>
+              </a:xfrm>
+              <a:prstGeom prst="rect">
+                <a:avLst/>
+              </a:prstGeom>
+              <a:noFill/>
+              <a:ln w="19050">
+                <a:solidFill>
+                  <a:srgbClr val="FF0000"/>
+                </a:solidFill>
+              </a:ln>
+            </p:spPr>
+            <p:style>
+              <a:lnRef idx="2">
+                <a:schemeClr val="accent1">
+                  <a:shade val="50000"/>
+                </a:schemeClr>
+              </a:lnRef>
+              <a:fillRef idx="1">
+                <a:schemeClr val="accent1"/>
+              </a:fillRef>
+              <a:effectRef idx="0">
+                <a:schemeClr val="accent1"/>
+              </a:effectRef>
+              <a:fontRef idx="minor">
+                <a:schemeClr val="lt1"/>
+              </a:fontRef>
+            </p:style>
+            <p:txBody>
+              <a:bodyPr rtlCol="0" anchor="ctr"/>
+              <a:lstStyle/>
+              <a:p>
+                <a:pPr algn="ctr"/>
+                <a:endParaRPr lang="zh-CN" altLang="en-US" dirty="0"/>
+              </a:p>
+            </p:txBody>
+          </p:sp>
+          <p:cxnSp>
+            <p:nvCxnSpPr>
+              <p:cNvPr id="29" name="直接箭头连接符 28">
+                <a:extLst>
+                  <a:ext uri="{FF2B5EF4-FFF2-40B4-BE49-F238E27FC236}">
+                    <a16:creationId xmlns:a16="http://schemas.microsoft.com/office/drawing/2014/main" id="{5DEF3912-3A6A-46F2-43C8-3FE260036A85}"/>
+                  </a:ext>
+                </a:extLst>
+              </p:cNvPr>
+              <p:cNvCxnSpPr>
+                <a:cxnSpLocks/>
+              </p:cNvCxnSpPr>
+              <p:nvPr/>
+            </p:nvCxnSpPr>
+            <p:spPr>
+              <a:xfrm flipH="1" flipV="1">
+                <a:off x="4911585" y="4024789"/>
+                <a:ext cx="465869" cy="270134"/>
+              </a:xfrm>
+              <a:prstGeom prst="straightConnector1">
+                <a:avLst/>
+              </a:prstGeom>
+              <a:ln w="19050">
+                <a:solidFill>
+                  <a:srgbClr val="FF0000"/>
+                </a:solidFill>
+                <a:tailEnd type="triangle"/>
+              </a:ln>
+            </p:spPr>
+            <p:style>
+              <a:lnRef idx="1">
+                <a:schemeClr val="accent1"/>
+              </a:lnRef>
+              <a:fillRef idx="0">
+                <a:schemeClr val="accent1"/>
+              </a:fillRef>
+              <a:effectRef idx="0">
+                <a:schemeClr val="accent1"/>
+              </a:effectRef>
+              <a:fontRef idx="minor">
+                <a:schemeClr val="tx1"/>
+              </a:fontRef>
+            </p:style>
+          </p:cxnSp>
+        </p:grpSp>
+      </p:grpSp>
+      <p:pic>
+        <p:nvPicPr>
+          <p:cNvPr id="32" name="图片 31">
+            <a:extLst>
+              <a:ext uri="{FF2B5EF4-FFF2-40B4-BE49-F238E27FC236}">
+                <a16:creationId xmlns:a16="http://schemas.microsoft.com/office/drawing/2014/main" id="{5ADEFA2B-6CFF-ADBD-AA45-810B19CD8BA8}"/>
+              </a:ext>
+            </a:extLst>
+          </p:cNvPr>
+          <p:cNvPicPr>
+            <a:picLocks noChangeAspect="1"/>
+          </p:cNvPicPr>
+          <p:nvPr/>
+        </p:nvPicPr>
+        <p:blipFill>
+          <a:blip r:embed="rId4"/>
+          <a:stretch>
+            <a:fillRect/>
+          </a:stretch>
+        </p:blipFill>
+        <p:spPr>
+          <a:xfrm>
+            <a:off x="1389766" y="5956856"/>
+            <a:ext cx="8900957" cy="667025"/>
+          </a:xfrm>
+          <a:prstGeom prst="rect">
+            <a:avLst/>
+          </a:prstGeom>
+        </p:spPr>
+      </p:pic>
+      <p:grpSp>
+        <p:nvGrpSpPr>
+          <p:cNvPr id="33" name="组合 32">
+            <a:extLst>
+              <a:ext uri="{FF2B5EF4-FFF2-40B4-BE49-F238E27FC236}">
+                <a16:creationId xmlns:a16="http://schemas.microsoft.com/office/drawing/2014/main" id="{C7AF1E7A-27F8-67E2-E996-E05F575C6A75}"/>
+              </a:ext>
+            </a:extLst>
+          </p:cNvPr>
+          <p:cNvGrpSpPr/>
+          <p:nvPr/>
+        </p:nvGrpSpPr>
+        <p:grpSpPr>
+          <a:xfrm>
+            <a:off x="5842780" y="5538129"/>
+            <a:ext cx="5252568" cy="616309"/>
+            <a:chOff x="4241259" y="1252640"/>
+            <a:chExt cx="5252568" cy="616309"/>
+          </a:xfrm>
+        </p:grpSpPr>
+        <p:sp>
+          <p:nvSpPr>
+            <p:cNvPr id="34" name="文本框 33">
+              <a:extLst>
+                <a:ext uri="{FF2B5EF4-FFF2-40B4-BE49-F238E27FC236}">
+                  <a16:creationId xmlns:a16="http://schemas.microsoft.com/office/drawing/2014/main" id="{1D6DE25C-F2CF-75DC-B7DB-9A354BCA6B82}"/>
+                </a:ext>
+              </a:extLst>
+            </p:cNvPr>
+            <p:cNvSpPr txBox="1"/>
+            <p:nvPr/>
+          </p:nvSpPr>
+          <p:spPr>
+            <a:xfrm>
+              <a:off x="4886165" y="1252640"/>
+              <a:ext cx="4607662" cy="400110"/>
+            </a:xfrm>
+            <a:prstGeom prst="rect">
+              <a:avLst/>
+            </a:prstGeom>
+            <a:noFill/>
+          </p:spPr>
+          <p:txBody>
+            <a:bodyPr wrap="square" rtlCol="0">
+              <a:spAutoFit/>
+            </a:bodyPr>
+            <a:lstStyle/>
+            <a:p>
+              <a:r>
+                <a:rPr lang="en-US" altLang="zh-CN" sz="2000" dirty="0"/>
+                <a:t>Use mv command to rename a file</a:t>
+              </a:r>
+              <a:endParaRPr lang="zh-CN" altLang="en-US" sz="2000" dirty="0"/>
+            </a:p>
+          </p:txBody>
+        </p:sp>
+        <p:grpSp>
+          <p:nvGrpSpPr>
+            <p:cNvPr id="35" name="组合 34">
+              <a:extLst>
+                <a:ext uri="{FF2B5EF4-FFF2-40B4-BE49-F238E27FC236}">
+                  <a16:creationId xmlns:a16="http://schemas.microsoft.com/office/drawing/2014/main" id="{A9F446C2-775B-88F4-52F3-5F86DB407FFC}"/>
+                </a:ext>
+              </a:extLst>
+            </p:cNvPr>
+            <p:cNvGrpSpPr/>
+            <p:nvPr/>
+          </p:nvGrpSpPr>
+          <p:grpSpPr>
+            <a:xfrm>
+              <a:off x="4241259" y="1536300"/>
+              <a:ext cx="2897439" cy="332649"/>
+              <a:chOff x="4241259" y="3725033"/>
+              <a:chExt cx="2897439" cy="332649"/>
+            </a:xfrm>
+          </p:grpSpPr>
+          <p:sp>
+            <p:nvSpPr>
+              <p:cNvPr id="36" name="矩形 35">
+                <a:extLst>
+                  <a:ext uri="{FF2B5EF4-FFF2-40B4-BE49-F238E27FC236}">
+                    <a16:creationId xmlns:a16="http://schemas.microsoft.com/office/drawing/2014/main" id="{4E675062-B683-1EF9-A575-1B678065D177}"/>
+                  </a:ext>
+                </a:extLst>
+              </p:cNvPr>
+              <p:cNvSpPr/>
+              <p:nvPr/>
+            </p:nvSpPr>
+            <p:spPr>
+              <a:xfrm>
+                <a:off x="4241259" y="3858200"/>
+                <a:ext cx="2897439" cy="199482"/>
+              </a:xfrm>
+              <a:prstGeom prst="rect">
+                <a:avLst/>
+              </a:prstGeom>
+              <a:noFill/>
+              <a:ln w="19050">
+                <a:solidFill>
+                  <a:srgbClr val="FF0000"/>
+                </a:solidFill>
+              </a:ln>
+            </p:spPr>
+            <p:style>
+              <a:lnRef idx="2">
+                <a:schemeClr val="accent1">
+                  <a:shade val="50000"/>
+                </a:schemeClr>
+              </a:lnRef>
+              <a:fillRef idx="1">
+                <a:schemeClr val="accent1"/>
+              </a:fillRef>
+              <a:effectRef idx="0">
+                <a:schemeClr val="accent1"/>
+              </a:effectRef>
+              <a:fontRef idx="minor">
+                <a:schemeClr val="lt1"/>
+              </a:fontRef>
+            </p:style>
+            <p:txBody>
+              <a:bodyPr rtlCol="0" anchor="ctr"/>
+              <a:lstStyle/>
+              <a:p>
+                <a:pPr algn="ctr"/>
+                <a:endParaRPr lang="zh-CN" altLang="en-US" dirty="0"/>
+              </a:p>
+            </p:txBody>
+          </p:sp>
+          <p:cxnSp>
+            <p:nvCxnSpPr>
+              <p:cNvPr id="37" name="直接箭头连接符 36">
+                <a:extLst>
+                  <a:ext uri="{FF2B5EF4-FFF2-40B4-BE49-F238E27FC236}">
+                    <a16:creationId xmlns:a16="http://schemas.microsoft.com/office/drawing/2014/main" id="{54D9F864-E53A-29E9-DBC9-EF8602B43ECF}"/>
+                  </a:ext>
+                </a:extLst>
+              </p:cNvPr>
+              <p:cNvCxnSpPr>
+                <a:cxnSpLocks/>
+              </p:cNvCxnSpPr>
+              <p:nvPr/>
+            </p:nvCxnSpPr>
+            <p:spPr>
+              <a:xfrm flipH="1">
+                <a:off x="4466620" y="3725033"/>
+                <a:ext cx="323232" cy="99733"/>
+              </a:xfrm>
+              <a:prstGeom prst="straightConnector1">
+                <a:avLst/>
+              </a:prstGeom>
+              <a:ln w="19050">
+                <a:solidFill>
+                  <a:srgbClr val="FF0000"/>
+                </a:solidFill>
+                <a:tailEnd type="triangle"/>
+              </a:ln>
+            </p:spPr>
+            <p:style>
+              <a:lnRef idx="1">
+                <a:schemeClr val="accent1"/>
+              </a:lnRef>
+              <a:fillRef idx="0">
+                <a:schemeClr val="accent1"/>
+              </a:fillRef>
+              <a:effectRef idx="0">
+                <a:schemeClr val="accent1"/>
+              </a:effectRef>
+              <a:fontRef idx="minor">
+                <a:schemeClr val="tx1"/>
+              </a:fontRef>
+            </p:style>
+          </p:cxnSp>
+        </p:grpSp>
+      </p:grpSp>
+    </p:spTree>
+    <p:extLst>
+      <p:ext uri="{BB962C8B-B14F-4D97-AF65-F5344CB8AC3E}">
+        <p14:creationId xmlns:p14="http://schemas.microsoft.com/office/powerpoint/2010/main" val="3258813211"/>
+      </p:ext>
+    </p:extLst>
+  </p:cSld>
+  <p:clrMapOvr>
+    <a:masterClrMapping/>
+  </p:clrMapOvr>
+  <p:timing>
+    <p:tnLst>
+      <p:par>
+        <p:cTn id="1" dur="indefinite" restart="never" nodeType="tmRoot">
+          <p:childTnLst>
+            <p:seq concurrent="1" nextAc="seek">
+              <p:cTn id="2" dur="indefinite" nodeType="mainSeq">
+                <p:childTnLst>
+                  <p:par>
+                    <p:cTn id="3" fill="hold">
+                      <p:stCondLst>
+                        <p:cond delay="indefinite"/>
+                      </p:stCondLst>
+                      <p:childTnLst>
+                        <p:par>
+                          <p:cTn id="4" fill="hold">
+                            <p:stCondLst>
+                              <p:cond delay="0"/>
+                            </p:stCondLst>
+                            <p:childTnLst>
+                              <p:par>
+                                <p:cTn id="5" presetID="1" presetClass="entr" presetSubtype="0" fill="hold" nodeType="clickEffect">
+                                  <p:stCondLst>
+                                    <p:cond delay="0"/>
+                                  </p:stCondLst>
+                                  <p:childTnLst>
+                                    <p:set>
+                                      <p:cBhvr>
+                                        <p:cTn id="6" dur="1" fill="hold">
+                                          <p:stCondLst>
+                                            <p:cond delay="0"/>
+                                          </p:stCondLst>
+                                        </p:cTn>
+                                        <p:tgtEl>
+                                          <p:spTgt spid="9"/>
+                                        </p:tgtEl>
+                                        <p:attrNameLst>
+                                          <p:attrName>style.visibility</p:attrName>
+                                        </p:attrNameLst>
+                                      </p:cBhvr>
+                                      <p:to>
+                                        <p:strVal val="visible"/>
+                                      </p:to>
+                                    </p:set>
+                                  </p:childTnLst>
+                                </p:cTn>
+                              </p:par>
+                            </p:childTnLst>
+                          </p:cTn>
+                        </p:par>
+                      </p:childTnLst>
+                    </p:cTn>
+                  </p:par>
+                  <p:par>
+                    <p:cTn id="7" fill="hold">
+                      <p:stCondLst>
+                        <p:cond delay="indefinite"/>
+                      </p:stCondLst>
+                      <p:childTnLst>
+                        <p:par>
+                          <p:cTn id="8" fill="hold">
+                            <p:stCondLst>
+                              <p:cond delay="0"/>
+                            </p:stCondLst>
+                            <p:childTnLst>
+                              <p:par>
+                                <p:cTn id="9" presetID="1" presetClass="entr" presetSubtype="0" fill="hold" nodeType="clickEffect">
+                                  <p:stCondLst>
+                                    <p:cond delay="0"/>
+                                  </p:stCondLst>
+                                  <p:childTnLst>
+                                    <p:set>
+                                      <p:cBhvr>
+                                        <p:cTn id="10" dur="1" fill="hold">
+                                          <p:stCondLst>
+                                            <p:cond delay="0"/>
+                                          </p:stCondLst>
+                                        </p:cTn>
+                                        <p:tgtEl>
+                                          <p:spTgt spid="10"/>
+                                        </p:tgtEl>
+                                        <p:attrNameLst>
+                                          <p:attrName>style.visibility</p:attrName>
+                                        </p:attrNameLst>
+                                      </p:cBhvr>
+                                      <p:to>
+                                        <p:strVal val="visible"/>
+                                      </p:to>
+                                    </p:set>
+                                  </p:childTnLst>
+                                </p:cTn>
+                              </p:par>
+                            </p:childTnLst>
+                          </p:cTn>
+                        </p:par>
+                      </p:childTnLst>
+                    </p:cTn>
+                  </p:par>
+                  <p:par>
+                    <p:cTn id="11" fill="hold">
+                      <p:stCondLst>
+                        <p:cond delay="indefinite"/>
+                      </p:stCondLst>
+                      <p:childTnLst>
+                        <p:par>
+                          <p:cTn id="12" fill="hold">
+                            <p:stCondLst>
+                              <p:cond delay="0"/>
+                            </p:stCondLst>
+                            <p:childTnLst>
+                              <p:par>
+                                <p:cTn id="13" presetID="1" presetClass="entr" presetSubtype="0" fill="hold" grpId="0" nodeType="clickEffect">
+                                  <p:stCondLst>
+                                    <p:cond delay="0"/>
+                                  </p:stCondLst>
+                                  <p:childTnLst>
+                                    <p:set>
+                                      <p:cBhvr>
+                                        <p:cTn id="14" dur="1" fill="hold">
+                                          <p:stCondLst>
+                                            <p:cond delay="0"/>
+                                          </p:stCondLst>
+                                        </p:cTn>
+                                        <p:tgtEl>
+                                          <p:spTgt spid="16"/>
+                                        </p:tgtEl>
+                                        <p:attrNameLst>
+                                          <p:attrName>style.visibility</p:attrName>
+                                        </p:attrNameLst>
+                                      </p:cBhvr>
+                                      <p:to>
+                                        <p:strVal val="visible"/>
+                                      </p:to>
+                                    </p:set>
+                                  </p:childTnLst>
+                                </p:cTn>
+                              </p:par>
+                            </p:childTnLst>
+                          </p:cTn>
+                        </p:par>
+                      </p:childTnLst>
+                    </p:cTn>
+                  </p:par>
+                  <p:par>
+                    <p:cTn id="15" fill="hold">
+                      <p:stCondLst>
+                        <p:cond delay="indefinite"/>
+                      </p:stCondLst>
+                      <p:childTnLst>
+                        <p:par>
+                          <p:cTn id="16" fill="hold">
+                            <p:stCondLst>
+                              <p:cond delay="0"/>
+                            </p:stCondLst>
+                            <p:childTnLst>
+                              <p:par>
+                                <p:cTn id="17" presetID="1" presetClass="entr" presetSubtype="0" fill="hold" nodeType="clickEffect">
+                                  <p:stCondLst>
+                                    <p:cond delay="0"/>
+                                  </p:stCondLst>
+                                  <p:childTnLst>
+                                    <p:set>
+                                      <p:cBhvr>
+                                        <p:cTn id="18" dur="1" fill="hold">
+                                          <p:stCondLst>
+                                            <p:cond delay="0"/>
+                                          </p:stCondLst>
+                                        </p:cTn>
+                                        <p:tgtEl>
+                                          <p:spTgt spid="18"/>
+                                        </p:tgtEl>
+                                        <p:attrNameLst>
+                                          <p:attrName>style.visibility</p:attrName>
+                                        </p:attrNameLst>
+                                      </p:cBhvr>
+                                      <p:to>
+                                        <p:strVal val="visible"/>
+                                      </p:to>
+                                    </p:set>
+                                  </p:childTnLst>
+                                </p:cTn>
+                              </p:par>
+                            </p:childTnLst>
+                          </p:cTn>
+                        </p:par>
+                      </p:childTnLst>
+                    </p:cTn>
+                  </p:par>
+                  <p:par>
+                    <p:cTn id="19" fill="hold">
+                      <p:stCondLst>
+                        <p:cond delay="indefinite"/>
+                      </p:stCondLst>
+                      <p:childTnLst>
+                        <p:par>
+                          <p:cTn id="20" fill="hold">
+                            <p:stCondLst>
+                              <p:cond delay="0"/>
+                            </p:stCondLst>
+                            <p:childTnLst>
+                              <p:par>
+                                <p:cTn id="21" presetID="1" presetClass="entr" presetSubtype="0" fill="hold" nodeType="clickEffect">
+                                  <p:stCondLst>
+                                    <p:cond delay="0"/>
+                                  </p:stCondLst>
+                                  <p:childTnLst>
+                                    <p:set>
+                                      <p:cBhvr>
+                                        <p:cTn id="22" dur="1" fill="hold">
+                                          <p:stCondLst>
+                                            <p:cond delay="0"/>
+                                          </p:stCondLst>
+                                        </p:cTn>
+                                        <p:tgtEl>
+                                          <p:spTgt spid="19"/>
+                                        </p:tgtEl>
+                                        <p:attrNameLst>
+                                          <p:attrName>style.visibility</p:attrName>
+                                        </p:attrNameLst>
+                                      </p:cBhvr>
+                                      <p:to>
+                                        <p:strVal val="visible"/>
+                                      </p:to>
+                                    </p:set>
+                                  </p:childTnLst>
+                                </p:cTn>
+                              </p:par>
+                            </p:childTnLst>
+                          </p:cTn>
+                        </p:par>
+                      </p:childTnLst>
+                    </p:cTn>
+                  </p:par>
+                  <p:par>
+                    <p:cTn id="23" fill="hold">
+                      <p:stCondLst>
+                        <p:cond delay="indefinite"/>
+                      </p:stCondLst>
+                      <p:childTnLst>
+                        <p:par>
+                          <p:cTn id="24" fill="hold">
+                            <p:stCondLst>
+                              <p:cond delay="0"/>
+                            </p:stCondLst>
+                            <p:childTnLst>
+                              <p:par>
+                                <p:cTn id="25" presetID="1" presetClass="entr" presetSubtype="0" fill="hold" grpId="0" nodeType="clickEffect">
+                                  <p:stCondLst>
+                                    <p:cond delay="0"/>
+                                  </p:stCondLst>
+                                  <p:childTnLst>
+                                    <p:set>
+                                      <p:cBhvr>
+                                        <p:cTn id="26" dur="1" fill="hold">
+                                          <p:stCondLst>
+                                            <p:cond delay="0"/>
+                                          </p:stCondLst>
+                                        </p:cTn>
+                                        <p:tgtEl>
+                                          <p:spTgt spid="24"/>
+                                        </p:tgtEl>
+                                        <p:attrNameLst>
+                                          <p:attrName>style.visibility</p:attrName>
+                                        </p:attrNameLst>
+                                      </p:cBhvr>
+                                      <p:to>
+                                        <p:strVal val="visible"/>
+                                      </p:to>
+                                    </p:set>
+                                  </p:childTnLst>
+                                </p:cTn>
+                              </p:par>
+                            </p:childTnLst>
+                          </p:cTn>
+                        </p:par>
+                      </p:childTnLst>
+                    </p:cTn>
+                  </p:par>
+                  <p:par>
+                    <p:cTn id="27" fill="hold">
+                      <p:stCondLst>
+                        <p:cond delay="indefinite"/>
+                      </p:stCondLst>
+                      <p:childTnLst>
+                        <p:par>
+                          <p:cTn id="28" fill="hold">
+                            <p:stCondLst>
+                              <p:cond delay="0"/>
+                            </p:stCondLst>
+                            <p:childTnLst>
+                              <p:par>
+                                <p:cTn id="29" presetID="1" presetClass="entr" presetSubtype="0" fill="hold" nodeType="clickEffect">
+                                  <p:stCondLst>
+                                    <p:cond delay="0"/>
+                                  </p:stCondLst>
+                                  <p:childTnLst>
+                                    <p:set>
+                                      <p:cBhvr>
+                                        <p:cTn id="30" dur="1" fill="hold">
+                                          <p:stCondLst>
+                                            <p:cond delay="0"/>
+                                          </p:stCondLst>
+                                        </p:cTn>
+                                        <p:tgtEl>
+                                          <p:spTgt spid="25"/>
+                                        </p:tgtEl>
+                                        <p:attrNameLst>
+                                          <p:attrName>style.visibility</p:attrName>
+                                        </p:attrNameLst>
+                                      </p:cBhvr>
+                                      <p:to>
+                                        <p:strVal val="visible"/>
+                                      </p:to>
+                                    </p:set>
+                                  </p:childTnLst>
+                                </p:cTn>
+                              </p:par>
+                            </p:childTnLst>
+                          </p:cTn>
+                        </p:par>
+                      </p:childTnLst>
+                    </p:cTn>
+                  </p:par>
+                  <p:par>
+                    <p:cTn id="31" fill="hold">
+                      <p:stCondLst>
+                        <p:cond delay="indefinite"/>
+                      </p:stCondLst>
+                      <p:childTnLst>
+                        <p:par>
+                          <p:cTn id="32" fill="hold">
+                            <p:stCondLst>
+                              <p:cond delay="0"/>
+                            </p:stCondLst>
+                            <p:childTnLst>
+                              <p:par>
+                                <p:cTn id="33" presetID="1" presetClass="entr" presetSubtype="0" fill="hold" nodeType="clickEffect">
+                                  <p:stCondLst>
+                                    <p:cond delay="0"/>
+                                  </p:stCondLst>
+                                  <p:childTnLst>
+                                    <p:set>
+                                      <p:cBhvr>
+                                        <p:cTn id="34" dur="1" fill="hold">
+                                          <p:stCondLst>
+                                            <p:cond delay="0"/>
+                                          </p:stCondLst>
+                                        </p:cTn>
+                                        <p:tgtEl>
+                                          <p:spTgt spid="32"/>
+                                        </p:tgtEl>
+                                        <p:attrNameLst>
+                                          <p:attrName>style.visibility</p:attrName>
+                                        </p:attrNameLst>
+                                      </p:cBhvr>
+                                      <p:to>
+                                        <p:strVal val="visible"/>
+                                      </p:to>
+                                    </p:set>
+                                  </p:childTnLst>
+                                </p:cTn>
+                              </p:par>
+                            </p:childTnLst>
+                          </p:cTn>
+                        </p:par>
+                      </p:childTnLst>
+                    </p:cTn>
+                  </p:par>
+                  <p:par>
+                    <p:cTn id="35" fill="hold">
+                      <p:stCondLst>
+                        <p:cond delay="indefinite"/>
+                      </p:stCondLst>
+                      <p:childTnLst>
+                        <p:par>
+                          <p:cTn id="36" fill="hold">
+                            <p:stCondLst>
+                              <p:cond delay="0"/>
+                            </p:stCondLst>
+                            <p:childTnLst>
+                              <p:par>
+                                <p:cTn id="37" presetID="1" presetClass="entr" presetSubtype="0" fill="hold" nodeType="clickEffect">
+                                  <p:stCondLst>
+                                    <p:cond delay="0"/>
+                                  </p:stCondLst>
+                                  <p:childTnLst>
+                                    <p:set>
+                                      <p:cBhvr>
+                                        <p:cTn id="38" dur="1" fill="hold">
+                                          <p:stCondLst>
+                                            <p:cond delay="0"/>
+                                          </p:stCondLst>
+                                        </p:cTn>
+                                        <p:tgtEl>
+                                          <p:spTgt spid="33"/>
+                                        </p:tgtEl>
+                                        <p:attrNameLst>
+                                          <p:attrName>style.visibility</p:attrName>
+                                        </p:attrNameLst>
+                                      </p:cBhvr>
+                                      <p:to>
+                                        <p:strVal val="visible"/>
+                                      </p:to>
+                                    </p:set>
+                                  </p:childTnLst>
+                                </p:cTn>
+                              </p:par>
+                            </p:childTnLst>
+                          </p:cTn>
+                        </p:par>
+                      </p:childTnLst>
+                    </p:cTn>
+                  </p:par>
+                </p:childTnLst>
+              </p:cTn>
+              <p:prevCondLst>
+                <p:cond evt="onPrev" delay="0">
+                  <p:tgtEl>
+                    <p:sldTgt/>
+                  </p:tgtEl>
+                </p:cond>
+              </p:prevCondLst>
+              <p:nextCondLst>
+                <p:cond evt="onNext" delay="0">
+                  <p:tgtEl>
+                    <p:sldTgt/>
+                  </p:tgtEl>
+                </p:cond>
+              </p:nextCondLst>
+            </p:seq>
+          </p:childTnLst>
+        </p:cTn>
+      </p:par>
+    </p:tnLst>
+    <p:bldLst>
+      <p:bldP spid="16" grpId="0"/>
+      <p:bldP spid="24" grpId="0" animBg="1"/>
+    </p:bldLst>
+  </p:timing>
+</p:sld>
+</file>
+
+<file path=ppt/slides/slide12.xml><?xml version="1.0" encoding="utf-8"?>
+<p:sld xmlns:a="http://schemas.openxmlformats.org/drawingml/2006/main" xmlns:r="http://schemas.openxmlformats.org/officeDocument/2006/relationships" xmlns:p="http://schemas.openxmlformats.org/presentationml/2006/main">
+  <p:cSld>
+    <p:spTree>
+      <p:nvGrpSpPr>
+        <p:cNvPr id="1" name=""/>
+        <p:cNvGrpSpPr/>
+        <p:nvPr/>
+      </p:nvGrpSpPr>
+      <p:grpSpPr>
+        <a:xfrm>
+          <a:off x="0" y="0"/>
+          <a:ext cx="0" cy="0"/>
+          <a:chOff x="0" y="0"/>
+          <a:chExt cx="0" cy="0"/>
+        </a:xfrm>
+      </p:grpSpPr>
+      <p:sp>
+        <p:nvSpPr>
           <p:cNvPr id="2" name="标题 1"/>
           <p:cNvSpPr>
             <a:spLocks noGrp="1"/>
@@ -7468,49 +9208,105 @@
           </a:bodyPr>
           <a:lstStyle/>
           <a:p>
-            <a:pPr algn="l"/>
-            <a:r>
-              <a:rPr lang="en-US" altLang="zh-CN" sz="2400" b="0" i="0" dirty="0">
+            <a:pPr marL="0" marR="0" lvl="0" indent="0" algn="l" defTabSz="914400" rtl="0" eaLnBrk="1" fontAlgn="auto" latinLnBrk="0" hangingPunct="1">
+              <a:lnSpc>
+                <a:spcPct val="100000"/>
+              </a:lnSpc>
+              <a:spcBef>
+                <a:spcPts val="0"/>
+              </a:spcBef>
+              <a:spcAft>
+                <a:spcPts val="0"/>
+              </a:spcAft>
+              <a:buClrTx/>
+              <a:buSzTx/>
+              <a:buFontTx/>
+              <a:buNone/>
+              <a:tabLst/>
+              <a:defRPr/>
+            </a:pPr>
+            <a:r>
+              <a:rPr kumimoji="0" lang="en-US" altLang="zh-CN" sz="2400" b="0" i="0" u="none" strike="noStrike" kern="1200" cap="none" spc="0" normalizeH="0" baseline="0" noProof="0" dirty="0">
+                <a:ln>
+                  <a:noFill/>
+                </a:ln>
                 <a:solidFill>
                   <a:srgbClr val="36344D"/>
                 </a:solidFill>
                 <a:effectLst/>
+                <a:uLnTx/>
+                <a:uFillTx/>
+                <a:latin typeface="Calibri"/>
+                <a:ea typeface="宋体" panose="02010600030101010101" pitchFamily="2" charset="-122"/>
+                <a:cs typeface="+mn-cs"/>
               </a:rPr>
               <a:t>Concatenate, or </a:t>
             </a:r>
             <a:r>
-              <a:rPr lang="en-US" altLang="zh-CN" sz="2400" b="1" i="0" dirty="0">
+              <a:rPr kumimoji="0" lang="en-US" altLang="zh-CN" sz="2400" b="1" i="0" u="none" strike="noStrike" kern="1200" cap="none" spc="0" normalizeH="0" baseline="0" noProof="0" dirty="0">
+                <a:ln>
+                  <a:noFill/>
+                </a:ln>
                 <a:solidFill>
                   <a:srgbClr val="00B0F0"/>
                 </a:solidFill>
                 <a:effectLst/>
+                <a:uLnTx/>
+                <a:uFillTx/>
+                <a:latin typeface="Calibri"/>
+                <a:ea typeface="宋体" panose="02010600030101010101" pitchFamily="2" charset="-122"/>
+                <a:cs typeface="+mn-cs"/>
               </a:rPr>
               <a:t>cat</a:t>
             </a:r>
             <a:r>
-              <a:rPr lang="en-US" altLang="zh-CN" sz="2400" b="0" i="0" dirty="0">
+              <a:rPr kumimoji="0" lang="en-US" altLang="zh-CN" sz="2400" b="0" i="0" u="none" strike="noStrike" kern="1200" cap="none" spc="0" normalizeH="0" baseline="0" noProof="0" dirty="0">
+                <a:ln>
+                  <a:noFill/>
+                </a:ln>
                 <a:solidFill>
                   <a:srgbClr val="36344D"/>
                 </a:solidFill>
                 <a:effectLst/>
+                <a:uLnTx/>
+                <a:uFillTx/>
+                <a:latin typeface="Calibri"/>
+                <a:ea typeface="宋体" panose="02010600030101010101" pitchFamily="2" charset="-122"/>
+                <a:cs typeface="+mn-cs"/>
               </a:rPr>
               <a:t>, is one of the most frequently used Linux commands. It lists, combines, and writes file content to the standard output. To run the cat command, type </a:t>
             </a:r>
             <a:r>
-              <a:rPr lang="en-US" altLang="zh-CN" sz="2400" b="1" i="0" dirty="0">
+              <a:rPr kumimoji="0" lang="en-US" altLang="zh-CN" sz="2400" b="1" i="0" u="none" strike="noStrike" kern="1200" cap="none" spc="0" normalizeH="0" baseline="0" noProof="0" dirty="0">
+                <a:ln>
+                  <a:noFill/>
+                </a:ln>
                 <a:solidFill>
                   <a:srgbClr val="36344D"/>
                 </a:solidFill>
                 <a:effectLst/>
+                <a:uLnTx/>
+                <a:uFillTx/>
+                <a:latin typeface="Calibri"/>
+                <a:ea typeface="宋体" panose="02010600030101010101" pitchFamily="2" charset="-122"/>
+                <a:cs typeface="+mn-cs"/>
               </a:rPr>
               <a:t>cat</a:t>
             </a:r>
             <a:r>
-              <a:rPr lang="en-US" altLang="zh-CN" sz="2400" b="0" i="0" dirty="0">
+              <a:rPr kumimoji="0" lang="en-US" altLang="zh-CN" sz="2400" b="0" i="0" u="none" strike="noStrike" kern="1200" cap="none" spc="0" normalizeH="0" baseline="0" noProof="0" dirty="0">
+                <a:ln>
+                  <a:noFill/>
+                </a:ln>
                 <a:solidFill>
                   <a:srgbClr val="36344D"/>
                 </a:solidFill>
                 <a:effectLst/>
+                <a:uLnTx/>
+                <a:uFillTx/>
+                <a:latin typeface="Calibri"/>
+                <a:ea typeface="宋体" panose="02010600030101010101" pitchFamily="2" charset="-122"/>
+                <a:cs typeface="+mn-cs"/>
               </a:rPr>
               <a:t> followed by the file name and its extension. </a:t>
             </a:r>
@@ -7545,154 +9341,332 @@
           </a:bodyPr>
           <a:lstStyle/>
           <a:p>
-            <a:pPr algn="l"/>
-            <a:r>
-              <a:rPr lang="en-US" altLang="zh-CN" sz="2400" b="0" i="0" dirty="0">
+            <a:pPr marL="0" marR="0" lvl="0" indent="0" algn="l" defTabSz="914400" rtl="0" eaLnBrk="1" fontAlgn="auto" latinLnBrk="0" hangingPunct="1">
+              <a:lnSpc>
+                <a:spcPct val="100000"/>
+              </a:lnSpc>
+              <a:spcBef>
+                <a:spcPts val="0"/>
+              </a:spcBef>
+              <a:spcAft>
+                <a:spcPts val="0"/>
+              </a:spcAft>
+              <a:buClrTx/>
+              <a:buSzTx/>
+              <a:buFontTx/>
+              <a:buNone/>
+              <a:tabLst/>
+              <a:defRPr/>
+            </a:pPr>
+            <a:r>
+              <a:rPr kumimoji="0" lang="en-US" altLang="zh-CN" sz="2400" b="0" i="0" u="none" strike="noStrike" kern="1200" cap="none" spc="0" normalizeH="0" baseline="0" noProof="0" dirty="0">
+                <a:ln>
+                  <a:noFill/>
+                </a:ln>
                 <a:solidFill>
                   <a:srgbClr val="36344D"/>
                 </a:solidFill>
                 <a:effectLst/>
+                <a:uLnTx/>
+                <a:uFillTx/>
+                <a:latin typeface="Calibri"/>
+                <a:ea typeface="宋体" panose="02010600030101010101" pitchFamily="2" charset="-122"/>
+                <a:cs typeface="+mn-cs"/>
               </a:rPr>
               <a:t>Here are other ways to use the </a:t>
             </a:r>
             <a:r>
-              <a:rPr lang="en-US" altLang="zh-CN" sz="2400" i="0" dirty="0">
+              <a:rPr kumimoji="0" lang="en-US" altLang="zh-CN" sz="2400" b="0" i="0" u="none" strike="noStrike" kern="1200" cap="none" spc="0" normalizeH="0" baseline="0" noProof="0" dirty="0">
+                <a:ln>
+                  <a:noFill/>
+                </a:ln>
+                <a:solidFill>
+                  <a:prstClr val="black"/>
+                </a:solidFill>
                 <a:effectLst/>
+                <a:uLnTx/>
+                <a:uFillTx/>
+                <a:latin typeface="Calibri"/>
+                <a:ea typeface="宋体" panose="02010600030101010101" pitchFamily="2" charset="-122"/>
+                <a:cs typeface="+mn-cs"/>
               </a:rPr>
               <a:t>cat command</a:t>
             </a:r>
             <a:r>
-              <a:rPr lang="en-US" altLang="zh-CN" sz="2400" b="0" i="0" dirty="0">
+              <a:rPr kumimoji="0" lang="en-US" altLang="zh-CN" sz="2400" b="0" i="0" u="none" strike="noStrike" kern="1200" cap="none" spc="0" normalizeH="0" baseline="0" noProof="0" dirty="0">
+                <a:ln>
+                  <a:noFill/>
+                </a:ln>
                 <a:solidFill>
                   <a:srgbClr val="36344D"/>
                 </a:solidFill>
                 <a:effectLst/>
+                <a:uLnTx/>
+                <a:uFillTx/>
+                <a:latin typeface="Calibri"/>
+                <a:ea typeface="宋体" panose="02010600030101010101" pitchFamily="2" charset="-122"/>
+                <a:cs typeface="+mn-cs"/>
               </a:rPr>
               <a:t>:</a:t>
             </a:r>
           </a:p>
           <a:p>
-            <a:pPr algn="l">
+            <a:pPr marL="0" marR="0" lvl="0" indent="0" algn="l" defTabSz="914400" rtl="0" eaLnBrk="1" fontAlgn="auto" latinLnBrk="0" hangingPunct="1">
+              <a:lnSpc>
+                <a:spcPct val="100000"/>
+              </a:lnSpc>
+              <a:spcBef>
+                <a:spcPts val="0"/>
+              </a:spcBef>
+              <a:spcAft>
+                <a:spcPts val="0"/>
+              </a:spcAft>
+              <a:buClrTx/>
+              <a:buSzTx/>
               <a:buFont typeface="Arial" panose="020B0604020202020204" pitchFamily="34" charset="0"/>
               <a:buChar char="•"/>
+              <a:tabLst/>
+              <a:defRPr/>
             </a:pPr>
             <a:r>
-              <a:rPr lang="en-US" altLang="zh-CN" sz="2400" b="1" i="0" dirty="0">
+              <a:rPr kumimoji="0" lang="en-US" altLang="zh-CN" sz="2400" b="1" i="0" u="none" strike="noStrike" kern="1200" cap="none" spc="0" normalizeH="0" baseline="0" noProof="0" dirty="0">
+                <a:ln>
+                  <a:noFill/>
+                </a:ln>
                 <a:solidFill>
                   <a:srgbClr val="36344D"/>
                 </a:solidFill>
                 <a:effectLst/>
+                <a:uLnTx/>
+                <a:uFillTx/>
+                <a:latin typeface="Calibri"/>
+                <a:ea typeface="宋体" panose="02010600030101010101" pitchFamily="2" charset="-122"/>
+                <a:cs typeface="+mn-cs"/>
               </a:rPr>
               <a:t>cat &gt; filename.txt </a:t>
             </a:r>
             <a:r>
-              <a:rPr lang="en-US" altLang="zh-CN" sz="2400" b="0" i="0" dirty="0">
+              <a:rPr kumimoji="0" lang="en-US" altLang="zh-CN" sz="2400" b="0" i="0" u="none" strike="noStrike" kern="1200" cap="none" spc="0" normalizeH="0" baseline="0" noProof="0" dirty="0">
+                <a:ln>
+                  <a:noFill/>
+                </a:ln>
                 <a:solidFill>
                   <a:srgbClr val="36344D"/>
                 </a:solidFill>
                 <a:effectLst/>
+                <a:uLnTx/>
+                <a:uFillTx/>
+                <a:latin typeface="Calibri"/>
+                <a:ea typeface="宋体" panose="02010600030101010101" pitchFamily="2" charset="-122"/>
+                <a:cs typeface="+mn-cs"/>
               </a:rPr>
               <a:t>creates a new file.</a:t>
             </a:r>
           </a:p>
           <a:p>
-            <a:pPr algn="l">
+            <a:pPr marL="0" marR="0" lvl="0" indent="0" algn="l" defTabSz="914400" rtl="0" eaLnBrk="1" fontAlgn="auto" latinLnBrk="0" hangingPunct="1">
+              <a:lnSpc>
+                <a:spcPct val="100000"/>
+              </a:lnSpc>
+              <a:spcBef>
+                <a:spcPts val="0"/>
+              </a:spcBef>
+              <a:spcAft>
+                <a:spcPts val="0"/>
+              </a:spcAft>
+              <a:buClrTx/>
+              <a:buSzTx/>
               <a:buFont typeface="Arial" panose="020B0604020202020204" pitchFamily="34" charset="0"/>
               <a:buChar char="•"/>
+              <a:tabLst/>
+              <a:defRPr/>
             </a:pPr>
             <a:r>
-              <a:rPr lang="en-US" altLang="zh-CN" sz="2400" b="1" i="0" dirty="0">
+              <a:rPr kumimoji="0" lang="en-US" altLang="zh-CN" sz="2400" b="1" i="0" u="none" strike="noStrike" kern="1200" cap="none" spc="0" normalizeH="0" baseline="0" noProof="0" dirty="0">
+                <a:ln>
+                  <a:noFill/>
+                </a:ln>
                 <a:solidFill>
                   <a:srgbClr val="36344D"/>
                 </a:solidFill>
                 <a:effectLst/>
+                <a:uLnTx/>
+                <a:uFillTx/>
+                <a:latin typeface="Calibri"/>
+                <a:ea typeface="宋体" panose="02010600030101010101" pitchFamily="2" charset="-122"/>
+                <a:cs typeface="+mn-cs"/>
               </a:rPr>
               <a:t>cat filename1.txt filename2.txt &gt; filename3.txt  </a:t>
             </a:r>
             <a:r>
-              <a:rPr lang="en-US" altLang="zh-CN" sz="2400" b="0" i="0" dirty="0">
+              <a:rPr kumimoji="0" lang="en-US" altLang="zh-CN" sz="2400" b="0" i="0" u="none" strike="noStrike" kern="1200" cap="none" spc="0" normalizeH="0" baseline="0" noProof="0" dirty="0">
+                <a:ln>
+                  <a:noFill/>
+                </a:ln>
                 <a:solidFill>
                   <a:srgbClr val="36344D"/>
                 </a:solidFill>
                 <a:effectLst/>
+                <a:uLnTx/>
+                <a:uFillTx/>
+                <a:latin typeface="Calibri"/>
+                <a:ea typeface="宋体" panose="02010600030101010101" pitchFamily="2" charset="-122"/>
+                <a:cs typeface="+mn-cs"/>
               </a:rPr>
               <a:t>merges </a:t>
             </a:r>
             <a:r>
-              <a:rPr lang="en-US" altLang="zh-CN" sz="2400" b="1" i="0" dirty="0">
+              <a:rPr kumimoji="0" lang="en-US" altLang="zh-CN" sz="2400" b="1" i="0" u="none" strike="noStrike" kern="1200" cap="none" spc="0" normalizeH="0" baseline="0" noProof="0" dirty="0">
+                <a:ln>
+                  <a:noFill/>
+                </a:ln>
                 <a:solidFill>
                   <a:srgbClr val="36344D"/>
                 </a:solidFill>
                 <a:effectLst/>
+                <a:uLnTx/>
+                <a:uFillTx/>
+                <a:latin typeface="Calibri"/>
+                <a:ea typeface="宋体" panose="02010600030101010101" pitchFamily="2" charset="-122"/>
+                <a:cs typeface="+mn-cs"/>
               </a:rPr>
               <a:t>filename1.txt</a:t>
             </a:r>
             <a:r>
-              <a:rPr lang="en-US" altLang="zh-CN" sz="2400" b="0" i="0" dirty="0">
+              <a:rPr kumimoji="0" lang="en-US" altLang="zh-CN" sz="2400" b="0" i="0" u="none" strike="noStrike" kern="1200" cap="none" spc="0" normalizeH="0" baseline="0" noProof="0" dirty="0">
+                <a:ln>
+                  <a:noFill/>
+                </a:ln>
                 <a:solidFill>
                   <a:srgbClr val="36344D"/>
                 </a:solidFill>
                 <a:effectLst/>
+                <a:uLnTx/>
+                <a:uFillTx/>
+                <a:latin typeface="Calibri"/>
+                <a:ea typeface="宋体" panose="02010600030101010101" pitchFamily="2" charset="-122"/>
+                <a:cs typeface="+mn-cs"/>
               </a:rPr>
               <a:t> and </a:t>
             </a:r>
             <a:r>
-              <a:rPr lang="en-US" altLang="zh-CN" sz="2400" b="1" i="0" dirty="0">
+              <a:rPr kumimoji="0" lang="en-US" altLang="zh-CN" sz="2400" b="1" i="0" u="none" strike="noStrike" kern="1200" cap="none" spc="0" normalizeH="0" baseline="0" noProof="0" dirty="0">
+                <a:ln>
+                  <a:noFill/>
+                </a:ln>
                 <a:solidFill>
                   <a:srgbClr val="36344D"/>
                 </a:solidFill>
                 <a:effectLst/>
+                <a:uLnTx/>
+                <a:uFillTx/>
+                <a:latin typeface="Calibri"/>
+                <a:ea typeface="宋体" panose="02010600030101010101" pitchFamily="2" charset="-122"/>
+                <a:cs typeface="+mn-cs"/>
               </a:rPr>
               <a:t>filename2.txt</a:t>
             </a:r>
             <a:r>
-              <a:rPr lang="en-US" altLang="zh-CN" sz="2400" b="0" i="0" dirty="0">
+              <a:rPr kumimoji="0" lang="en-US" altLang="zh-CN" sz="2400" b="0" i="0" u="none" strike="noStrike" kern="1200" cap="none" spc="0" normalizeH="0" baseline="0" noProof="0" dirty="0">
+                <a:ln>
+                  <a:noFill/>
+                </a:ln>
                 <a:solidFill>
                   <a:srgbClr val="36344D"/>
                 </a:solidFill>
                 <a:effectLst/>
+                <a:uLnTx/>
+                <a:uFillTx/>
+                <a:latin typeface="Calibri"/>
+                <a:ea typeface="宋体" panose="02010600030101010101" pitchFamily="2" charset="-122"/>
+                <a:cs typeface="+mn-cs"/>
               </a:rPr>
               <a:t> and stores the output in </a:t>
             </a:r>
             <a:r>
-              <a:rPr lang="en-US" altLang="zh-CN" sz="2400" b="1" i="0" dirty="0">
+              <a:rPr kumimoji="0" lang="en-US" altLang="zh-CN" sz="2400" b="1" i="0" u="none" strike="noStrike" kern="1200" cap="none" spc="0" normalizeH="0" baseline="0" noProof="0" dirty="0">
+                <a:ln>
+                  <a:noFill/>
+                </a:ln>
                 <a:solidFill>
                   <a:srgbClr val="36344D"/>
                 </a:solidFill>
                 <a:effectLst/>
+                <a:uLnTx/>
+                <a:uFillTx/>
+                <a:latin typeface="Calibri"/>
+                <a:ea typeface="宋体" panose="02010600030101010101" pitchFamily="2" charset="-122"/>
+                <a:cs typeface="+mn-cs"/>
               </a:rPr>
               <a:t>filename3.txt</a:t>
             </a:r>
             <a:r>
-              <a:rPr lang="en-US" altLang="zh-CN" sz="2400" b="0" i="0" dirty="0">
+              <a:rPr kumimoji="0" lang="en-US" altLang="zh-CN" sz="2400" b="0" i="0" u="none" strike="noStrike" kern="1200" cap="none" spc="0" normalizeH="0" baseline="0" noProof="0" dirty="0">
+                <a:ln>
+                  <a:noFill/>
+                </a:ln>
                 <a:solidFill>
                   <a:srgbClr val="36344D"/>
                 </a:solidFill>
                 <a:effectLst/>
+                <a:uLnTx/>
+                <a:uFillTx/>
+                <a:latin typeface="Calibri"/>
+                <a:ea typeface="宋体" panose="02010600030101010101" pitchFamily="2" charset="-122"/>
+                <a:cs typeface="+mn-cs"/>
               </a:rPr>
               <a:t>.</a:t>
             </a:r>
           </a:p>
           <a:p>
-            <a:pPr algn="l">
+            <a:pPr marL="0" marR="0" lvl="0" indent="0" algn="l" defTabSz="914400" rtl="0" eaLnBrk="1" fontAlgn="auto" latinLnBrk="0" hangingPunct="1">
+              <a:lnSpc>
+                <a:spcPct val="100000"/>
+              </a:lnSpc>
+              <a:spcBef>
+                <a:spcPts val="0"/>
+              </a:spcBef>
+              <a:spcAft>
+                <a:spcPts val="0"/>
+              </a:spcAft>
+              <a:buClrTx/>
+              <a:buSzTx/>
               <a:buFont typeface="Arial" panose="020B0604020202020204" pitchFamily="34" charset="0"/>
               <a:buChar char="•"/>
+              <a:tabLst/>
+              <a:defRPr/>
             </a:pPr>
             <a:r>
-              <a:rPr lang="en-US" altLang="zh-CN" sz="2400" b="1" i="0" dirty="0">
+              <a:rPr kumimoji="0" lang="en-US" altLang="zh-CN" sz="2400" b="1" i="0" u="none" strike="noStrike" kern="1200" cap="none" spc="0" normalizeH="0" baseline="0" noProof="0" dirty="0">
+                <a:ln>
+                  <a:noFill/>
+                </a:ln>
                 <a:solidFill>
                   <a:srgbClr val="36344D"/>
                 </a:solidFill>
                 <a:effectLst/>
+                <a:uLnTx/>
+                <a:uFillTx/>
+                <a:latin typeface="Calibri"/>
+                <a:ea typeface="宋体" panose="02010600030101010101" pitchFamily="2" charset="-122"/>
+                <a:cs typeface="+mn-cs"/>
               </a:rPr>
               <a:t>tac filename.txt </a:t>
             </a:r>
             <a:r>
-              <a:rPr lang="en-US" altLang="zh-CN" sz="2400" b="0" i="0" dirty="0">
+              <a:rPr kumimoji="0" lang="en-US" altLang="zh-CN" sz="2400" b="0" i="0" u="none" strike="noStrike" kern="1200" cap="none" spc="0" normalizeH="0" baseline="0" noProof="0" dirty="0">
+                <a:ln>
+                  <a:noFill/>
+                </a:ln>
                 <a:solidFill>
                   <a:srgbClr val="36344D"/>
                 </a:solidFill>
                 <a:effectLst/>
+                <a:uLnTx/>
+                <a:uFillTx/>
+                <a:latin typeface="Calibri"/>
+                <a:ea typeface="宋体" panose="02010600030101010101" pitchFamily="2" charset="-122"/>
+                <a:cs typeface="+mn-cs"/>
               </a:rPr>
               <a:t>displays content in reverse order.</a:t>
             </a:r>
@@ -7776,15 +9750,44 @@
           <a:bodyPr rtlCol="0" anchor="ctr"/>
           <a:lstStyle/>
           <a:p>
-            <a:pPr algn="ctr"/>
-            <a:endParaRPr lang="zh-CN" altLang="en-US"/>
+            <a:pPr marL="0" marR="0" lvl="0" indent="0" algn="ctr" defTabSz="914400" rtl="0" eaLnBrk="1" fontAlgn="auto" latinLnBrk="0" hangingPunct="1">
+              <a:lnSpc>
+                <a:spcPct val="100000"/>
+              </a:lnSpc>
+              <a:spcBef>
+                <a:spcPts val="0"/>
+              </a:spcBef>
+              <a:spcAft>
+                <a:spcPts val="0"/>
+              </a:spcAft>
+              <a:buClrTx/>
+              <a:buSzTx/>
+              <a:buFontTx/>
+              <a:buNone/>
+              <a:tabLst/>
+              <a:defRPr/>
+            </a:pPr>
+            <a:endParaRPr kumimoji="0" lang="zh-CN" altLang="en-US" sz="1800" b="0" i="0" u="none" strike="noStrike" kern="1200" cap="none" spc="0" normalizeH="0" baseline="0" noProof="0">
+              <a:ln>
+                <a:noFill/>
+              </a:ln>
+              <a:solidFill>
+                <a:prstClr val="white"/>
+              </a:solidFill>
+              <a:effectLst/>
+              <a:uLnTx/>
+              <a:uFillTx/>
+              <a:latin typeface="Calibri"/>
+              <a:ea typeface="宋体" panose="02010600030101010101" pitchFamily="2" charset="-122"/>
+              <a:cs typeface="+mn-cs"/>
+            </a:endParaRPr>
           </a:p>
         </p:txBody>
       </p:sp>
     </p:spTree>
     <p:extLst>
       <p:ext uri="{BB962C8B-B14F-4D97-AF65-F5344CB8AC3E}">
-        <p14:creationId xmlns:p14="http://schemas.microsoft.com/office/powerpoint/2010/main" val="76128807"/>
+        <p14:creationId xmlns:p14="http://schemas.microsoft.com/office/powerpoint/2010/main" val="1341827440"/>
       </p:ext>
     </p:extLst>
   </p:cSld>
@@ -7963,7 +9966,7 @@
 </p:sld>
 </file>
 
-<file path=ppt/slides/slide12.xml><?xml version="1.0" encoding="utf-8"?>
+<file path=ppt/slides/slide13.xml><?xml version="1.0" encoding="utf-8"?>
 <p:sld xmlns:a="http://schemas.openxmlformats.org/drawingml/2006/main" xmlns:r="http://schemas.openxmlformats.org/officeDocument/2006/relationships" xmlns:p="http://schemas.openxmlformats.org/presentationml/2006/main">
   <p:cSld>
     <p:spTree>
@@ -8075,7 +10078,7 @@
     </p:spTree>
     <p:extLst>
       <p:ext uri="{BB962C8B-B14F-4D97-AF65-F5344CB8AC3E}">
-        <p14:creationId xmlns:p14="http://schemas.microsoft.com/office/powerpoint/2010/main" val="3258813211"/>
+        <p14:creationId xmlns:p14="http://schemas.microsoft.com/office/powerpoint/2010/main" val="2917411621"/>
       </p:ext>
     </p:extLst>
   </p:cSld>
@@ -8085,7 +10088,7 @@
 </p:sld>
 </file>
 
-<file path=ppt/slides/slide13.xml><?xml version="1.0" encoding="utf-8"?>
+<file path=ppt/slides/slide14.xml><?xml version="1.0" encoding="utf-8"?>
 <p:sld xmlns:a="http://schemas.openxmlformats.org/drawingml/2006/main" xmlns:r="http://schemas.openxmlformats.org/officeDocument/2006/relationships" xmlns:p="http://schemas.openxmlformats.org/presentationml/2006/main">
   <p:cSld>
     <p:spTree>
@@ -8940,7 +10943,7 @@
 </p:sld>
 </file>
 
-<file path=ppt/slides/slide14.xml><?xml version="1.0" encoding="utf-8"?>
+<file path=ppt/slides/slide15.xml><?xml version="1.0" encoding="utf-8"?>
 <p:sld xmlns:a="http://schemas.openxmlformats.org/drawingml/2006/main" xmlns:r="http://schemas.openxmlformats.org/officeDocument/2006/relationships" xmlns:p="http://schemas.openxmlformats.org/presentationml/2006/main">
   <p:cSld>
     <p:spTree>
@@ -9866,7 +11869,7 @@
 </p:sld>
 </file>
 
-<file path=ppt/slides/slide15.xml><?xml version="1.0" encoding="utf-8"?>
+<file path=ppt/slides/slide16.xml><?xml version="1.0" encoding="utf-8"?>
 <p:sld xmlns:a="http://schemas.openxmlformats.org/drawingml/2006/main" xmlns:r="http://schemas.openxmlformats.org/officeDocument/2006/relationships" xmlns:p="http://schemas.openxmlformats.org/presentationml/2006/main">
   <p:cSld>
     <p:spTree>
@@ -11797,7 +13800,7 @@
 </p:sld>
 </file>
 
-<file path=ppt/slides/slide16.xml><?xml version="1.0" encoding="utf-8"?>
+<file path=ppt/slides/slide17.xml><?xml version="1.0" encoding="utf-8"?>
 <p:sld xmlns:a="http://schemas.openxmlformats.org/drawingml/2006/main" xmlns:r="http://schemas.openxmlformats.org/officeDocument/2006/relationships" xmlns:p="http://schemas.openxmlformats.org/presentationml/2006/main">
   <p:cSld>
     <p:spTree>
@@ -12597,7 +14600,7 @@
 </p:sld>
 </file>
 
-<file path=ppt/slides/slide17.xml><?xml version="1.0" encoding="utf-8"?>
+<file path=ppt/slides/slide18.xml><?xml version="1.0" encoding="utf-8"?>
 <p:sld xmlns:a="http://schemas.openxmlformats.org/drawingml/2006/main" xmlns:r="http://schemas.openxmlformats.org/officeDocument/2006/relationships" xmlns:p="http://schemas.openxmlformats.org/presentationml/2006/main">
   <p:cSld>
     <p:spTree>
@@ -13986,7 +15989,7 @@
 </p:sld>
 </file>
 
-<file path=ppt/slides/slide18.xml><?xml version="1.0" encoding="utf-8"?>
+<file path=ppt/slides/slide19.xml><?xml version="1.0" encoding="utf-8"?>
 <p:sld xmlns:a="http://schemas.openxmlformats.org/drawingml/2006/main" xmlns:r="http://schemas.openxmlformats.org/officeDocument/2006/relationships" xmlns:p="http://schemas.openxmlformats.org/presentationml/2006/main">
   <p:cSld>
     <p:spTree>
@@ -14116,459 +16119,6 @@
     <p:extLst>
       <p:ext uri="{BB962C8B-B14F-4D97-AF65-F5344CB8AC3E}">
         <p14:creationId xmlns:p14="http://schemas.microsoft.com/office/powerpoint/2010/main" val="4011325537"/>
-      </p:ext>
-    </p:extLst>
-  </p:cSld>
-  <p:clrMapOvr>
-    <a:masterClrMapping/>
-  </p:clrMapOvr>
-</p:sld>
-</file>
-
-<file path=ppt/slides/slide19.xml><?xml version="1.0" encoding="utf-8"?>
-<p:sld xmlns:a="http://schemas.openxmlformats.org/drawingml/2006/main" xmlns:r="http://schemas.openxmlformats.org/officeDocument/2006/relationships" xmlns:p="http://schemas.openxmlformats.org/presentationml/2006/main">
-  <p:cSld>
-    <p:spTree>
-      <p:nvGrpSpPr>
-        <p:cNvPr id="1" name=""/>
-        <p:cNvGrpSpPr/>
-        <p:nvPr/>
-      </p:nvGrpSpPr>
-      <p:grpSpPr>
-        <a:xfrm>
-          <a:off x="0" y="0"/>
-          <a:ext cx="0" cy="0"/>
-          <a:chOff x="0" y="0"/>
-          <a:chExt cx="0" cy="0"/>
-        </a:xfrm>
-      </p:grpSpPr>
-      <p:sp>
-        <p:nvSpPr>
-          <p:cNvPr id="10" name="Title 1"/>
-          <p:cNvSpPr txBox="1"/>
-          <p:nvPr/>
-        </p:nvSpPr>
-        <p:spPr>
-          <a:xfrm>
-            <a:off x="1377311" y="508057"/>
-            <a:ext cx="8100392" cy="685800"/>
-          </a:xfrm>
-          <a:prstGeom prst="rect">
-            <a:avLst/>
-          </a:prstGeom>
-        </p:spPr>
-        <p:txBody>
-          <a:bodyPr vert="horz" lIns="91440" tIns="45720" rIns="91440" bIns="45720" rtlCol="0" anchor="ctr">
-            <a:noAutofit/>
-          </a:bodyPr>
-          <a:lstStyle>
-            <a:lvl1pPr algn="l" defTabSz="914400" rtl="0" eaLnBrk="1" latinLnBrk="0" hangingPunct="1">
-              <a:lnSpc>
-                <a:spcPct val="90000"/>
-              </a:lnSpc>
-              <a:spcBef>
-                <a:spcPct val="0"/>
-              </a:spcBef>
-              <a:buNone/>
-              <a:defRPr sz="4400" kern="1200">
-                <a:solidFill>
-                  <a:schemeClr val="tx1"/>
-                </a:solidFill>
-                <a:latin typeface="+mj-lt"/>
-                <a:ea typeface="+mj-ea"/>
-                <a:cs typeface="+mj-cs"/>
-              </a:defRPr>
-            </a:lvl1pPr>
-          </a:lstStyle>
-          <a:p>
-            <a:pPr marL="0" marR="0" lvl="0" indent="0" algn="l" defTabSz="914400" rtl="0" eaLnBrk="1" fontAlgn="auto" latinLnBrk="0" hangingPunct="1">
-              <a:lnSpc>
-                <a:spcPct val="90000"/>
-              </a:lnSpc>
-              <a:spcBef>
-                <a:spcPct val="0"/>
-              </a:spcBef>
-              <a:spcAft>
-                <a:spcPts val="0"/>
-              </a:spcAft>
-              <a:buClrTx/>
-              <a:buSzTx/>
-              <a:buFontTx/>
-              <a:buNone/>
-              <a:tabLst/>
-              <a:defRPr/>
-            </a:pPr>
-            <a:r>
-              <a:rPr kumimoji="0" lang="en-US" altLang="zh-CN" sz="3600" b="1" i="0" u="none" strike="noStrike" kern="1200" cap="none" spc="0" normalizeH="0" baseline="0" noProof="0" dirty="0">
-                <a:ln>
-                  <a:noFill/>
-                </a:ln>
-                <a:solidFill>
-                  <a:prstClr val="black"/>
-                </a:solidFill>
-                <a:effectLst/>
-                <a:uLnTx/>
-                <a:uFillTx/>
-                <a:latin typeface="Calibri" panose="020F0502020204030204"/>
-                <a:ea typeface="宋体" panose="02010600030101010101" pitchFamily="2" charset="-122"/>
-                <a:cs typeface="+mj-cs"/>
-              </a:rPr>
-              <a:t> Exercises</a:t>
-            </a:r>
-          </a:p>
-        </p:txBody>
-      </p:sp>
-      <p:pic>
-        <p:nvPicPr>
-          <p:cNvPr id="4" name="Picture 5">
-            <a:extLst>
-              <a:ext uri="{FF2B5EF4-FFF2-40B4-BE49-F238E27FC236}">
-                <a16:creationId xmlns:a16="http://schemas.microsoft.com/office/drawing/2014/main" id="{8B34BCA4-ABEA-0E76-67B9-436798701AD9}"/>
-              </a:ext>
-            </a:extLst>
-          </p:cNvPr>
-          <p:cNvPicPr>
-            <a:picLocks noChangeAspect="1" noChangeArrowheads="1"/>
-          </p:cNvPicPr>
-          <p:nvPr/>
-        </p:nvPicPr>
-        <p:blipFill>
-          <a:blip r:embed="rId2">
-            <a:extLst>
-              <a:ext uri="{28A0092B-C50C-407E-A947-70E740481C1C}">
-                <a14:useLocalDpi xmlns:a14="http://schemas.microsoft.com/office/drawing/2010/main" val="0"/>
-              </a:ext>
-            </a:extLst>
-          </a:blip>
-          <a:srcRect/>
-          <a:stretch>
-            <a:fillRect/>
-          </a:stretch>
-        </p:blipFill>
-        <p:spPr bwMode="auto">
-          <a:xfrm>
-            <a:off x="5349464" y="4016954"/>
-            <a:ext cx="3188783" cy="914596"/>
-          </a:xfrm>
-          <a:prstGeom prst="rect">
-            <a:avLst/>
-          </a:prstGeom>
-          <a:noFill/>
-          <a:ln w="9525">
-            <a:solidFill>
-              <a:srgbClr val="00B0F0"/>
-            </a:solidFill>
-            <a:miter lim="800000"/>
-            <a:headEnd/>
-            <a:tailEnd/>
-          </a:ln>
-          <a:effectLst/>
-          <a:extLst>
-            <a:ext uri="{909E8E84-426E-40DD-AFC4-6F175D3DCCD1}">
-              <a14:hiddenFill xmlns:a14="http://schemas.microsoft.com/office/drawing/2010/main">
-                <a:solidFill>
-                  <a:schemeClr val="accent1"/>
-                </a:solidFill>
-              </a14:hiddenFill>
-            </a:ext>
-            <a:ext uri="{AF507438-7753-43E0-B8FC-AC1667EBCBE1}">
-              <a14:hiddenEffects xmlns:a14="http://schemas.microsoft.com/office/drawing/2010/main">
-                <a:effectLst>
-                  <a:outerShdw dist="35921" dir="2700000" algn="ctr" rotWithShape="0">
-                    <a:schemeClr val="bg2"/>
-                  </a:outerShdw>
-                </a:effectLst>
-              </a14:hiddenEffects>
-            </a:ext>
-          </a:extLst>
-        </p:spPr>
-      </p:pic>
-      <p:pic>
-        <p:nvPicPr>
-          <p:cNvPr id="5" name="Picture 3">
-            <a:extLst>
-              <a:ext uri="{FF2B5EF4-FFF2-40B4-BE49-F238E27FC236}">
-                <a16:creationId xmlns:a16="http://schemas.microsoft.com/office/drawing/2014/main" id="{2A53B269-9589-97AD-04C1-E720C76425DC}"/>
-              </a:ext>
-            </a:extLst>
-          </p:cNvPr>
-          <p:cNvPicPr>
-            <a:picLocks noChangeAspect="1" noChangeArrowheads="1"/>
-          </p:cNvPicPr>
-          <p:nvPr/>
-        </p:nvPicPr>
-        <p:blipFill>
-          <a:blip r:embed="rId3">
-            <a:extLst>
-              <a:ext uri="{28A0092B-C50C-407E-A947-70E740481C1C}">
-                <a14:useLocalDpi xmlns:a14="http://schemas.microsoft.com/office/drawing/2010/main" val="0"/>
-              </a:ext>
-            </a:extLst>
-          </a:blip>
-          <a:srcRect/>
-          <a:stretch>
-            <a:fillRect/>
-          </a:stretch>
-        </p:blipFill>
-        <p:spPr bwMode="auto">
-          <a:xfrm>
-            <a:off x="541100" y="1011855"/>
-            <a:ext cx="4365706" cy="2743786"/>
-          </a:xfrm>
-          <a:prstGeom prst="rect">
-            <a:avLst/>
-          </a:prstGeom>
-          <a:noFill/>
-          <a:ln w="9525">
-            <a:solidFill>
-              <a:srgbClr val="00B0F0"/>
-            </a:solidFill>
-            <a:miter lim="800000"/>
-            <a:headEnd/>
-            <a:tailEnd/>
-          </a:ln>
-          <a:effectLst/>
-          <a:extLst>
-            <a:ext uri="{909E8E84-426E-40DD-AFC4-6F175D3DCCD1}">
-              <a14:hiddenFill xmlns:a14="http://schemas.microsoft.com/office/drawing/2010/main">
-                <a:solidFill>
-                  <a:schemeClr val="accent1"/>
-                </a:solidFill>
-              </a14:hiddenFill>
-            </a:ext>
-            <a:ext uri="{AF507438-7753-43E0-B8FC-AC1667EBCBE1}">
-              <a14:hiddenEffects xmlns:a14="http://schemas.microsoft.com/office/drawing/2010/main">
-                <a:effectLst>
-                  <a:outerShdw dist="35921" dir="2700000" algn="ctr" rotWithShape="0">
-                    <a:schemeClr val="bg2"/>
-                  </a:outerShdw>
-                </a:effectLst>
-              </a14:hiddenEffects>
-            </a:ext>
-          </a:extLst>
-        </p:spPr>
-      </p:pic>
-      <p:pic>
-        <p:nvPicPr>
-          <p:cNvPr id="6" name="Picture 4">
-            <a:extLst>
-              <a:ext uri="{FF2B5EF4-FFF2-40B4-BE49-F238E27FC236}">
-                <a16:creationId xmlns:a16="http://schemas.microsoft.com/office/drawing/2014/main" id="{9D657EEC-29CB-4F5F-54DB-0D53150EF57A}"/>
-              </a:ext>
-            </a:extLst>
-          </p:cNvPr>
-          <p:cNvPicPr>
-            <a:picLocks noChangeAspect="1" noChangeArrowheads="1"/>
-          </p:cNvPicPr>
-          <p:nvPr/>
-        </p:nvPicPr>
-        <p:blipFill>
-          <a:blip r:embed="rId4">
-            <a:extLst>
-              <a:ext uri="{28A0092B-C50C-407E-A947-70E740481C1C}">
-                <a14:useLocalDpi xmlns:a14="http://schemas.microsoft.com/office/drawing/2010/main" val="0"/>
-              </a:ext>
-            </a:extLst>
-          </a:blip>
-          <a:srcRect/>
-          <a:stretch>
-            <a:fillRect/>
-          </a:stretch>
-        </p:blipFill>
-        <p:spPr bwMode="auto">
-          <a:xfrm>
-            <a:off x="541096" y="4016954"/>
-            <a:ext cx="4518212" cy="2488730"/>
-          </a:xfrm>
-          <a:prstGeom prst="rect">
-            <a:avLst/>
-          </a:prstGeom>
-          <a:noFill/>
-          <a:ln w="9525">
-            <a:solidFill>
-              <a:srgbClr val="00B0F0"/>
-            </a:solidFill>
-            <a:miter lim="800000"/>
-            <a:headEnd/>
-            <a:tailEnd/>
-          </a:ln>
-          <a:effectLst/>
-          <a:extLst>
-            <a:ext uri="{909E8E84-426E-40DD-AFC4-6F175D3DCCD1}">
-              <a14:hiddenFill xmlns:a14="http://schemas.microsoft.com/office/drawing/2010/main">
-                <a:solidFill>
-                  <a:schemeClr val="accent1"/>
-                </a:solidFill>
-              </a14:hiddenFill>
-            </a:ext>
-            <a:ext uri="{AF507438-7753-43E0-B8FC-AC1667EBCBE1}">
-              <a14:hiddenEffects xmlns:a14="http://schemas.microsoft.com/office/drawing/2010/main">
-                <a:effectLst>
-                  <a:outerShdw dist="35921" dir="2700000" algn="ctr" rotWithShape="0">
-                    <a:schemeClr val="bg2"/>
-                  </a:outerShdw>
-                </a:effectLst>
-              </a14:hiddenEffects>
-            </a:ext>
-          </a:extLst>
-        </p:spPr>
-      </p:pic>
-      <p:pic>
-        <p:nvPicPr>
-          <p:cNvPr id="7" name="Picture 2">
-            <a:extLst>
-              <a:ext uri="{FF2B5EF4-FFF2-40B4-BE49-F238E27FC236}">
-                <a16:creationId xmlns:a16="http://schemas.microsoft.com/office/drawing/2014/main" id="{1E662B48-EC76-4BF8-4B24-D5B2F1C57A26}"/>
-              </a:ext>
-            </a:extLst>
-          </p:cNvPr>
-          <p:cNvPicPr>
-            <a:picLocks noChangeAspect="1" noChangeArrowheads="1"/>
-          </p:cNvPicPr>
-          <p:nvPr/>
-        </p:nvPicPr>
-        <p:blipFill>
-          <a:blip r:embed="rId5">
-            <a:extLst>
-              <a:ext uri="{28A0092B-C50C-407E-A947-70E740481C1C}">
-                <a14:useLocalDpi xmlns:a14="http://schemas.microsoft.com/office/drawing/2010/main" val="0"/>
-              </a:ext>
-            </a:extLst>
-          </a:blip>
-          <a:srcRect/>
-          <a:stretch>
-            <a:fillRect/>
-          </a:stretch>
-        </p:blipFill>
-        <p:spPr bwMode="auto">
-          <a:xfrm>
-            <a:off x="5245135" y="881198"/>
-            <a:ext cx="6209713" cy="3072673"/>
-          </a:xfrm>
-          <a:prstGeom prst="rect">
-            <a:avLst/>
-          </a:prstGeom>
-          <a:noFill/>
-          <a:ln w="9525">
-            <a:solidFill>
-              <a:srgbClr val="00B0F0"/>
-            </a:solidFill>
-            <a:miter lim="800000"/>
-            <a:headEnd/>
-            <a:tailEnd/>
-          </a:ln>
-          <a:effectLst/>
-          <a:extLst>
-            <a:ext uri="{909E8E84-426E-40DD-AFC4-6F175D3DCCD1}">
-              <a14:hiddenFill xmlns:a14="http://schemas.microsoft.com/office/drawing/2010/main">
-                <a:solidFill>
-                  <a:schemeClr val="accent1"/>
-                </a:solidFill>
-              </a14:hiddenFill>
-            </a:ext>
-            <a:ext uri="{AF507438-7753-43E0-B8FC-AC1667EBCBE1}">
-              <a14:hiddenEffects xmlns:a14="http://schemas.microsoft.com/office/drawing/2010/main">
-                <a:effectLst>
-                  <a:outerShdw dist="35921" dir="2700000" algn="ctr" rotWithShape="0">
-                    <a:schemeClr val="bg2"/>
-                  </a:outerShdw>
-                </a:effectLst>
-              </a14:hiddenEffects>
-            </a:ext>
-          </a:extLst>
-        </p:spPr>
-      </p:pic>
-      <p:sp>
-        <p:nvSpPr>
-          <p:cNvPr id="11" name="标题 1">
-            <a:extLst>
-              <a:ext uri="{FF2B5EF4-FFF2-40B4-BE49-F238E27FC236}">
-                <a16:creationId xmlns:a16="http://schemas.microsoft.com/office/drawing/2014/main" id="{BD8426C9-D518-1129-B082-A04673C5F207}"/>
-              </a:ext>
-            </a:extLst>
-          </p:cNvPr>
-          <p:cNvSpPr txBox="1">
-            <a:spLocks/>
-          </p:cNvSpPr>
-          <p:nvPr/>
-        </p:nvSpPr>
-        <p:spPr>
-          <a:xfrm>
-            <a:off x="5121861" y="4878727"/>
-            <a:ext cx="6832771" cy="2196149"/>
-          </a:xfrm>
-          <a:prstGeom prst="rect">
-            <a:avLst/>
-          </a:prstGeom>
-        </p:spPr>
-        <p:txBody>
-          <a:bodyPr vert="horz" lIns="91440" tIns="45720" rIns="91440" bIns="45720" rtlCol="0" anchor="ctr">
-            <a:normAutofit/>
-          </a:bodyPr>
-          <a:lstStyle>
-            <a:lvl1pPr algn="l" defTabSz="914400" rtl="0" eaLnBrk="1" latinLnBrk="0" hangingPunct="1">
-              <a:lnSpc>
-                <a:spcPct val="90000"/>
-              </a:lnSpc>
-              <a:spcBef>
-                <a:spcPct val="0"/>
-              </a:spcBef>
-              <a:buNone/>
-              <a:defRPr sz="4400" kern="1200">
-                <a:solidFill>
-                  <a:schemeClr val="tx1"/>
-                </a:solidFill>
-                <a:latin typeface="+mj-lt"/>
-                <a:ea typeface="+mj-ea"/>
-                <a:cs typeface="+mj-cs"/>
-              </a:defRPr>
-            </a:lvl1pPr>
-          </a:lstStyle>
-          <a:p>
-            <a:pPr>
-              <a:lnSpc>
-                <a:spcPct val="100000"/>
-              </a:lnSpc>
-            </a:pPr>
-            <a:r>
-              <a:rPr kumimoji="1" lang="en-US" altLang="zh-CN" sz="2400" dirty="0">
-                <a:latin typeface="+mn-lt"/>
-              </a:rPr>
-              <a:t>2. Compile the 3 source files one by one using "g++ -c”, then link the generated object files together to generate an execute file.</a:t>
-            </a:r>
-          </a:p>
-          <a:p>
-            <a:pPr>
-              <a:lnSpc>
-                <a:spcPct val="100000"/>
-              </a:lnSpc>
-            </a:pPr>
-            <a:endParaRPr kumimoji="1" lang="en-US" altLang="zh-CN" sz="2400" dirty="0">
-              <a:latin typeface="+mn-lt"/>
-            </a:endParaRPr>
-          </a:p>
-          <a:p>
-            <a:pPr>
-              <a:lnSpc>
-                <a:spcPct val="100000"/>
-              </a:lnSpc>
-            </a:pPr>
-            <a:r>
-              <a:rPr kumimoji="1" lang="en-US" altLang="zh-CN" sz="2400" dirty="0">
-                <a:latin typeface="+mn-lt"/>
-              </a:rPr>
-              <a:t>Demonstrate to a SA to pass the test.</a:t>
-            </a:r>
-            <a:endParaRPr kumimoji="1" lang="zh-CN" altLang="en-US" sz="2400" dirty="0">
-              <a:latin typeface="+mn-lt"/>
-            </a:endParaRPr>
-          </a:p>
-        </p:txBody>
-      </p:sp>
-    </p:spTree>
-    <p:extLst>
-      <p:ext uri="{BB962C8B-B14F-4D97-AF65-F5344CB8AC3E}">
-        <p14:creationId xmlns:p14="http://schemas.microsoft.com/office/powerpoint/2010/main" val="306722088"/>
       </p:ext>
     </p:extLst>
   </p:cSld>
@@ -15266,176 +16816,357 @@
           </a:p>
         </p:txBody>
       </p:sp>
-      <p:sp>
-        <p:nvSpPr>
-          <p:cNvPr id="5" name="内容占位符 2">
+      <p:pic>
+        <p:nvPicPr>
+          <p:cNvPr id="4" name="Picture 5">
             <a:extLst>
               <a:ext uri="{FF2B5EF4-FFF2-40B4-BE49-F238E27FC236}">
-                <a16:creationId xmlns:a16="http://schemas.microsoft.com/office/drawing/2014/main" id="{051D9AE5-8F1E-1714-9717-8B47590162A0}"/>
+                <a16:creationId xmlns:a16="http://schemas.microsoft.com/office/drawing/2014/main" id="{8B34BCA4-ABEA-0E76-67B9-436798701AD9}"/>
               </a:ext>
             </a:extLst>
           </p:cNvPr>
-          <p:cNvSpPr>
-            <a:spLocks noGrp="1"/>
-          </p:cNvSpPr>
-          <p:nvPr>
-            <p:ph idx="1"/>
-          </p:nvPr>
-        </p:nvSpPr>
-        <p:spPr>
+          <p:cNvPicPr>
+            <a:picLocks noChangeAspect="1" noChangeArrowheads="1"/>
+          </p:cNvPicPr>
+          <p:nvPr/>
+        </p:nvPicPr>
+        <p:blipFill>
+          <a:blip r:embed="rId2">
+            <a:extLst>
+              <a:ext uri="{28A0092B-C50C-407E-A947-70E740481C1C}">
+                <a14:useLocalDpi xmlns:a14="http://schemas.microsoft.com/office/drawing/2010/main" val="0"/>
+              </a:ext>
+            </a:extLst>
+          </a:blip>
+          <a:srcRect/>
+          <a:stretch>
+            <a:fillRect/>
+          </a:stretch>
+        </p:blipFill>
+        <p:spPr bwMode="auto">
           <a:xfrm>
-            <a:off x="833947" y="1150641"/>
-            <a:ext cx="8485152" cy="1306154"/>
+            <a:off x="5349464" y="4016954"/>
+            <a:ext cx="3188783" cy="914596"/>
           </a:xfrm>
+          <a:prstGeom prst="rect">
+            <a:avLst/>
+          </a:prstGeom>
+          <a:noFill/>
+          <a:ln w="9525">
+            <a:solidFill>
+              <a:srgbClr val="00B0F0"/>
+            </a:solidFill>
+            <a:miter lim="800000"/>
+            <a:headEnd/>
+            <a:tailEnd/>
+          </a:ln>
+          <a:effectLst/>
+          <a:extLst>
+            <a:ext uri="{909E8E84-426E-40DD-AFC4-6F175D3DCCD1}">
+              <a14:hiddenFill xmlns:a14="http://schemas.microsoft.com/office/drawing/2010/main">
+                <a:solidFill>
+                  <a:schemeClr val="accent1"/>
+                </a:solidFill>
+              </a14:hiddenFill>
+            </a:ext>
+            <a:ext uri="{AF507438-7753-43E0-B8FC-AC1667EBCBE1}">
+              <a14:hiddenEffects xmlns:a14="http://schemas.microsoft.com/office/drawing/2010/main">
+                <a:effectLst>
+                  <a:outerShdw dist="35921" dir="2700000" algn="ctr" rotWithShape="0">
+                    <a:schemeClr val="bg2"/>
+                  </a:outerShdw>
+                </a:effectLst>
+              </a14:hiddenEffects>
+            </a:ext>
+          </a:extLst>
         </p:spPr>
-        <p:txBody>
-          <a:bodyPr>
-            <a:noAutofit/>
-          </a:bodyPr>
-          <a:lstStyle/>
-          <a:p>
-            <a:pPr marL="0" indent="0">
-              <a:buNone/>
-            </a:pPr>
-            <a:r>
-              <a:rPr lang="en-US" altLang="zh-CN" sz="2400" dirty="0"/>
-              <a:t>3. Run the following source code and explain the result.</a:t>
-            </a:r>
-          </a:p>
-          <a:p>
-            <a:pPr marL="0" indent="0">
-              <a:buNone/>
-            </a:pPr>
-            <a:r>
-              <a:rPr lang="en-US" altLang="zh-CN" sz="2400" dirty="0">
-                <a:sym typeface="+mn-ea"/>
-              </a:rPr>
-              <a:t>You need to explain the reason to a SA to pass the test.</a:t>
-            </a:r>
-            <a:endParaRPr lang="en-US" altLang="zh-CN" sz="2400" dirty="0"/>
-          </a:p>
-        </p:txBody>
-      </p:sp>
-      <p:sp>
-        <p:nvSpPr>
-          <p:cNvPr id="6" name="文本框 5">
+      </p:pic>
+      <p:pic>
+        <p:nvPicPr>
+          <p:cNvPr id="5" name="Picture 3">
             <a:extLst>
               <a:ext uri="{FF2B5EF4-FFF2-40B4-BE49-F238E27FC236}">
-                <a16:creationId xmlns:a16="http://schemas.microsoft.com/office/drawing/2014/main" id="{B2581132-BA1D-A4BB-8CCD-1209A288ACAD}"/>
+                <a16:creationId xmlns:a16="http://schemas.microsoft.com/office/drawing/2014/main" id="{2A53B269-9589-97AD-04C1-E720C76425DC}"/>
               </a:ext>
             </a:extLst>
           </p:cNvPr>
-          <p:cNvSpPr txBox="1"/>
+          <p:cNvPicPr>
+            <a:picLocks noChangeAspect="1" noChangeArrowheads="1"/>
+          </p:cNvPicPr>
+          <p:nvPr/>
+        </p:nvPicPr>
+        <p:blipFill>
+          <a:blip r:embed="rId3">
+            <a:extLst>
+              <a:ext uri="{28A0092B-C50C-407E-A947-70E740481C1C}">
+                <a14:useLocalDpi xmlns:a14="http://schemas.microsoft.com/office/drawing/2010/main" val="0"/>
+              </a:ext>
+            </a:extLst>
+          </a:blip>
+          <a:srcRect/>
+          <a:stretch>
+            <a:fillRect/>
+          </a:stretch>
+        </p:blipFill>
+        <p:spPr bwMode="auto">
+          <a:xfrm>
+            <a:off x="541100" y="1011855"/>
+            <a:ext cx="4365706" cy="2743786"/>
+          </a:xfrm>
+          <a:prstGeom prst="rect">
+            <a:avLst/>
+          </a:prstGeom>
+          <a:noFill/>
+          <a:ln w="9525">
+            <a:solidFill>
+              <a:srgbClr val="00B0F0"/>
+            </a:solidFill>
+            <a:miter lim="800000"/>
+            <a:headEnd/>
+            <a:tailEnd/>
+          </a:ln>
+          <a:effectLst/>
+          <a:extLst>
+            <a:ext uri="{909E8E84-426E-40DD-AFC4-6F175D3DCCD1}">
+              <a14:hiddenFill xmlns:a14="http://schemas.microsoft.com/office/drawing/2010/main">
+                <a:solidFill>
+                  <a:schemeClr val="accent1"/>
+                </a:solidFill>
+              </a14:hiddenFill>
+            </a:ext>
+            <a:ext uri="{AF507438-7753-43E0-B8FC-AC1667EBCBE1}">
+              <a14:hiddenEffects xmlns:a14="http://schemas.microsoft.com/office/drawing/2010/main">
+                <a:effectLst>
+                  <a:outerShdw dist="35921" dir="2700000" algn="ctr" rotWithShape="0">
+                    <a:schemeClr val="bg2"/>
+                  </a:outerShdw>
+                </a:effectLst>
+              </a14:hiddenEffects>
+            </a:ext>
+          </a:extLst>
+        </p:spPr>
+      </p:pic>
+      <p:pic>
+        <p:nvPicPr>
+          <p:cNvPr id="6" name="Picture 4">
+            <a:extLst>
+              <a:ext uri="{FF2B5EF4-FFF2-40B4-BE49-F238E27FC236}">
+                <a16:creationId xmlns:a16="http://schemas.microsoft.com/office/drawing/2014/main" id="{9D657EEC-29CB-4F5F-54DB-0D53150EF57A}"/>
+              </a:ext>
+            </a:extLst>
+          </p:cNvPr>
+          <p:cNvPicPr>
+            <a:picLocks noChangeAspect="1" noChangeArrowheads="1"/>
+          </p:cNvPicPr>
+          <p:nvPr/>
+        </p:nvPicPr>
+        <p:blipFill>
+          <a:blip r:embed="rId4">
+            <a:extLst>
+              <a:ext uri="{28A0092B-C50C-407E-A947-70E740481C1C}">
+                <a14:useLocalDpi xmlns:a14="http://schemas.microsoft.com/office/drawing/2010/main" val="0"/>
+              </a:ext>
+            </a:extLst>
+          </a:blip>
+          <a:srcRect/>
+          <a:stretch>
+            <a:fillRect/>
+          </a:stretch>
+        </p:blipFill>
+        <p:spPr bwMode="auto">
+          <a:xfrm>
+            <a:off x="541096" y="4016954"/>
+            <a:ext cx="4518212" cy="2488730"/>
+          </a:xfrm>
+          <a:prstGeom prst="rect">
+            <a:avLst/>
+          </a:prstGeom>
+          <a:noFill/>
+          <a:ln w="9525">
+            <a:solidFill>
+              <a:srgbClr val="00B0F0"/>
+            </a:solidFill>
+            <a:miter lim="800000"/>
+            <a:headEnd/>
+            <a:tailEnd/>
+          </a:ln>
+          <a:effectLst/>
+          <a:extLst>
+            <a:ext uri="{909E8E84-426E-40DD-AFC4-6F175D3DCCD1}">
+              <a14:hiddenFill xmlns:a14="http://schemas.microsoft.com/office/drawing/2010/main">
+                <a:solidFill>
+                  <a:schemeClr val="accent1"/>
+                </a:solidFill>
+              </a14:hiddenFill>
+            </a:ext>
+            <a:ext uri="{AF507438-7753-43E0-B8FC-AC1667EBCBE1}">
+              <a14:hiddenEffects xmlns:a14="http://schemas.microsoft.com/office/drawing/2010/main">
+                <a:effectLst>
+                  <a:outerShdw dist="35921" dir="2700000" algn="ctr" rotWithShape="0">
+                    <a:schemeClr val="bg2"/>
+                  </a:outerShdw>
+                </a:effectLst>
+              </a14:hiddenEffects>
+            </a:ext>
+          </a:extLst>
+        </p:spPr>
+      </p:pic>
+      <p:pic>
+        <p:nvPicPr>
+          <p:cNvPr id="7" name="Picture 2">
+            <a:extLst>
+              <a:ext uri="{FF2B5EF4-FFF2-40B4-BE49-F238E27FC236}">
+                <a16:creationId xmlns:a16="http://schemas.microsoft.com/office/drawing/2014/main" id="{1E662B48-EC76-4BF8-4B24-D5B2F1C57A26}"/>
+              </a:ext>
+            </a:extLst>
+          </p:cNvPr>
+          <p:cNvPicPr>
+            <a:picLocks noChangeAspect="1" noChangeArrowheads="1"/>
+          </p:cNvPicPr>
+          <p:nvPr/>
+        </p:nvPicPr>
+        <p:blipFill>
+          <a:blip r:embed="rId5">
+            <a:extLst>
+              <a:ext uri="{28A0092B-C50C-407E-A947-70E740481C1C}">
+                <a14:useLocalDpi xmlns:a14="http://schemas.microsoft.com/office/drawing/2010/main" val="0"/>
+              </a:ext>
+            </a:extLst>
+          </a:blip>
+          <a:srcRect/>
+          <a:stretch>
+            <a:fillRect/>
+          </a:stretch>
+        </p:blipFill>
+        <p:spPr bwMode="auto">
+          <a:xfrm>
+            <a:off x="5245135" y="881198"/>
+            <a:ext cx="6209713" cy="3072673"/>
+          </a:xfrm>
+          <a:prstGeom prst="rect">
+            <a:avLst/>
+          </a:prstGeom>
+          <a:noFill/>
+          <a:ln w="9525">
+            <a:solidFill>
+              <a:srgbClr val="00B0F0"/>
+            </a:solidFill>
+            <a:miter lim="800000"/>
+            <a:headEnd/>
+            <a:tailEnd/>
+          </a:ln>
+          <a:effectLst/>
+          <a:extLst>
+            <a:ext uri="{909E8E84-426E-40DD-AFC4-6F175D3DCCD1}">
+              <a14:hiddenFill xmlns:a14="http://schemas.microsoft.com/office/drawing/2010/main">
+                <a:solidFill>
+                  <a:schemeClr val="accent1"/>
+                </a:solidFill>
+              </a14:hiddenFill>
+            </a:ext>
+            <a:ext uri="{AF507438-7753-43E0-B8FC-AC1667EBCBE1}">
+              <a14:hiddenEffects xmlns:a14="http://schemas.microsoft.com/office/drawing/2010/main">
+                <a:effectLst>
+                  <a:outerShdw dist="35921" dir="2700000" algn="ctr" rotWithShape="0">
+                    <a:schemeClr val="bg2"/>
+                  </a:outerShdw>
+                </a:effectLst>
+              </a14:hiddenEffects>
+            </a:ext>
+          </a:extLst>
+        </p:spPr>
+      </p:pic>
+      <p:sp>
+        <p:nvSpPr>
+          <p:cNvPr id="11" name="标题 1">
+            <a:extLst>
+              <a:ext uri="{FF2B5EF4-FFF2-40B4-BE49-F238E27FC236}">
+                <a16:creationId xmlns:a16="http://schemas.microsoft.com/office/drawing/2014/main" id="{BD8426C9-D518-1129-B082-A04673C5F207}"/>
+              </a:ext>
+            </a:extLst>
+          </p:cNvPr>
+          <p:cNvSpPr txBox="1">
+            <a:spLocks/>
+          </p:cNvSpPr>
           <p:nvPr/>
         </p:nvSpPr>
         <p:spPr>
           <a:xfrm>
-            <a:off x="2785620" y="2723508"/>
-            <a:ext cx="3869703" cy="3139321"/>
+            <a:off x="5121861" y="4878727"/>
+            <a:ext cx="6832771" cy="2196149"/>
           </a:xfrm>
           <a:prstGeom prst="rect">
             <a:avLst/>
           </a:prstGeom>
-          <a:solidFill>
-            <a:schemeClr val="accent5">
-              <a:lumMod val="20000"/>
-              <a:lumOff val="80000"/>
-            </a:schemeClr>
-          </a:solidFill>
-          <a:ln>
-            <a:solidFill>
-              <a:srgbClr val="000000"/>
-            </a:solidFill>
-          </a:ln>
         </p:spPr>
         <p:txBody>
-          <a:bodyPr wrap="square" rtlCol="0">
-            <a:spAutoFit/>
+          <a:bodyPr vert="horz" lIns="91440" tIns="45720" rIns="91440" bIns="45720" rtlCol="0" anchor="ctr">
+            <a:normAutofit/>
           </a:bodyPr>
-          <a:lstStyle/>
-          <a:p>
-            <a:r>
-              <a:rPr lang="en-US" altLang="zh-CN" dirty="0"/>
-              <a:t>#include &lt;iostream&gt;</a:t>
-            </a:r>
-          </a:p>
-          <a:p>
-            <a:r>
-              <a:rPr lang="en-US" altLang="zh-CN" dirty="0"/>
-              <a:t>using namespace std;</a:t>
-            </a:r>
-          </a:p>
-          <a:p>
-            <a:endParaRPr lang="en-US" altLang="zh-CN" dirty="0"/>
-          </a:p>
-          <a:p>
-            <a:r>
-              <a:rPr lang="en-US" altLang="zh-CN" dirty="0"/>
-              <a:t>int main()</a:t>
-            </a:r>
-          </a:p>
-          <a:p>
-            <a:r>
-              <a:rPr lang="en-US" altLang="zh-CN" dirty="0"/>
-              <a:t>{</a:t>
-            </a:r>
-          </a:p>
-          <a:p>
-            <a:r>
-              <a:rPr lang="en-US" altLang="zh-CN" dirty="0"/>
-              <a:t>    for(</a:t>
-            </a:r>
-            <a:r>
-              <a:rPr lang="en-US" altLang="zh-CN" dirty="0" err="1"/>
-              <a:t>size_t</a:t>
-            </a:r>
-            <a:r>
-              <a:rPr lang="en-US" altLang="zh-CN" dirty="0"/>
-              <a:t> n = 2; n &gt;= 0; n--)</a:t>
-            </a:r>
-          </a:p>
-          <a:p>
-            <a:r>
-              <a:rPr lang="en-US" altLang="zh-CN" dirty="0"/>
-              <a:t>        </a:t>
-            </a:r>
-            <a:r>
-              <a:rPr lang="en-US" altLang="zh-CN" dirty="0" err="1"/>
-              <a:t>cout</a:t>
-            </a:r>
-            <a:r>
-              <a:rPr lang="en-US" altLang="zh-CN" dirty="0"/>
-              <a:t> &lt;&lt; "n = " &lt;&lt; n &lt;&lt; "  ";</a:t>
-            </a:r>
-          </a:p>
-          <a:p>
-            <a:endParaRPr lang="en-US" altLang="zh-CN" dirty="0"/>
-          </a:p>
-          <a:p>
-            <a:r>
-              <a:rPr lang="en-US" altLang="zh-CN" dirty="0"/>
-              <a:t>    return 0;</a:t>
-            </a:r>
-          </a:p>
-          <a:p>
-            <a:r>
-              <a:rPr lang="en-US" altLang="zh-CN" dirty="0"/>
-              <a:t>    </a:t>
-            </a:r>
-          </a:p>
-          <a:p>
-            <a:r>
-              <a:rPr lang="en-US" altLang="zh-CN" dirty="0"/>
-              <a:t>}</a:t>
-            </a:r>
-            <a:endParaRPr lang="zh-CN" altLang="en-US" dirty="0"/>
+          <a:lstStyle>
+            <a:lvl1pPr algn="l" defTabSz="914400" rtl="0" eaLnBrk="1" latinLnBrk="0" hangingPunct="1">
+              <a:lnSpc>
+                <a:spcPct val="90000"/>
+              </a:lnSpc>
+              <a:spcBef>
+                <a:spcPct val="0"/>
+              </a:spcBef>
+              <a:buNone/>
+              <a:defRPr sz="4400" kern="1200">
+                <a:solidFill>
+                  <a:schemeClr val="tx1"/>
+                </a:solidFill>
+                <a:latin typeface="+mj-lt"/>
+                <a:ea typeface="+mj-ea"/>
+                <a:cs typeface="+mj-cs"/>
+              </a:defRPr>
+            </a:lvl1pPr>
+          </a:lstStyle>
+          <a:p>
+            <a:pPr>
+              <a:lnSpc>
+                <a:spcPct val="100000"/>
+              </a:lnSpc>
+            </a:pPr>
+            <a:r>
+              <a:rPr kumimoji="1" lang="en-US" altLang="zh-CN" sz="2400" dirty="0">
+                <a:latin typeface="+mn-lt"/>
+              </a:rPr>
+              <a:t>2. Compile the 3 source files one by one using "g++ -c”, then link the generated object files together to generate an execute file.</a:t>
+            </a:r>
+          </a:p>
+          <a:p>
+            <a:pPr>
+              <a:lnSpc>
+                <a:spcPct val="100000"/>
+              </a:lnSpc>
+            </a:pPr>
+            <a:endParaRPr kumimoji="1" lang="en-US" altLang="zh-CN" sz="2400" dirty="0">
+              <a:latin typeface="+mn-lt"/>
+            </a:endParaRPr>
+          </a:p>
+          <a:p>
+            <a:pPr>
+              <a:lnSpc>
+                <a:spcPct val="100000"/>
+              </a:lnSpc>
+            </a:pPr>
+            <a:r>
+              <a:rPr kumimoji="1" lang="en-US" altLang="zh-CN" sz="2400" dirty="0">
+                <a:latin typeface="+mn-lt"/>
+              </a:rPr>
+              <a:t>Demonstrate to a SA to pass the test.</a:t>
+            </a:r>
+            <a:endParaRPr kumimoji="1" lang="zh-CN" altLang="en-US" sz="2400" dirty="0">
+              <a:latin typeface="+mn-lt"/>
+            </a:endParaRPr>
           </a:p>
         </p:txBody>
       </p:sp>
     </p:spTree>
     <p:extLst>
       <p:ext uri="{BB962C8B-B14F-4D97-AF65-F5344CB8AC3E}">
-        <p14:creationId xmlns:p14="http://schemas.microsoft.com/office/powerpoint/2010/main" val="740224631"/>
+        <p14:creationId xmlns:p14="http://schemas.microsoft.com/office/powerpoint/2010/main" val="306722088"/>
       </p:ext>
     </p:extLst>
   </p:cSld>
@@ -15556,13 +17287,13 @@
         </p:nvSpPr>
         <p:spPr>
           <a:xfrm>
-            <a:off x="833946" y="1218737"/>
-            <a:ext cx="11053879" cy="1306154"/>
+            <a:off x="833947" y="1150641"/>
+            <a:ext cx="8485152" cy="1306154"/>
           </a:xfrm>
         </p:spPr>
         <p:txBody>
           <a:bodyPr>
-            <a:normAutofit/>
+            <a:noAutofit/>
           </a:bodyPr>
           <a:lstStyle/>
           <a:p>
@@ -15571,7 +17302,7 @@
             </a:pPr>
             <a:r>
               <a:rPr lang="en-US" altLang="zh-CN" sz="2400" dirty="0"/>
-              <a:t>4. Run the following source code and explain the result.</a:t>
+              <a:t>3. Run the following source code and explain the result.</a:t>
             </a:r>
           </a:p>
           <a:p>
@@ -15602,8 +17333,8 @@
         </p:nvSpPr>
         <p:spPr>
           <a:xfrm>
-            <a:off x="2678617" y="2207225"/>
-            <a:ext cx="3869703" cy="4524315"/>
+            <a:off x="2785620" y="2723508"/>
+            <a:ext cx="3869703" cy="3139321"/>
           </a:xfrm>
           <a:prstGeom prst="rect">
             <a:avLst/>
@@ -15655,25 +17386,15 @@
           <a:p>
             <a:r>
               <a:rPr lang="en-US" altLang="zh-CN" dirty="0"/>
-              <a:t>    int n = 5;</a:t>
-            </a:r>
-          </a:p>
-          <a:p>
+              <a:t>    for(</a:t>
+            </a:r>
+            <a:r>
+              <a:rPr lang="en-US" altLang="zh-CN" dirty="0" err="1"/>
+              <a:t>size_t</a:t>
+            </a:r>
             <a:r>
               <a:rPr lang="en-US" altLang="zh-CN" dirty="0"/>
-              <a:t>    int sum;</a:t>
-            </a:r>
-          </a:p>
-          <a:p>
-            <a:r>
-              <a:rPr lang="en-US" altLang="zh-CN" dirty="0"/>
-              <a:t>    while(n &gt;0){</a:t>
-            </a:r>
-          </a:p>
-          <a:p>
-            <a:r>
-              <a:rPr lang="en-US" altLang="zh-CN" dirty="0"/>
-              <a:t>        sum += n;</a:t>
+              <a:t> n = 2; n &gt;= 0; n--)</a:t>
             </a:r>
           </a:p>
           <a:p>
@@ -15691,26 +17412,6 @@
             </a:r>
           </a:p>
           <a:p>
-            <a:r>
-              <a:rPr lang="en-US" altLang="zh-CN" dirty="0"/>
-              <a:t>        </a:t>
-            </a:r>
-            <a:r>
-              <a:rPr lang="en-US" altLang="zh-CN" dirty="0" err="1"/>
-              <a:t>cout</a:t>
-            </a:r>
-            <a:r>
-              <a:rPr lang="en-US" altLang="zh-CN" dirty="0"/>
-              <a:t> &lt;&lt; "sum = " &lt;&lt; sum &lt;&lt; "  ";</a:t>
-            </a:r>
-          </a:p>
-          <a:p>
-            <a:r>
-              <a:rPr lang="en-US" altLang="zh-CN" dirty="0"/>
-              <a:t>    }</a:t>
-            </a:r>
-          </a:p>
-          <a:p>
             <a:endParaRPr lang="en-US" altLang="zh-CN" dirty="0"/>
           </a:p>
           <a:p>
@@ -15722,7 +17423,7 @@
           <a:p>
             <a:r>
               <a:rPr lang="en-US" altLang="zh-CN" dirty="0"/>
-              <a:t>        </a:t>
+              <a:t>    </a:t>
             </a:r>
           </a:p>
           <a:p>
@@ -15737,7 +17438,7 @@
     </p:spTree>
     <p:extLst>
       <p:ext uri="{BB962C8B-B14F-4D97-AF65-F5344CB8AC3E}">
-        <p14:creationId xmlns:p14="http://schemas.microsoft.com/office/powerpoint/2010/main" val="3610501890"/>
+        <p14:creationId xmlns:p14="http://schemas.microsoft.com/office/powerpoint/2010/main" val="740224631"/>
       </p:ext>
     </p:extLst>
   </p:cSld>
@@ -15858,6 +17559,308 @@
         </p:nvSpPr>
         <p:spPr>
           <a:xfrm>
+            <a:off x="833946" y="1218737"/>
+            <a:ext cx="11053879" cy="1306154"/>
+          </a:xfrm>
+        </p:spPr>
+        <p:txBody>
+          <a:bodyPr>
+            <a:normAutofit/>
+          </a:bodyPr>
+          <a:lstStyle/>
+          <a:p>
+            <a:pPr marL="0" indent="0">
+              <a:buNone/>
+            </a:pPr>
+            <a:r>
+              <a:rPr lang="en-US" altLang="zh-CN" sz="2400" dirty="0"/>
+              <a:t>4. Run the following source code and explain the result.</a:t>
+            </a:r>
+          </a:p>
+          <a:p>
+            <a:pPr marL="0" indent="0">
+              <a:buNone/>
+            </a:pPr>
+            <a:r>
+              <a:rPr lang="en-US" altLang="zh-CN" sz="2400" dirty="0">
+                <a:sym typeface="+mn-ea"/>
+              </a:rPr>
+              <a:t>You need to explain the reason to a SA to pass the test.</a:t>
+            </a:r>
+            <a:endParaRPr lang="en-US" altLang="zh-CN" sz="2400" dirty="0"/>
+          </a:p>
+        </p:txBody>
+      </p:sp>
+      <p:sp>
+        <p:nvSpPr>
+          <p:cNvPr id="6" name="文本框 5">
+            <a:extLst>
+              <a:ext uri="{FF2B5EF4-FFF2-40B4-BE49-F238E27FC236}">
+                <a16:creationId xmlns:a16="http://schemas.microsoft.com/office/drawing/2014/main" id="{B2581132-BA1D-A4BB-8CCD-1209A288ACAD}"/>
+              </a:ext>
+            </a:extLst>
+          </p:cNvPr>
+          <p:cNvSpPr txBox="1"/>
+          <p:nvPr/>
+        </p:nvSpPr>
+        <p:spPr>
+          <a:xfrm>
+            <a:off x="2678617" y="2207225"/>
+            <a:ext cx="3869703" cy="4524315"/>
+          </a:xfrm>
+          <a:prstGeom prst="rect">
+            <a:avLst/>
+          </a:prstGeom>
+          <a:solidFill>
+            <a:schemeClr val="accent5">
+              <a:lumMod val="20000"/>
+              <a:lumOff val="80000"/>
+            </a:schemeClr>
+          </a:solidFill>
+          <a:ln>
+            <a:solidFill>
+              <a:srgbClr val="000000"/>
+            </a:solidFill>
+          </a:ln>
+        </p:spPr>
+        <p:txBody>
+          <a:bodyPr wrap="square" rtlCol="0">
+            <a:spAutoFit/>
+          </a:bodyPr>
+          <a:lstStyle/>
+          <a:p>
+            <a:r>
+              <a:rPr lang="en-US" altLang="zh-CN" dirty="0"/>
+              <a:t>#include &lt;iostream&gt;</a:t>
+            </a:r>
+          </a:p>
+          <a:p>
+            <a:r>
+              <a:rPr lang="en-US" altLang="zh-CN" dirty="0"/>
+              <a:t>using namespace std;</a:t>
+            </a:r>
+          </a:p>
+          <a:p>
+            <a:endParaRPr lang="en-US" altLang="zh-CN" dirty="0"/>
+          </a:p>
+          <a:p>
+            <a:r>
+              <a:rPr lang="en-US" altLang="zh-CN" dirty="0"/>
+              <a:t>int main()</a:t>
+            </a:r>
+          </a:p>
+          <a:p>
+            <a:r>
+              <a:rPr lang="en-US" altLang="zh-CN" dirty="0"/>
+              <a:t>{</a:t>
+            </a:r>
+          </a:p>
+          <a:p>
+            <a:r>
+              <a:rPr lang="en-US" altLang="zh-CN" dirty="0"/>
+              <a:t>    int n = 5;</a:t>
+            </a:r>
+          </a:p>
+          <a:p>
+            <a:r>
+              <a:rPr lang="en-US" altLang="zh-CN" dirty="0"/>
+              <a:t>    int sum;</a:t>
+            </a:r>
+          </a:p>
+          <a:p>
+            <a:r>
+              <a:rPr lang="en-US" altLang="zh-CN" dirty="0"/>
+              <a:t>    while(n &gt;0){</a:t>
+            </a:r>
+          </a:p>
+          <a:p>
+            <a:r>
+              <a:rPr lang="en-US" altLang="zh-CN" dirty="0"/>
+              <a:t>        sum += n;</a:t>
+            </a:r>
+          </a:p>
+          <a:p>
+            <a:r>
+              <a:rPr lang="en-US" altLang="zh-CN" dirty="0"/>
+              <a:t>        </a:t>
+            </a:r>
+            <a:r>
+              <a:rPr lang="en-US" altLang="zh-CN" dirty="0" err="1"/>
+              <a:t>cout</a:t>
+            </a:r>
+            <a:r>
+              <a:rPr lang="en-US" altLang="zh-CN" dirty="0"/>
+              <a:t> &lt;&lt; "n = " &lt;&lt; n &lt;&lt; "  ";</a:t>
+            </a:r>
+          </a:p>
+          <a:p>
+            <a:r>
+              <a:rPr lang="en-US" altLang="zh-CN" dirty="0"/>
+              <a:t>        </a:t>
+            </a:r>
+            <a:r>
+              <a:rPr lang="en-US" altLang="zh-CN" dirty="0" err="1"/>
+              <a:t>cout</a:t>
+            </a:r>
+            <a:r>
+              <a:rPr lang="en-US" altLang="zh-CN" dirty="0"/>
+              <a:t> &lt;&lt; "sum = " &lt;&lt; sum &lt;&lt; "  ";</a:t>
+            </a:r>
+          </a:p>
+          <a:p>
+            <a:r>
+              <a:rPr lang="en-US" altLang="zh-CN" dirty="0"/>
+              <a:t>    }</a:t>
+            </a:r>
+          </a:p>
+          <a:p>
+            <a:endParaRPr lang="en-US" altLang="zh-CN" dirty="0"/>
+          </a:p>
+          <a:p>
+            <a:r>
+              <a:rPr lang="en-US" altLang="zh-CN" dirty="0"/>
+              <a:t>    return 0;</a:t>
+            </a:r>
+          </a:p>
+          <a:p>
+            <a:r>
+              <a:rPr lang="en-US" altLang="zh-CN" dirty="0"/>
+              <a:t>        </a:t>
+            </a:r>
+          </a:p>
+          <a:p>
+            <a:r>
+              <a:rPr lang="en-US" altLang="zh-CN" dirty="0"/>
+              <a:t>}</a:t>
+            </a:r>
+            <a:endParaRPr lang="zh-CN" altLang="en-US" dirty="0"/>
+          </a:p>
+        </p:txBody>
+      </p:sp>
+    </p:spTree>
+    <p:extLst>
+      <p:ext uri="{BB962C8B-B14F-4D97-AF65-F5344CB8AC3E}">
+        <p14:creationId xmlns:p14="http://schemas.microsoft.com/office/powerpoint/2010/main" val="3610501890"/>
+      </p:ext>
+    </p:extLst>
+  </p:cSld>
+  <p:clrMapOvr>
+    <a:masterClrMapping/>
+  </p:clrMapOvr>
+</p:sld>
+</file>
+
+<file path=ppt/slides/slide23.xml><?xml version="1.0" encoding="utf-8"?>
+<p:sld xmlns:a="http://schemas.openxmlformats.org/drawingml/2006/main" xmlns:r="http://schemas.openxmlformats.org/officeDocument/2006/relationships" xmlns:p="http://schemas.openxmlformats.org/presentationml/2006/main">
+  <p:cSld>
+    <p:spTree>
+      <p:nvGrpSpPr>
+        <p:cNvPr id="1" name=""/>
+        <p:cNvGrpSpPr/>
+        <p:nvPr/>
+      </p:nvGrpSpPr>
+      <p:grpSpPr>
+        <a:xfrm>
+          <a:off x="0" y="0"/>
+          <a:ext cx="0" cy="0"/>
+          <a:chOff x="0" y="0"/>
+          <a:chExt cx="0" cy="0"/>
+        </a:xfrm>
+      </p:grpSpPr>
+      <p:sp>
+        <p:nvSpPr>
+          <p:cNvPr id="10" name="Title 1"/>
+          <p:cNvSpPr txBox="1"/>
+          <p:nvPr/>
+        </p:nvSpPr>
+        <p:spPr>
+          <a:xfrm>
+            <a:off x="1377311" y="508057"/>
+            <a:ext cx="8100392" cy="685800"/>
+          </a:xfrm>
+          <a:prstGeom prst="rect">
+            <a:avLst/>
+          </a:prstGeom>
+        </p:spPr>
+        <p:txBody>
+          <a:bodyPr vert="horz" lIns="91440" tIns="45720" rIns="91440" bIns="45720" rtlCol="0" anchor="ctr">
+            <a:noAutofit/>
+          </a:bodyPr>
+          <a:lstStyle>
+            <a:lvl1pPr algn="l" defTabSz="914400" rtl="0" eaLnBrk="1" latinLnBrk="0" hangingPunct="1">
+              <a:lnSpc>
+                <a:spcPct val="90000"/>
+              </a:lnSpc>
+              <a:spcBef>
+                <a:spcPct val="0"/>
+              </a:spcBef>
+              <a:buNone/>
+              <a:defRPr sz="4400" kern="1200">
+                <a:solidFill>
+                  <a:schemeClr val="tx1"/>
+                </a:solidFill>
+                <a:latin typeface="+mj-lt"/>
+                <a:ea typeface="+mj-ea"/>
+                <a:cs typeface="+mj-cs"/>
+              </a:defRPr>
+            </a:lvl1pPr>
+          </a:lstStyle>
+          <a:p>
+            <a:pPr marL="0" marR="0" lvl="0" indent="0" algn="l" defTabSz="914400" rtl="0" eaLnBrk="1" fontAlgn="auto" latinLnBrk="0" hangingPunct="1">
+              <a:lnSpc>
+                <a:spcPct val="90000"/>
+              </a:lnSpc>
+              <a:spcBef>
+                <a:spcPct val="0"/>
+              </a:spcBef>
+              <a:spcAft>
+                <a:spcPts val="0"/>
+              </a:spcAft>
+              <a:buClrTx/>
+              <a:buSzTx/>
+              <a:buFontTx/>
+              <a:buNone/>
+              <a:tabLst/>
+              <a:defRPr/>
+            </a:pPr>
+            <a:r>
+              <a:rPr kumimoji="0" lang="en-US" altLang="zh-CN" sz="3600" b="1" i="0" u="none" strike="noStrike" kern="1200" cap="none" spc="0" normalizeH="0" baseline="0" noProof="0" dirty="0">
+                <a:ln>
+                  <a:noFill/>
+                </a:ln>
+                <a:solidFill>
+                  <a:prstClr val="black"/>
+                </a:solidFill>
+                <a:effectLst/>
+                <a:uLnTx/>
+                <a:uFillTx/>
+                <a:latin typeface="Calibri" panose="020F0502020204030204"/>
+                <a:ea typeface="宋体" panose="02010600030101010101" pitchFamily="2" charset="-122"/>
+                <a:cs typeface="+mj-cs"/>
+              </a:rPr>
+              <a:t> Exercises</a:t>
+            </a:r>
+          </a:p>
+        </p:txBody>
+      </p:sp>
+      <p:sp>
+        <p:nvSpPr>
+          <p:cNvPr id="5" name="内容占位符 2">
+            <a:extLst>
+              <a:ext uri="{FF2B5EF4-FFF2-40B4-BE49-F238E27FC236}">
+                <a16:creationId xmlns:a16="http://schemas.microsoft.com/office/drawing/2014/main" id="{051D9AE5-8F1E-1714-9717-8B47590162A0}"/>
+              </a:ext>
+            </a:extLst>
+          </p:cNvPr>
+          <p:cNvSpPr>
+            <a:spLocks noGrp="1"/>
+          </p:cNvSpPr>
+          <p:nvPr>
+            <p:ph idx="1"/>
+          </p:nvPr>
+        </p:nvSpPr>
+        <p:spPr>
+          <a:xfrm>
             <a:off x="833946" y="1150641"/>
             <a:ext cx="11053879" cy="1056584"/>
           </a:xfrm>
@@ -16089,7 +18092,7 @@
               <a:rPr lang="en-US" altLang="zh-CN" dirty="0">
                 <a:sym typeface="+mn-ea"/>
               </a:rPr>
-              <a:t>Commands in Linux</a:t>
+              <a:t>Common commands in Linux</a:t>
             </a:r>
             <a:endParaRPr lang="zh-CN" altLang="en-US" dirty="0"/>
           </a:p>
@@ -16183,14 +18186,14 @@
           <p:nvPr>
             <p:extLst>
               <p:ext uri="{D42A27DB-BD31-4B8C-83A1-F6EECF244321}">
-                <p14:modId xmlns:p14="http://schemas.microsoft.com/office/powerpoint/2010/main" val="2240999602"/>
+                <p14:modId xmlns:p14="http://schemas.microsoft.com/office/powerpoint/2010/main" val="888812473"/>
               </p:ext>
             </p:extLst>
           </p:nvPr>
         </p:nvGraphicFramePr>
         <p:xfrm>
           <a:off x="1219200" y="1663537"/>
-          <a:ext cx="8128000" cy="3566160"/>
+          <a:ext cx="8128000" cy="3962400"/>
         </p:xfrm>
         <a:graphic>
           <a:graphicData uri="http://schemas.openxmlformats.org/drawingml/2006/table">
@@ -16588,15 +18591,19 @@
                   </a:ext>
                 </a:extLst>
               </a:tr>
-              <a:tr h="370840">
+              <a:tr h="198120">
                 <a:tc>
                   <a:txBody>
                     <a:bodyPr/>
                     <a:lstStyle/>
                     <a:p>
                       <a:r>
+                        <a:rPr lang="en-US" altLang="zh-CN" sz="2000" b="1" dirty="0"/>
+                        <a:t>cp</a:t>
+                      </a:r>
+                      <a:r>
                         <a:rPr lang="en-US" altLang="zh-CN" sz="2000" dirty="0"/>
-                        <a:t>cp &lt;source&gt; &lt;</a:t>
+                        <a:t> &lt;source&gt; &lt;</a:t>
                       </a:r>
                       <a:r>
                         <a:rPr lang="en-US" altLang="zh-CN" sz="2000" dirty="0" err="1"/>
@@ -16617,8 +18624,24 @@
                     <a:lstStyle/>
                     <a:p>
                       <a:r>
+                        <a:rPr lang="en-US" altLang="zh-CN" sz="2000" b="1" dirty="0"/>
+                        <a:t>C</a:t>
+                      </a:r>
+                      <a:r>
+                        <a:rPr lang="en-US" altLang="zh-CN" sz="2000" b="0" dirty="0"/>
+                        <a:t>o</a:t>
+                      </a:r>
+                      <a:r>
+                        <a:rPr lang="en-US" altLang="zh-CN" sz="2000" b="1" dirty="0"/>
+                        <a:t>p</a:t>
+                      </a:r>
+                      <a:r>
+                        <a:rPr lang="en-US" altLang="zh-CN" sz="2000" b="0" dirty="0"/>
+                        <a:t>y</a:t>
+                      </a:r>
+                      <a:r>
                         <a:rPr lang="en-US" altLang="zh-CN" sz="2000" dirty="0"/>
-                        <a:t>Copy a file or files to another </a:t>
+                        <a:t> a file or files to another </a:t>
                       </a:r>
                       <a:endParaRPr lang="zh-CN" altLang="en-US" sz="2000" dirty="0"/>
                     </a:p>
@@ -16628,6 +18651,65 @@
                 <a:extLst>
                   <a:ext uri="{0D108BD9-81ED-4DB2-BD59-A6C34878D82A}">
                     <a16:rowId xmlns:a16="http://schemas.microsoft.com/office/drawing/2014/main" val="735595135"/>
+                  </a:ext>
+                </a:extLst>
+              </a:tr>
+              <a:tr h="198120">
+                <a:tc>
+                  <a:txBody>
+                    <a:bodyPr/>
+                    <a:lstStyle/>
+                    <a:p>
+                      <a:r>
+                        <a:rPr lang="en-US" altLang="zh-CN" sz="2000" b="1" dirty="0"/>
+                        <a:t>mv</a:t>
+                      </a:r>
+                      <a:r>
+                        <a:rPr lang="en-US" altLang="zh-CN" sz="2000" dirty="0"/>
+                        <a:t>&lt;source&gt;&lt;</a:t>
+                      </a:r>
+                      <a:r>
+                        <a:rPr lang="en-US" altLang="zh-CN" sz="2000" dirty="0" err="1"/>
+                        <a:t>dest</a:t>
+                      </a:r>
+                      <a:r>
+                        <a:rPr lang="en-US" altLang="zh-CN" sz="2000" dirty="0"/>
+                        <a:t>&gt;</a:t>
+                      </a:r>
+                      <a:endParaRPr lang="zh-CN" altLang="en-US" sz="2000" dirty="0"/>
+                    </a:p>
+                  </a:txBody>
+                  <a:tcPr/>
+                </a:tc>
+                <a:tc>
+                  <a:txBody>
+                    <a:bodyPr/>
+                    <a:lstStyle/>
+                    <a:p>
+                      <a:r>
+                        <a:rPr lang="en-US" altLang="zh-CN" sz="2000" b="1" dirty="0"/>
+                        <a:t>M</a:t>
+                      </a:r>
+                      <a:r>
+                        <a:rPr lang="en-US" altLang="zh-CN" sz="2000" dirty="0"/>
+                        <a:t>o</a:t>
+                      </a:r>
+                      <a:r>
+                        <a:rPr lang="en-US" altLang="zh-CN" sz="2000" b="1" dirty="0"/>
+                        <a:t>v</a:t>
+                      </a:r>
+                      <a:r>
+                        <a:rPr lang="en-US" altLang="zh-CN" sz="2000" dirty="0"/>
+                        <a:t>e a file or files to another directory</a:t>
+                      </a:r>
+                      <a:endParaRPr lang="zh-CN" altLang="en-US" sz="2000" dirty="0"/>
+                    </a:p>
+                  </a:txBody>
+                  <a:tcPr/>
+                </a:tc>
+                <a:extLst>
+                  <a:ext uri="{0D108BD9-81ED-4DB2-BD59-A6C34878D82A}">
+                    <a16:rowId xmlns:a16="http://schemas.microsoft.com/office/drawing/2014/main" val="3475856259"/>
                   </a:ext>
                 </a:extLst>
               </a:tr>

</xml_diff>